<commit_message>
Final submission executive presentation for Capstone I
</commit_message>
<xml_diff>
--- a/Big Mountain Resort Executive Presentation.pptx
+++ b/Big Mountain Resort Executive Presentation.pptx
@@ -1,27 +1,27 @@
 
 <file path=ppt/presentation.xml><?xml version="1.0" encoding="utf-8"?>
-<p:presentation xmlns:a="http://schemas.openxmlformats.org/drawingml/2006/main" xmlns:r="http://schemas.openxmlformats.org/officeDocument/2006/relationships" xmlns:mc="http://schemas.openxmlformats.org/markup-compatibility/2006" xmlns:mv="urn:schemas-microsoft-com:mac:vml" xmlns:p="http://schemas.openxmlformats.org/presentationml/2006/main" xmlns:c="http://schemas.openxmlformats.org/drawingml/2006/chart" xmlns:dgm="http://schemas.openxmlformats.org/drawingml/2006/diagram" xmlns:o="urn:schemas-microsoft-com:office:office" xmlns:v="urn:schemas-microsoft-com:vml" xmlns:pvml="urn:schemas-microsoft-com:office:powerpoint" xmlns:com="http://schemas.openxmlformats.org/drawingml/2006/compatibility" xmlns:p14="http://schemas.microsoft.com/office/powerpoint/2010/main" xmlns:p15="http://schemas.microsoft.com/office/powerpoint/2012/main" xmlns:ahyp="http://schemas.microsoft.com/office/drawing/2018/hyperlinkcolor" autoCompressPictures="0" strictFirstAndLastChars="0" saveSubsetFonts="1">
+<p:presentation xmlns:a="http://schemas.openxmlformats.org/drawingml/2006/main" xmlns:r="http://schemas.openxmlformats.org/officeDocument/2006/relationships" xmlns:p="http://schemas.openxmlformats.org/presentationml/2006/main" strictFirstAndLastChars="0" saveSubsetFonts="1" autoCompressPictures="0">
   <p:sldMasterIdLst>
-    <p:sldMasterId id="2147483659" r:id="rId4"/>
+    <p:sldMasterId id="2147483659" r:id="rId1"/>
   </p:sldMasterIdLst>
   <p:notesMasterIdLst>
-    <p:notesMasterId r:id="rId5"/>
+    <p:notesMasterId r:id="rId11"/>
   </p:notesMasterIdLst>
   <p:sldIdLst>
-    <p:sldId id="256" r:id="rId6"/>
-    <p:sldId id="257" r:id="rId7"/>
-    <p:sldId id="258" r:id="rId8"/>
-    <p:sldId id="259" r:id="rId9"/>
-    <p:sldId id="260" r:id="rId10"/>
-    <p:sldId id="261" r:id="rId11"/>
-    <p:sldId id="262" r:id="rId12"/>
-    <p:sldId id="263" r:id="rId13"/>
-    <p:sldId id="264" r:id="rId14"/>
+    <p:sldId id="256" r:id="rId2"/>
+    <p:sldId id="257" r:id="rId3"/>
+    <p:sldId id="258" r:id="rId4"/>
+    <p:sldId id="259" r:id="rId5"/>
+    <p:sldId id="260" r:id="rId6"/>
+    <p:sldId id="261" r:id="rId7"/>
+    <p:sldId id="262" r:id="rId8"/>
+    <p:sldId id="263" r:id="rId9"/>
+    <p:sldId id="264" r:id="rId10"/>
   </p:sldIdLst>
-  <p:sldSz cy="5143500" cx="9144000"/>
+  <p:sldSz cx="9144000" cy="5143500" type="screen16x9"/>
   <p:notesSz cx="6858000" cy="9144000"/>
   <p:defaultTextStyle>
-    <a:defPPr lvl="0" marR="0" rtl="0" algn="l">
+    <a:defPPr marR="0" lvl="0" algn="l" rtl="0">
       <a:lnSpc>
         <a:spcPct val="100000"/>
       </a:lnSpc>
@@ -32,7 +32,7 @@
         <a:spcPts val="0"/>
       </a:spcAft>
     </a:defPPr>
-    <a:lvl1pPr lvl="0" marR="0" rtl="0" algn="l">
+    <a:lvl1pPr marR="0" lvl="0" algn="l" rtl="0">
       <a:lnSpc>
         <a:spcPct val="100000"/>
       </a:lnSpc>
@@ -46,7 +46,7 @@
         <a:srgbClr val="000000"/>
       </a:buClr>
       <a:buFont typeface="Arial"/>
-      <a:defRPr b="0" i="0" sz="1400" u="none" cap="none" strike="noStrike">
+      <a:defRPr sz="1400" b="0" i="0" u="none" strike="noStrike" cap="none">
         <a:solidFill>
           <a:srgbClr val="000000"/>
         </a:solidFill>
@@ -56,7 +56,7 @@
         <a:sym typeface="Arial"/>
       </a:defRPr>
     </a:lvl1pPr>
-    <a:lvl2pPr lvl="1" marR="0" rtl="0" algn="l">
+    <a:lvl2pPr marR="0" lvl="1" algn="l" rtl="0">
       <a:lnSpc>
         <a:spcPct val="100000"/>
       </a:lnSpc>
@@ -70,7 +70,7 @@
         <a:srgbClr val="000000"/>
       </a:buClr>
       <a:buFont typeface="Arial"/>
-      <a:defRPr b="0" i="0" sz="1400" u="none" cap="none" strike="noStrike">
+      <a:defRPr sz="1400" b="0" i="0" u="none" strike="noStrike" cap="none">
         <a:solidFill>
           <a:srgbClr val="000000"/>
         </a:solidFill>
@@ -80,7 +80,7 @@
         <a:sym typeface="Arial"/>
       </a:defRPr>
     </a:lvl2pPr>
-    <a:lvl3pPr lvl="2" marR="0" rtl="0" algn="l">
+    <a:lvl3pPr marR="0" lvl="2" algn="l" rtl="0">
       <a:lnSpc>
         <a:spcPct val="100000"/>
       </a:lnSpc>
@@ -94,7 +94,7 @@
         <a:srgbClr val="000000"/>
       </a:buClr>
       <a:buFont typeface="Arial"/>
-      <a:defRPr b="0" i="0" sz="1400" u="none" cap="none" strike="noStrike">
+      <a:defRPr sz="1400" b="0" i="0" u="none" strike="noStrike" cap="none">
         <a:solidFill>
           <a:srgbClr val="000000"/>
         </a:solidFill>
@@ -104,7 +104,7 @@
         <a:sym typeface="Arial"/>
       </a:defRPr>
     </a:lvl3pPr>
-    <a:lvl4pPr lvl="3" marR="0" rtl="0" algn="l">
+    <a:lvl4pPr marR="0" lvl="3" algn="l" rtl="0">
       <a:lnSpc>
         <a:spcPct val="100000"/>
       </a:lnSpc>
@@ -118,7 +118,7 @@
         <a:srgbClr val="000000"/>
       </a:buClr>
       <a:buFont typeface="Arial"/>
-      <a:defRPr b="0" i="0" sz="1400" u="none" cap="none" strike="noStrike">
+      <a:defRPr sz="1400" b="0" i="0" u="none" strike="noStrike" cap="none">
         <a:solidFill>
           <a:srgbClr val="000000"/>
         </a:solidFill>
@@ -128,7 +128,7 @@
         <a:sym typeface="Arial"/>
       </a:defRPr>
     </a:lvl4pPr>
-    <a:lvl5pPr lvl="4" marR="0" rtl="0" algn="l">
+    <a:lvl5pPr marR="0" lvl="4" algn="l" rtl="0">
       <a:lnSpc>
         <a:spcPct val="100000"/>
       </a:lnSpc>
@@ -142,7 +142,7 @@
         <a:srgbClr val="000000"/>
       </a:buClr>
       <a:buFont typeface="Arial"/>
-      <a:defRPr b="0" i="0" sz="1400" u="none" cap="none" strike="noStrike">
+      <a:defRPr sz="1400" b="0" i="0" u="none" strike="noStrike" cap="none">
         <a:solidFill>
           <a:srgbClr val="000000"/>
         </a:solidFill>
@@ -152,7 +152,7 @@
         <a:sym typeface="Arial"/>
       </a:defRPr>
     </a:lvl5pPr>
-    <a:lvl6pPr lvl="5" marR="0" rtl="0" algn="l">
+    <a:lvl6pPr marR="0" lvl="5" algn="l" rtl="0">
       <a:lnSpc>
         <a:spcPct val="100000"/>
       </a:lnSpc>
@@ -166,7 +166,7 @@
         <a:srgbClr val="000000"/>
       </a:buClr>
       <a:buFont typeface="Arial"/>
-      <a:defRPr b="0" i="0" sz="1400" u="none" cap="none" strike="noStrike">
+      <a:defRPr sz="1400" b="0" i="0" u="none" strike="noStrike" cap="none">
         <a:solidFill>
           <a:srgbClr val="000000"/>
         </a:solidFill>
@@ -176,7 +176,7 @@
         <a:sym typeface="Arial"/>
       </a:defRPr>
     </a:lvl6pPr>
-    <a:lvl7pPr lvl="6" marR="0" rtl="0" algn="l">
+    <a:lvl7pPr marR="0" lvl="6" algn="l" rtl="0">
       <a:lnSpc>
         <a:spcPct val="100000"/>
       </a:lnSpc>
@@ -190,7 +190,7 @@
         <a:srgbClr val="000000"/>
       </a:buClr>
       <a:buFont typeface="Arial"/>
-      <a:defRPr b="0" i="0" sz="1400" u="none" cap="none" strike="noStrike">
+      <a:defRPr sz="1400" b="0" i="0" u="none" strike="noStrike" cap="none">
         <a:solidFill>
           <a:srgbClr val="000000"/>
         </a:solidFill>
@@ -200,7 +200,7 @@
         <a:sym typeface="Arial"/>
       </a:defRPr>
     </a:lvl7pPr>
-    <a:lvl8pPr lvl="7" marR="0" rtl="0" algn="l">
+    <a:lvl8pPr marR="0" lvl="7" algn="l" rtl="0">
       <a:lnSpc>
         <a:spcPct val="100000"/>
       </a:lnSpc>
@@ -214,7 +214,7 @@
         <a:srgbClr val="000000"/>
       </a:buClr>
       <a:buFont typeface="Arial"/>
-      <a:defRPr b="0" i="0" sz="1400" u="none" cap="none" strike="noStrike">
+      <a:defRPr sz="1400" b="0" i="0" u="none" strike="noStrike" cap="none">
         <a:solidFill>
           <a:srgbClr val="000000"/>
         </a:solidFill>
@@ -224,7 +224,7 @@
         <a:sym typeface="Arial"/>
       </a:defRPr>
     </a:lvl8pPr>
-    <a:lvl9pPr lvl="8" marR="0" rtl="0" algn="l">
+    <a:lvl9pPr marR="0" lvl="8" algn="l" rtl="0">
       <a:lnSpc>
         <a:spcPct val="100000"/>
       </a:lnSpc>
@@ -238,7 +238,7 @@
         <a:srgbClr val="000000"/>
       </a:buClr>
       <a:buFont typeface="Arial"/>
-      <a:defRPr b="0" i="0" sz="1400" u="none" cap="none" strike="noStrike">
+      <a:defRPr sz="1400" b="0" i="0" u="none" strike="noStrike" cap="none">
         <a:solidFill>
           <a:srgbClr val="000000"/>
         </a:solidFill>
@@ -251,7 +251,7 @@
   </p:defaultTextStyle>
   <p:extLst>
     <p:ext uri="{EFAFB233-063F-42B5-8137-9DF3F51BA10A}">
-      <p15:sldGuideLst>
+      <p15:sldGuideLst xmlns:p15="http://schemas.microsoft.com/office/powerpoint/2012/main">
         <p15:guide id="1" orient="horz" pos="1620">
           <p15:clr>
             <a:srgbClr val="747775"/>
@@ -268,12 +268,84 @@
 </p:presentation>
 </file>
 
+<file path=ppt/changesInfos/changesInfo1.xml><?xml version="1.0" encoding="utf-8"?>
+<pc:chgInfo xmlns:a="http://schemas.openxmlformats.org/drawingml/2006/main" xmlns:r="http://schemas.openxmlformats.org/officeDocument/2006/relationships" xmlns:ac="http://schemas.microsoft.com/office/drawing/2013/main/command" xmlns:pc="http://schemas.microsoft.com/office/powerpoint/2013/main/command">
+  <pc:docChgLst>
+    <pc:chgData name="Biman Mondal" userId="e7af0a37e2f92dc8" providerId="LiveId" clId="{BE6554F9-9E01-4065-A54C-2846A98C0196}"/>
+    <pc:docChg chg="custSel modSld">
+      <pc:chgData name="Biman Mondal" userId="e7af0a37e2f92dc8" providerId="LiveId" clId="{BE6554F9-9E01-4065-A54C-2846A98C0196}" dt="2025-01-29T21:55:23.996" v="155" actId="1076"/>
+      <pc:docMkLst>
+        <pc:docMk/>
+      </pc:docMkLst>
+      <pc:sldChg chg="modSp mod">
+        <pc:chgData name="Biman Mondal" userId="e7af0a37e2f92dc8" providerId="LiveId" clId="{BE6554F9-9E01-4065-A54C-2846A98C0196}" dt="2025-01-29T21:52:45.591" v="9" actId="20577"/>
+        <pc:sldMkLst>
+          <pc:docMk/>
+          <pc:sldMk cId="0" sldId="261"/>
+        </pc:sldMkLst>
+        <pc:spChg chg="mod">
+          <ac:chgData name="Biman Mondal" userId="e7af0a37e2f92dc8" providerId="LiveId" clId="{BE6554F9-9E01-4065-A54C-2846A98C0196}" dt="2025-01-29T21:52:45.591" v="9" actId="20577"/>
+          <ac:spMkLst>
+            <pc:docMk/>
+            <pc:sldMk cId="0" sldId="261"/>
+            <ac:spMk id="86" creationId="{00000000-0000-0000-0000-000000000000}"/>
+          </ac:spMkLst>
+        </pc:spChg>
+      </pc:sldChg>
+      <pc:sldChg chg="modSp mod">
+        <pc:chgData name="Biman Mondal" userId="e7af0a37e2f92dc8" providerId="LiveId" clId="{BE6554F9-9E01-4065-A54C-2846A98C0196}" dt="2025-01-29T21:53:26.878" v="38" actId="20577"/>
+        <pc:sldMkLst>
+          <pc:docMk/>
+          <pc:sldMk cId="0" sldId="262"/>
+        </pc:sldMkLst>
+        <pc:spChg chg="mod">
+          <ac:chgData name="Biman Mondal" userId="e7af0a37e2f92dc8" providerId="LiveId" clId="{BE6554F9-9E01-4065-A54C-2846A98C0196}" dt="2025-01-29T21:53:26.878" v="38" actId="20577"/>
+          <ac:spMkLst>
+            <pc:docMk/>
+            <pc:sldMk cId="0" sldId="262"/>
+            <ac:spMk id="92" creationId="{00000000-0000-0000-0000-000000000000}"/>
+          </ac:spMkLst>
+        </pc:spChg>
+      </pc:sldChg>
+      <pc:sldChg chg="modSp mod">
+        <pc:chgData name="Biman Mondal" userId="e7af0a37e2f92dc8" providerId="LiveId" clId="{BE6554F9-9E01-4065-A54C-2846A98C0196}" dt="2025-01-29T21:55:23.996" v="155" actId="1076"/>
+        <pc:sldMkLst>
+          <pc:docMk/>
+          <pc:sldMk cId="0" sldId="264"/>
+        </pc:sldMkLst>
+        <pc:spChg chg="mod">
+          <ac:chgData name="Biman Mondal" userId="e7af0a37e2f92dc8" providerId="LiveId" clId="{BE6554F9-9E01-4065-A54C-2846A98C0196}" dt="2025-01-29T21:55:21.260" v="154" actId="27636"/>
+          <ac:spMkLst>
+            <pc:docMk/>
+            <pc:sldMk cId="0" sldId="264"/>
+            <ac:spMk id="108" creationId="{00000000-0000-0000-0000-000000000000}"/>
+          </ac:spMkLst>
+        </pc:spChg>
+        <pc:picChg chg="mod">
+          <ac:chgData name="Biman Mondal" userId="e7af0a37e2f92dc8" providerId="LiveId" clId="{BE6554F9-9E01-4065-A54C-2846A98C0196}" dt="2025-01-29T21:55:23.996" v="155" actId="1076"/>
+          <ac:picMkLst>
+            <pc:docMk/>
+            <pc:sldMk cId="0" sldId="264"/>
+            <ac:picMk id="107" creationId="{00000000-0000-0000-0000-000000000000}"/>
+          </ac:picMkLst>
+        </pc:picChg>
+      </pc:sldChg>
+    </pc:docChg>
+  </pc:docChgLst>
+</pc:chgInfo>
+</file>
+
 <file path=ppt/notesMasters/notesMaster1.xml><?xml version="1.0" encoding="utf-8"?>
-<p:notesMaster xmlns:a="http://schemas.openxmlformats.org/drawingml/2006/main" xmlns:r="http://schemas.openxmlformats.org/officeDocument/2006/relationships" xmlns:mc="http://schemas.openxmlformats.org/markup-compatibility/2006" xmlns:mv="urn:schemas-microsoft-com:mac:vml" xmlns:p="http://schemas.openxmlformats.org/presentationml/2006/main" xmlns:c="http://schemas.openxmlformats.org/drawingml/2006/chart" xmlns:dgm="http://schemas.openxmlformats.org/drawingml/2006/diagram" xmlns:o="urn:schemas-microsoft-com:office:office" xmlns:v="urn:schemas-microsoft-com:vml" xmlns:pvml="urn:schemas-microsoft-com:office:powerpoint" xmlns:com="http://schemas.openxmlformats.org/drawingml/2006/compatibility" xmlns:p14="http://schemas.microsoft.com/office/powerpoint/2010/main" xmlns:p15="http://schemas.microsoft.com/office/powerpoint/2012/main" xmlns:ahyp="http://schemas.microsoft.com/office/drawing/2018/hyperlinkcolor">
+<p:notesMaster xmlns:a="http://schemas.openxmlformats.org/drawingml/2006/main" xmlns:r="http://schemas.openxmlformats.org/officeDocument/2006/relationships" xmlns:p="http://schemas.openxmlformats.org/presentationml/2006/main">
   <p:cSld>
+    <p:bg>
+      <p:bgRef idx="1001">
+        <a:schemeClr val="bg1"/>
+      </p:bgRef>
+    </p:bg>
     <p:spTree>
       <p:nvGrpSpPr>
-        <p:cNvPr id="2" name="Shape 2"/>
+        <p:cNvPr id="1" name="Shape 2"/>
         <p:cNvGrpSpPr/>
         <p:nvPr/>
       </p:nvGrpSpPr>
@@ -288,9 +360,11 @@
       <p:sp>
         <p:nvSpPr>
           <p:cNvPr id="3" name="Google Shape;3;n"/>
-          <p:cNvSpPr/>
+          <p:cNvSpPr>
+            <a:spLocks noGrp="1" noRot="1" noChangeAspect="1"/>
+          </p:cNvSpPr>
           <p:nvPr>
-            <p:ph idx="2" type="sldImg"/>
+            <p:ph type="sldImg" idx="2"/>
           </p:nvPr>
         </p:nvSpPr>
         <p:spPr>
@@ -299,9 +373,13 @@
             <a:ext cx="6096075" cy="3429000"/>
           </a:xfrm>
           <a:custGeom>
-            <a:rect b="b" l="l" r="r" t="t"/>
+            <a:avLst/>
+            <a:gdLst/>
+            <a:ahLst/>
+            <a:cxnLst/>
+            <a:rect l="l" t="t" r="r" b="b"/>
             <a:pathLst>
-              <a:path extrusionOk="0" h="120000" w="120000">
+              <a:path w="120000" h="120000" extrusionOk="0">
                 <a:moveTo>
                   <a:pt x="0" y="0"/>
                 </a:moveTo>
@@ -319,23 +397,25 @@
             </a:pathLst>
           </a:custGeom>
           <a:noFill/>
-          <a:ln cap="flat" cmpd="sng" w="9525">
+          <a:ln w="9525" cap="flat" cmpd="sng">
             <a:solidFill>
               <a:srgbClr val="000000"/>
             </a:solidFill>
             <a:prstDash val="solid"/>
             <a:round/>
-            <a:headEnd len="sm" w="sm" type="none"/>
-            <a:tailEnd len="sm" w="sm" type="none"/>
+            <a:headEnd type="none" w="sm" len="sm"/>
+            <a:tailEnd type="none" w="sm" len="sm"/>
           </a:ln>
         </p:spPr>
       </p:sp>
       <p:sp>
         <p:nvSpPr>
           <p:cNvPr id="4" name="Google Shape;4;n"/>
-          <p:cNvSpPr txBox="1"/>
+          <p:cNvSpPr txBox="1">
+            <a:spLocks noGrp="1"/>
+          </p:cNvSpPr>
           <p:nvPr>
-            <p:ph idx="1" type="body"/>
+            <p:ph type="body" idx="1"/>
           </p:nvPr>
         </p:nvSpPr>
         <p:spPr>
@@ -352,11 +432,11 @@
           </a:ln>
         </p:spPr>
         <p:txBody>
-          <a:bodyPr anchorCtr="0" anchor="t" bIns="91425" lIns="91425" spcFirstLastPara="1" rIns="91425" wrap="square" tIns="91425">
+          <a:bodyPr spcFirstLastPara="1" wrap="square" lIns="91425" tIns="91425" rIns="91425" bIns="91425" anchor="t" anchorCtr="0">
             <a:noAutofit/>
           </a:bodyPr>
           <a:lstStyle>
-            <a:lvl1pPr indent="-298450" lvl="0" marL="457200">
+            <a:lvl1pPr marL="457200" lvl="0" indent="-298450">
               <a:spcBef>
                 <a:spcPts val="0"/>
               </a:spcBef>
@@ -367,7 +447,7 @@
               <a:buChar char="●"/>
               <a:defRPr sz="1100"/>
             </a:lvl1pPr>
-            <a:lvl2pPr indent="-298450" lvl="1" marL="914400">
+            <a:lvl2pPr marL="914400" lvl="1" indent="-298450">
               <a:spcBef>
                 <a:spcPts val="0"/>
               </a:spcBef>
@@ -378,7 +458,7 @@
               <a:buChar char="○"/>
               <a:defRPr sz="1100"/>
             </a:lvl2pPr>
-            <a:lvl3pPr indent="-298450" lvl="2" marL="1371600">
+            <a:lvl3pPr marL="1371600" lvl="2" indent="-298450">
               <a:spcBef>
                 <a:spcPts val="0"/>
               </a:spcBef>
@@ -389,7 +469,7 @@
               <a:buChar char="■"/>
               <a:defRPr sz="1100"/>
             </a:lvl3pPr>
-            <a:lvl4pPr indent="-298450" lvl="3" marL="1828800">
+            <a:lvl4pPr marL="1828800" lvl="3" indent="-298450">
               <a:spcBef>
                 <a:spcPts val="0"/>
               </a:spcBef>
@@ -400,7 +480,7 @@
               <a:buChar char="●"/>
               <a:defRPr sz="1100"/>
             </a:lvl4pPr>
-            <a:lvl5pPr indent="-298450" lvl="4" marL="2286000">
+            <a:lvl5pPr marL="2286000" lvl="4" indent="-298450">
               <a:spcBef>
                 <a:spcPts val="0"/>
               </a:spcBef>
@@ -411,7 +491,7 @@
               <a:buChar char="○"/>
               <a:defRPr sz="1100"/>
             </a:lvl5pPr>
-            <a:lvl6pPr indent="-298450" lvl="5" marL="2743200">
+            <a:lvl6pPr marL="2743200" lvl="5" indent="-298450">
               <a:spcBef>
                 <a:spcPts val="0"/>
               </a:spcBef>
@@ -422,7 +502,7 @@
               <a:buChar char="■"/>
               <a:defRPr sz="1100"/>
             </a:lvl6pPr>
-            <a:lvl7pPr indent="-298450" lvl="6" marL="3200400">
+            <a:lvl7pPr marL="3200400" lvl="6" indent="-298450">
               <a:spcBef>
                 <a:spcPts val="0"/>
               </a:spcBef>
@@ -433,7 +513,7 @@
               <a:buChar char="●"/>
               <a:defRPr sz="1100"/>
             </a:lvl7pPr>
-            <a:lvl8pPr indent="-298450" lvl="7" marL="3657600">
+            <a:lvl8pPr marL="3657600" lvl="7" indent="-298450">
               <a:spcBef>
                 <a:spcPts val="0"/>
               </a:spcBef>
@@ -444,7 +524,7 @@
               <a:buChar char="○"/>
               <a:defRPr sz="1100"/>
             </a:lvl8pPr>
-            <a:lvl9pPr indent="-298450" lvl="8" marL="4114800">
+            <a:lvl9pPr marL="4114800" lvl="8" indent="-298450">
               <a:spcBef>
                 <a:spcPts val="0"/>
               </a:spcBef>
@@ -456,14 +536,16 @@
               <a:defRPr sz="1100"/>
             </a:lvl9pPr>
           </a:lstStyle>
-          <a:p/>
+          <a:p>
+            <a:endParaRPr/>
+          </a:p>
         </p:txBody>
       </p:sp>
     </p:spTree>
   </p:cSld>
-  <p:clrMap accent1="accent1" accent2="accent2" accent3="accent3" accent4="accent4" accent5="accent5" accent6="accent6" bg1="lt1" bg2="dk2" tx1="dk1" tx2="lt2" folHlink="folHlink" hlink="hlink"/>
+  <p:clrMap bg1="lt1" tx1="dk1" bg2="dk2" tx2="lt2" accent1="accent1" accent2="accent2" accent3="accent3" accent4="accent4" accent5="accent5" accent6="accent6" hlink="hlink" folHlink="folHlink"/>
   <p:notesStyle>
-    <a:defPPr lvl="0" marR="0" rtl="0" algn="l">
+    <a:defPPr marR="0" lvl="0" algn="l" rtl="0">
       <a:lnSpc>
         <a:spcPct val="100000"/>
       </a:lnSpc>
@@ -474,7 +556,7 @@
         <a:spcPts val="0"/>
       </a:spcAft>
     </a:defPPr>
-    <a:lvl1pPr lvl="0" marR="0" rtl="0" algn="l">
+    <a:lvl1pPr marR="0" lvl="0" algn="l" rtl="0">
       <a:lnSpc>
         <a:spcPct val="100000"/>
       </a:lnSpc>
@@ -488,7 +570,7 @@
         <a:srgbClr val="000000"/>
       </a:buClr>
       <a:buFont typeface="Arial"/>
-      <a:defRPr b="0" i="0" sz="1400" u="none" cap="none" strike="noStrike">
+      <a:defRPr sz="1400" b="0" i="0" u="none" strike="noStrike" cap="none">
         <a:solidFill>
           <a:srgbClr val="000000"/>
         </a:solidFill>
@@ -498,7 +580,7 @@
         <a:sym typeface="Arial"/>
       </a:defRPr>
     </a:lvl1pPr>
-    <a:lvl2pPr lvl="1" marR="0" rtl="0" algn="l">
+    <a:lvl2pPr marR="0" lvl="1" algn="l" rtl="0">
       <a:lnSpc>
         <a:spcPct val="100000"/>
       </a:lnSpc>
@@ -512,7 +594,7 @@
         <a:srgbClr val="000000"/>
       </a:buClr>
       <a:buFont typeface="Arial"/>
-      <a:defRPr b="0" i="0" sz="1400" u="none" cap="none" strike="noStrike">
+      <a:defRPr sz="1400" b="0" i="0" u="none" strike="noStrike" cap="none">
         <a:solidFill>
           <a:srgbClr val="000000"/>
         </a:solidFill>
@@ -522,7 +604,7 @@
         <a:sym typeface="Arial"/>
       </a:defRPr>
     </a:lvl2pPr>
-    <a:lvl3pPr lvl="2" marR="0" rtl="0" algn="l">
+    <a:lvl3pPr marR="0" lvl="2" algn="l" rtl="0">
       <a:lnSpc>
         <a:spcPct val="100000"/>
       </a:lnSpc>
@@ -536,7 +618,7 @@
         <a:srgbClr val="000000"/>
       </a:buClr>
       <a:buFont typeface="Arial"/>
-      <a:defRPr b="0" i="0" sz="1400" u="none" cap="none" strike="noStrike">
+      <a:defRPr sz="1400" b="0" i="0" u="none" strike="noStrike" cap="none">
         <a:solidFill>
           <a:srgbClr val="000000"/>
         </a:solidFill>
@@ -546,7 +628,7 @@
         <a:sym typeface="Arial"/>
       </a:defRPr>
     </a:lvl3pPr>
-    <a:lvl4pPr lvl="3" marR="0" rtl="0" algn="l">
+    <a:lvl4pPr marR="0" lvl="3" algn="l" rtl="0">
       <a:lnSpc>
         <a:spcPct val="100000"/>
       </a:lnSpc>
@@ -560,7 +642,7 @@
         <a:srgbClr val="000000"/>
       </a:buClr>
       <a:buFont typeface="Arial"/>
-      <a:defRPr b="0" i="0" sz="1400" u="none" cap="none" strike="noStrike">
+      <a:defRPr sz="1400" b="0" i="0" u="none" strike="noStrike" cap="none">
         <a:solidFill>
           <a:srgbClr val="000000"/>
         </a:solidFill>
@@ -570,7 +652,7 @@
         <a:sym typeface="Arial"/>
       </a:defRPr>
     </a:lvl4pPr>
-    <a:lvl5pPr lvl="4" marR="0" rtl="0" algn="l">
+    <a:lvl5pPr marR="0" lvl="4" algn="l" rtl="0">
       <a:lnSpc>
         <a:spcPct val="100000"/>
       </a:lnSpc>
@@ -584,7 +666,7 @@
         <a:srgbClr val="000000"/>
       </a:buClr>
       <a:buFont typeface="Arial"/>
-      <a:defRPr b="0" i="0" sz="1400" u="none" cap="none" strike="noStrike">
+      <a:defRPr sz="1400" b="0" i="0" u="none" strike="noStrike" cap="none">
         <a:solidFill>
           <a:srgbClr val="000000"/>
         </a:solidFill>
@@ -594,7 +676,7 @@
         <a:sym typeface="Arial"/>
       </a:defRPr>
     </a:lvl5pPr>
-    <a:lvl6pPr lvl="5" marR="0" rtl="0" algn="l">
+    <a:lvl6pPr marR="0" lvl="5" algn="l" rtl="0">
       <a:lnSpc>
         <a:spcPct val="100000"/>
       </a:lnSpc>
@@ -608,7 +690,7 @@
         <a:srgbClr val="000000"/>
       </a:buClr>
       <a:buFont typeface="Arial"/>
-      <a:defRPr b="0" i="0" sz="1400" u="none" cap="none" strike="noStrike">
+      <a:defRPr sz="1400" b="0" i="0" u="none" strike="noStrike" cap="none">
         <a:solidFill>
           <a:srgbClr val="000000"/>
         </a:solidFill>
@@ -618,7 +700,7 @@
         <a:sym typeface="Arial"/>
       </a:defRPr>
     </a:lvl6pPr>
-    <a:lvl7pPr lvl="6" marR="0" rtl="0" algn="l">
+    <a:lvl7pPr marR="0" lvl="6" algn="l" rtl="0">
       <a:lnSpc>
         <a:spcPct val="100000"/>
       </a:lnSpc>
@@ -632,7 +714,7 @@
         <a:srgbClr val="000000"/>
       </a:buClr>
       <a:buFont typeface="Arial"/>
-      <a:defRPr b="0" i="0" sz="1400" u="none" cap="none" strike="noStrike">
+      <a:defRPr sz="1400" b="0" i="0" u="none" strike="noStrike" cap="none">
         <a:solidFill>
           <a:srgbClr val="000000"/>
         </a:solidFill>
@@ -642,7 +724,7 @@
         <a:sym typeface="Arial"/>
       </a:defRPr>
     </a:lvl7pPr>
-    <a:lvl8pPr lvl="7" marR="0" rtl="0" algn="l">
+    <a:lvl8pPr marR="0" lvl="7" algn="l" rtl="0">
       <a:lnSpc>
         <a:spcPct val="100000"/>
       </a:lnSpc>
@@ -656,7 +738,7 @@
         <a:srgbClr val="000000"/>
       </a:buClr>
       <a:buFont typeface="Arial"/>
-      <a:defRPr b="0" i="0" sz="1400" u="none" cap="none" strike="noStrike">
+      <a:defRPr sz="1400" b="0" i="0" u="none" strike="noStrike" cap="none">
         <a:solidFill>
           <a:srgbClr val="000000"/>
         </a:solidFill>
@@ -666,7 +748,7 @@
         <a:sym typeface="Arial"/>
       </a:defRPr>
     </a:lvl8pPr>
-    <a:lvl9pPr lvl="8" marR="0" rtl="0" algn="l">
+    <a:lvl9pPr marR="0" lvl="8" algn="l" rtl="0">
       <a:lnSpc>
         <a:spcPct val="100000"/>
       </a:lnSpc>
@@ -680,7 +762,7 @@
         <a:srgbClr val="000000"/>
       </a:buClr>
       <a:buFont typeface="Arial"/>
-      <a:defRPr b="0" i="0" sz="1400" u="none" cap="none" strike="noStrike">
+      <a:defRPr sz="1400" b="0" i="0" u="none" strike="noStrike" cap="none">
         <a:solidFill>
           <a:srgbClr val="000000"/>
         </a:solidFill>
@@ -695,11 +777,11 @@
 </file>
 
 <file path=ppt/notesSlides/notesSlide1.xml><?xml version="1.0" encoding="utf-8"?>
-<p:notes xmlns:a="http://schemas.openxmlformats.org/drawingml/2006/main" xmlns:r="http://schemas.openxmlformats.org/officeDocument/2006/relationships" xmlns:mc="http://schemas.openxmlformats.org/markup-compatibility/2006" xmlns:mv="urn:schemas-microsoft-com:mac:vml" xmlns:p="http://schemas.openxmlformats.org/presentationml/2006/main" xmlns:c="http://schemas.openxmlformats.org/drawingml/2006/chart" xmlns:dgm="http://schemas.openxmlformats.org/drawingml/2006/diagram" xmlns:o="urn:schemas-microsoft-com:office:office" xmlns:v="urn:schemas-microsoft-com:vml" xmlns:pvml="urn:schemas-microsoft-com:office:powerpoint" xmlns:com="http://schemas.openxmlformats.org/drawingml/2006/compatibility" xmlns:p14="http://schemas.microsoft.com/office/powerpoint/2010/main" xmlns:p15="http://schemas.microsoft.com/office/powerpoint/2012/main" xmlns:ahyp="http://schemas.microsoft.com/office/drawing/2018/hyperlinkcolor" showMasterPhAnim="0" showMasterSp="0">
+<p:notes xmlns:a="http://schemas.openxmlformats.org/drawingml/2006/main" xmlns:r="http://schemas.openxmlformats.org/officeDocument/2006/relationships" xmlns:p="http://schemas.openxmlformats.org/presentationml/2006/main" showMasterSp="0" showMasterPhAnim="0">
   <p:cSld>
     <p:spTree>
       <p:nvGrpSpPr>
-        <p:cNvPr id="50" name="Shape 50"/>
+        <p:cNvPr id="1" name="Shape 50"/>
         <p:cNvGrpSpPr/>
         <p:nvPr/>
       </p:nvGrpSpPr>
@@ -714,9 +796,11 @@
       <p:sp>
         <p:nvSpPr>
           <p:cNvPr id="51" name="Google Shape;51;p:notes"/>
-          <p:cNvSpPr/>
+          <p:cNvSpPr>
+            <a:spLocks noGrp="1" noRot="1" noChangeAspect="1"/>
+          </p:cNvSpPr>
           <p:nvPr>
-            <p:ph idx="2" type="sldImg"/>
+            <p:ph type="sldImg" idx="2"/>
           </p:nvPr>
         </p:nvSpPr>
         <p:spPr>
@@ -725,9 +809,13 @@
             <a:ext cx="6096075" cy="3429000"/>
           </a:xfrm>
           <a:custGeom>
-            <a:rect b="b" l="l" r="r" t="t"/>
+            <a:avLst/>
+            <a:gdLst/>
+            <a:ahLst/>
+            <a:cxnLst/>
+            <a:rect l="l" t="t" r="r" b="b"/>
             <a:pathLst>
-              <a:path extrusionOk="0" h="120000" w="120000">
+              <a:path w="120000" h="120000" extrusionOk="0">
                 <a:moveTo>
                   <a:pt x="0" y="0"/>
                 </a:moveTo>
@@ -749,9 +837,11 @@
       <p:sp>
         <p:nvSpPr>
           <p:cNvPr id="52" name="Google Shape;52;p:notes"/>
-          <p:cNvSpPr txBox="1"/>
+          <p:cNvSpPr txBox="1">
+            <a:spLocks noGrp="1"/>
+          </p:cNvSpPr>
           <p:nvPr>
-            <p:ph idx="1" type="body"/>
+            <p:ph type="body" idx="1"/>
           </p:nvPr>
         </p:nvSpPr>
         <p:spPr>
@@ -764,12 +854,12 @@
           </a:prstGeom>
         </p:spPr>
         <p:txBody>
-          <a:bodyPr anchorCtr="0" anchor="t" bIns="91425" lIns="91425" spcFirstLastPara="1" rIns="91425" wrap="square" tIns="91425">
+          <a:bodyPr spcFirstLastPara="1" wrap="square" lIns="91425" tIns="91425" rIns="91425" bIns="91425" anchor="t" anchorCtr="0">
             <a:noAutofit/>
           </a:bodyPr>
           <a:lstStyle/>
           <a:p>
-            <a:pPr indent="0" lvl="0" marL="0" rtl="0" algn="l">
+            <a:pPr marL="0" lvl="0" indent="0" algn="l" rtl="0">
               <a:spcBef>
                 <a:spcPts val="0"/>
               </a:spcBef>
@@ -778,9 +868,6 @@
               </a:spcAft>
               <a:buNone/>
             </a:pPr>
-            <a:r>
-              <a:t/>
-            </a:r>
             <a:endParaRPr/>
           </a:p>
         </p:txBody>
@@ -794,11 +881,11 @@
 </file>
 
 <file path=ppt/notesSlides/notesSlide2.xml><?xml version="1.0" encoding="utf-8"?>
-<p:notes xmlns:a="http://schemas.openxmlformats.org/drawingml/2006/main" xmlns:r="http://schemas.openxmlformats.org/officeDocument/2006/relationships" xmlns:mc="http://schemas.openxmlformats.org/markup-compatibility/2006" xmlns:mv="urn:schemas-microsoft-com:mac:vml" xmlns:p="http://schemas.openxmlformats.org/presentationml/2006/main" xmlns:c="http://schemas.openxmlformats.org/drawingml/2006/chart" xmlns:dgm="http://schemas.openxmlformats.org/drawingml/2006/diagram" xmlns:o="urn:schemas-microsoft-com:office:office" xmlns:v="urn:schemas-microsoft-com:vml" xmlns:pvml="urn:schemas-microsoft-com:office:powerpoint" xmlns:com="http://schemas.openxmlformats.org/drawingml/2006/compatibility" xmlns:p14="http://schemas.microsoft.com/office/powerpoint/2010/main" xmlns:p15="http://schemas.microsoft.com/office/powerpoint/2012/main" xmlns:ahyp="http://schemas.microsoft.com/office/drawing/2018/hyperlinkcolor" showMasterPhAnim="0" showMasterSp="0">
+<p:notes xmlns:a="http://schemas.openxmlformats.org/drawingml/2006/main" xmlns:r="http://schemas.openxmlformats.org/officeDocument/2006/relationships" xmlns:p="http://schemas.openxmlformats.org/presentationml/2006/main" showMasterSp="0" showMasterPhAnim="0">
   <p:cSld>
     <p:spTree>
       <p:nvGrpSpPr>
-        <p:cNvPr id="56" name="Shape 56"/>
+        <p:cNvPr id="1" name="Shape 56"/>
         <p:cNvGrpSpPr/>
         <p:nvPr/>
       </p:nvGrpSpPr>
@@ -813,9 +900,11 @@
       <p:sp>
         <p:nvSpPr>
           <p:cNvPr id="57" name="Google Shape;57;g32ae3591859_0_0:notes"/>
-          <p:cNvSpPr/>
+          <p:cNvSpPr>
+            <a:spLocks noGrp="1" noRot="1" noChangeAspect="1"/>
+          </p:cNvSpPr>
           <p:nvPr>
-            <p:ph idx="2" type="sldImg"/>
+            <p:ph type="sldImg" idx="2"/>
           </p:nvPr>
         </p:nvSpPr>
         <p:spPr>
@@ -824,9 +913,13 @@
             <a:ext cx="6096000" cy="3429000"/>
           </a:xfrm>
           <a:custGeom>
-            <a:rect b="b" l="l" r="r" t="t"/>
+            <a:avLst/>
+            <a:gdLst/>
+            <a:ahLst/>
+            <a:cxnLst/>
+            <a:rect l="l" t="t" r="r" b="b"/>
             <a:pathLst>
-              <a:path extrusionOk="0" h="120000" w="120000">
+              <a:path w="120000" h="120000" extrusionOk="0">
                 <a:moveTo>
                   <a:pt x="0" y="0"/>
                 </a:moveTo>
@@ -848,9 +941,11 @@
       <p:sp>
         <p:nvSpPr>
           <p:cNvPr id="58" name="Google Shape;58;g32ae3591859_0_0:notes"/>
-          <p:cNvSpPr txBox="1"/>
+          <p:cNvSpPr txBox="1">
+            <a:spLocks noGrp="1"/>
+          </p:cNvSpPr>
           <p:nvPr>
-            <p:ph idx="1" type="body"/>
+            <p:ph type="body" idx="1"/>
           </p:nvPr>
         </p:nvSpPr>
         <p:spPr>
@@ -863,12 +958,12 @@
           </a:prstGeom>
         </p:spPr>
         <p:txBody>
-          <a:bodyPr anchorCtr="0" anchor="t" bIns="91425" lIns="91425" spcFirstLastPara="1" rIns="91425" wrap="square" tIns="91425">
+          <a:bodyPr spcFirstLastPara="1" wrap="square" lIns="91425" tIns="91425" rIns="91425" bIns="91425" anchor="t" anchorCtr="0">
             <a:noAutofit/>
           </a:bodyPr>
           <a:lstStyle/>
           <a:p>
-            <a:pPr indent="0" lvl="0" marL="0" rtl="0" algn="l">
+            <a:pPr marL="0" lvl="0" indent="0" algn="l" rtl="0">
               <a:spcBef>
                 <a:spcPts val="0"/>
               </a:spcBef>
@@ -877,9 +972,6 @@
               </a:spcAft>
               <a:buNone/>
             </a:pPr>
-            <a:r>
-              <a:t/>
-            </a:r>
             <a:endParaRPr/>
           </a:p>
         </p:txBody>
@@ -893,11 +985,11 @@
 </file>
 
 <file path=ppt/notesSlides/notesSlide3.xml><?xml version="1.0" encoding="utf-8"?>
-<p:notes xmlns:a="http://schemas.openxmlformats.org/drawingml/2006/main" xmlns:r="http://schemas.openxmlformats.org/officeDocument/2006/relationships" xmlns:mc="http://schemas.openxmlformats.org/markup-compatibility/2006" xmlns:mv="urn:schemas-microsoft-com:mac:vml" xmlns:p="http://schemas.openxmlformats.org/presentationml/2006/main" xmlns:c="http://schemas.openxmlformats.org/drawingml/2006/chart" xmlns:dgm="http://schemas.openxmlformats.org/drawingml/2006/diagram" xmlns:o="urn:schemas-microsoft-com:office:office" xmlns:v="urn:schemas-microsoft-com:vml" xmlns:pvml="urn:schemas-microsoft-com:office:powerpoint" xmlns:com="http://schemas.openxmlformats.org/drawingml/2006/compatibility" xmlns:p14="http://schemas.microsoft.com/office/powerpoint/2010/main" xmlns:p15="http://schemas.microsoft.com/office/powerpoint/2012/main" xmlns:ahyp="http://schemas.microsoft.com/office/drawing/2018/hyperlinkcolor" showMasterPhAnim="0" showMasterSp="0">
+<p:notes xmlns:a="http://schemas.openxmlformats.org/drawingml/2006/main" xmlns:r="http://schemas.openxmlformats.org/officeDocument/2006/relationships" xmlns:p="http://schemas.openxmlformats.org/presentationml/2006/main" showMasterSp="0" showMasterPhAnim="0">
   <p:cSld>
     <p:spTree>
       <p:nvGrpSpPr>
-        <p:cNvPr id="62" name="Shape 62"/>
+        <p:cNvPr id="1" name="Shape 62"/>
         <p:cNvGrpSpPr/>
         <p:nvPr/>
       </p:nvGrpSpPr>
@@ -912,9 +1004,11 @@
       <p:sp>
         <p:nvSpPr>
           <p:cNvPr id="63" name="Google Shape;63;g32ae3591859_0_5:notes"/>
-          <p:cNvSpPr/>
+          <p:cNvSpPr>
+            <a:spLocks noGrp="1" noRot="1" noChangeAspect="1"/>
+          </p:cNvSpPr>
           <p:nvPr>
-            <p:ph idx="2" type="sldImg"/>
+            <p:ph type="sldImg" idx="2"/>
           </p:nvPr>
         </p:nvSpPr>
         <p:spPr>
@@ -923,9 +1017,13 @@
             <a:ext cx="6096000" cy="3429000"/>
           </a:xfrm>
           <a:custGeom>
-            <a:rect b="b" l="l" r="r" t="t"/>
+            <a:avLst/>
+            <a:gdLst/>
+            <a:ahLst/>
+            <a:cxnLst/>
+            <a:rect l="l" t="t" r="r" b="b"/>
             <a:pathLst>
-              <a:path extrusionOk="0" h="120000" w="120000">
+              <a:path w="120000" h="120000" extrusionOk="0">
                 <a:moveTo>
                   <a:pt x="0" y="0"/>
                 </a:moveTo>
@@ -947,9 +1045,11 @@
       <p:sp>
         <p:nvSpPr>
           <p:cNvPr id="64" name="Google Shape;64;g32ae3591859_0_5:notes"/>
-          <p:cNvSpPr txBox="1"/>
+          <p:cNvSpPr txBox="1">
+            <a:spLocks noGrp="1"/>
+          </p:cNvSpPr>
           <p:nvPr>
-            <p:ph idx="1" type="body"/>
+            <p:ph type="body" idx="1"/>
           </p:nvPr>
         </p:nvSpPr>
         <p:spPr>
@@ -962,12 +1062,12 @@
           </a:prstGeom>
         </p:spPr>
         <p:txBody>
-          <a:bodyPr anchorCtr="0" anchor="t" bIns="91425" lIns="91425" spcFirstLastPara="1" rIns="91425" wrap="square" tIns="91425">
+          <a:bodyPr spcFirstLastPara="1" wrap="square" lIns="91425" tIns="91425" rIns="91425" bIns="91425" anchor="t" anchorCtr="0">
             <a:noAutofit/>
           </a:bodyPr>
           <a:lstStyle/>
           <a:p>
-            <a:pPr indent="0" lvl="0" marL="0" rtl="0" algn="l">
+            <a:pPr marL="0" lvl="0" indent="0" algn="l" rtl="0">
               <a:spcBef>
                 <a:spcPts val="0"/>
               </a:spcBef>
@@ -976,9 +1076,6 @@
               </a:spcAft>
               <a:buNone/>
             </a:pPr>
-            <a:r>
-              <a:t/>
-            </a:r>
             <a:endParaRPr/>
           </a:p>
         </p:txBody>
@@ -992,11 +1089,11 @@
 </file>
 
 <file path=ppt/notesSlides/notesSlide4.xml><?xml version="1.0" encoding="utf-8"?>
-<p:notes xmlns:a="http://schemas.openxmlformats.org/drawingml/2006/main" xmlns:r="http://schemas.openxmlformats.org/officeDocument/2006/relationships" xmlns:mc="http://schemas.openxmlformats.org/markup-compatibility/2006" xmlns:mv="urn:schemas-microsoft-com:mac:vml" xmlns:p="http://schemas.openxmlformats.org/presentationml/2006/main" xmlns:c="http://schemas.openxmlformats.org/drawingml/2006/chart" xmlns:dgm="http://schemas.openxmlformats.org/drawingml/2006/diagram" xmlns:o="urn:schemas-microsoft-com:office:office" xmlns:v="urn:schemas-microsoft-com:vml" xmlns:pvml="urn:schemas-microsoft-com:office:powerpoint" xmlns:com="http://schemas.openxmlformats.org/drawingml/2006/compatibility" xmlns:p14="http://schemas.microsoft.com/office/powerpoint/2010/main" xmlns:p15="http://schemas.microsoft.com/office/powerpoint/2012/main" xmlns:ahyp="http://schemas.microsoft.com/office/drawing/2018/hyperlinkcolor" showMasterPhAnim="0" showMasterSp="0">
+<p:notes xmlns:a="http://schemas.openxmlformats.org/drawingml/2006/main" xmlns:r="http://schemas.openxmlformats.org/officeDocument/2006/relationships" xmlns:p="http://schemas.openxmlformats.org/presentationml/2006/main" showMasterSp="0" showMasterPhAnim="0">
   <p:cSld>
     <p:spTree>
       <p:nvGrpSpPr>
-        <p:cNvPr id="68" name="Shape 68"/>
+        <p:cNvPr id="1" name="Shape 68"/>
         <p:cNvGrpSpPr/>
         <p:nvPr/>
       </p:nvGrpSpPr>
@@ -1011,9 +1108,11 @@
       <p:sp>
         <p:nvSpPr>
           <p:cNvPr id="69" name="Google Shape;69;g32ae3591859_0_10:notes"/>
-          <p:cNvSpPr/>
+          <p:cNvSpPr>
+            <a:spLocks noGrp="1" noRot="1" noChangeAspect="1"/>
+          </p:cNvSpPr>
           <p:nvPr>
-            <p:ph idx="2" type="sldImg"/>
+            <p:ph type="sldImg" idx="2"/>
           </p:nvPr>
         </p:nvSpPr>
         <p:spPr>
@@ -1022,9 +1121,13 @@
             <a:ext cx="6096000" cy="3429000"/>
           </a:xfrm>
           <a:custGeom>
-            <a:rect b="b" l="l" r="r" t="t"/>
+            <a:avLst/>
+            <a:gdLst/>
+            <a:ahLst/>
+            <a:cxnLst/>
+            <a:rect l="l" t="t" r="r" b="b"/>
             <a:pathLst>
-              <a:path extrusionOk="0" h="120000" w="120000">
+              <a:path w="120000" h="120000" extrusionOk="0">
                 <a:moveTo>
                   <a:pt x="0" y="0"/>
                 </a:moveTo>
@@ -1046,9 +1149,11 @@
       <p:sp>
         <p:nvSpPr>
           <p:cNvPr id="70" name="Google Shape;70;g32ae3591859_0_10:notes"/>
-          <p:cNvSpPr txBox="1"/>
+          <p:cNvSpPr txBox="1">
+            <a:spLocks noGrp="1"/>
+          </p:cNvSpPr>
           <p:nvPr>
-            <p:ph idx="1" type="body"/>
+            <p:ph type="body" idx="1"/>
           </p:nvPr>
         </p:nvSpPr>
         <p:spPr>
@@ -1061,12 +1166,12 @@
           </a:prstGeom>
         </p:spPr>
         <p:txBody>
-          <a:bodyPr anchorCtr="0" anchor="t" bIns="91425" lIns="91425" spcFirstLastPara="1" rIns="91425" wrap="square" tIns="91425">
+          <a:bodyPr spcFirstLastPara="1" wrap="square" lIns="91425" tIns="91425" rIns="91425" bIns="91425" anchor="t" anchorCtr="0">
             <a:noAutofit/>
           </a:bodyPr>
           <a:lstStyle/>
           <a:p>
-            <a:pPr indent="0" lvl="0" marL="0" rtl="0" algn="l">
+            <a:pPr marL="0" lvl="0" indent="0" algn="l" rtl="0">
               <a:spcBef>
                 <a:spcPts val="0"/>
               </a:spcBef>
@@ -1075,9 +1180,6 @@
               </a:spcAft>
               <a:buNone/>
             </a:pPr>
-            <a:r>
-              <a:t/>
-            </a:r>
             <a:endParaRPr/>
           </a:p>
         </p:txBody>
@@ -1091,11 +1193,11 @@
 </file>
 
 <file path=ppt/notesSlides/notesSlide5.xml><?xml version="1.0" encoding="utf-8"?>
-<p:notes xmlns:a="http://schemas.openxmlformats.org/drawingml/2006/main" xmlns:r="http://schemas.openxmlformats.org/officeDocument/2006/relationships" xmlns:mc="http://schemas.openxmlformats.org/markup-compatibility/2006" xmlns:mv="urn:schemas-microsoft-com:mac:vml" xmlns:p="http://schemas.openxmlformats.org/presentationml/2006/main" xmlns:c="http://schemas.openxmlformats.org/drawingml/2006/chart" xmlns:dgm="http://schemas.openxmlformats.org/drawingml/2006/diagram" xmlns:o="urn:schemas-microsoft-com:office:office" xmlns:v="urn:schemas-microsoft-com:vml" xmlns:pvml="urn:schemas-microsoft-com:office:powerpoint" xmlns:com="http://schemas.openxmlformats.org/drawingml/2006/compatibility" xmlns:p14="http://schemas.microsoft.com/office/powerpoint/2010/main" xmlns:p15="http://schemas.microsoft.com/office/powerpoint/2012/main" xmlns:ahyp="http://schemas.microsoft.com/office/drawing/2018/hyperlinkcolor" showMasterPhAnim="0" showMasterSp="0">
+<p:notes xmlns:a="http://schemas.openxmlformats.org/drawingml/2006/main" xmlns:r="http://schemas.openxmlformats.org/officeDocument/2006/relationships" xmlns:p="http://schemas.openxmlformats.org/presentationml/2006/main" showMasterSp="0" showMasterPhAnim="0">
   <p:cSld>
     <p:spTree>
       <p:nvGrpSpPr>
-        <p:cNvPr id="74" name="Shape 74"/>
+        <p:cNvPr id="1" name="Shape 74"/>
         <p:cNvGrpSpPr/>
         <p:nvPr/>
       </p:nvGrpSpPr>
@@ -1110,9 +1212,11 @@
       <p:sp>
         <p:nvSpPr>
           <p:cNvPr id="75" name="Google Shape;75;g32ae3591859_0_15:notes"/>
-          <p:cNvSpPr/>
+          <p:cNvSpPr>
+            <a:spLocks noGrp="1" noRot="1" noChangeAspect="1"/>
+          </p:cNvSpPr>
           <p:nvPr>
-            <p:ph idx="2" type="sldImg"/>
+            <p:ph type="sldImg" idx="2"/>
           </p:nvPr>
         </p:nvSpPr>
         <p:spPr>
@@ -1121,9 +1225,13 @@
             <a:ext cx="6096000" cy="3429000"/>
           </a:xfrm>
           <a:custGeom>
-            <a:rect b="b" l="l" r="r" t="t"/>
+            <a:avLst/>
+            <a:gdLst/>
+            <a:ahLst/>
+            <a:cxnLst/>
+            <a:rect l="l" t="t" r="r" b="b"/>
             <a:pathLst>
-              <a:path extrusionOk="0" h="120000" w="120000">
+              <a:path w="120000" h="120000" extrusionOk="0">
                 <a:moveTo>
                   <a:pt x="0" y="0"/>
                 </a:moveTo>
@@ -1145,9 +1253,11 @@
       <p:sp>
         <p:nvSpPr>
           <p:cNvPr id="76" name="Google Shape;76;g32ae3591859_0_15:notes"/>
-          <p:cNvSpPr txBox="1"/>
+          <p:cNvSpPr txBox="1">
+            <a:spLocks noGrp="1"/>
+          </p:cNvSpPr>
           <p:nvPr>
-            <p:ph idx="1" type="body"/>
+            <p:ph type="body" idx="1"/>
           </p:nvPr>
         </p:nvSpPr>
         <p:spPr>
@@ -1160,12 +1270,12 @@
           </a:prstGeom>
         </p:spPr>
         <p:txBody>
-          <a:bodyPr anchorCtr="0" anchor="t" bIns="91425" lIns="91425" spcFirstLastPara="1" rIns="91425" wrap="square" tIns="91425">
+          <a:bodyPr spcFirstLastPara="1" wrap="square" lIns="91425" tIns="91425" rIns="91425" bIns="91425" anchor="t" anchorCtr="0">
             <a:noAutofit/>
           </a:bodyPr>
           <a:lstStyle/>
           <a:p>
-            <a:pPr indent="0" lvl="0" marL="0" rtl="0" algn="l">
+            <a:pPr marL="0" lvl="0" indent="0" algn="l" rtl="0">
               <a:spcBef>
                 <a:spcPts val="0"/>
               </a:spcBef>
@@ -1174,9 +1284,6 @@
               </a:spcAft>
               <a:buNone/>
             </a:pPr>
-            <a:r>
-              <a:t/>
-            </a:r>
             <a:endParaRPr/>
           </a:p>
         </p:txBody>
@@ -1190,11 +1297,11 @@
 </file>
 
 <file path=ppt/notesSlides/notesSlide6.xml><?xml version="1.0" encoding="utf-8"?>
-<p:notes xmlns:a="http://schemas.openxmlformats.org/drawingml/2006/main" xmlns:r="http://schemas.openxmlformats.org/officeDocument/2006/relationships" xmlns:mc="http://schemas.openxmlformats.org/markup-compatibility/2006" xmlns:mv="urn:schemas-microsoft-com:mac:vml" xmlns:p="http://schemas.openxmlformats.org/presentationml/2006/main" xmlns:c="http://schemas.openxmlformats.org/drawingml/2006/chart" xmlns:dgm="http://schemas.openxmlformats.org/drawingml/2006/diagram" xmlns:o="urn:schemas-microsoft-com:office:office" xmlns:v="urn:schemas-microsoft-com:vml" xmlns:pvml="urn:schemas-microsoft-com:office:powerpoint" xmlns:com="http://schemas.openxmlformats.org/drawingml/2006/compatibility" xmlns:p14="http://schemas.microsoft.com/office/powerpoint/2010/main" xmlns:p15="http://schemas.microsoft.com/office/powerpoint/2012/main" xmlns:ahyp="http://schemas.microsoft.com/office/drawing/2018/hyperlinkcolor" showMasterPhAnim="0" showMasterSp="0">
+<p:notes xmlns:a="http://schemas.openxmlformats.org/drawingml/2006/main" xmlns:r="http://schemas.openxmlformats.org/officeDocument/2006/relationships" xmlns:p="http://schemas.openxmlformats.org/presentationml/2006/main" showMasterSp="0" showMasterPhAnim="0">
   <p:cSld>
     <p:spTree>
       <p:nvGrpSpPr>
-        <p:cNvPr id="81" name="Shape 81"/>
+        <p:cNvPr id="1" name="Shape 81"/>
         <p:cNvGrpSpPr/>
         <p:nvPr/>
       </p:nvGrpSpPr>
@@ -1209,20 +1316,26 @@
       <p:sp>
         <p:nvSpPr>
           <p:cNvPr id="82" name="Google Shape;82;g32ae3591859_0_20:notes"/>
-          <p:cNvSpPr/>
+          <p:cNvSpPr>
+            <a:spLocks noGrp="1" noRot="1" noChangeAspect="1"/>
+          </p:cNvSpPr>
           <p:nvPr>
-            <p:ph idx="2" type="sldImg"/>
+            <p:ph type="sldImg" idx="2"/>
           </p:nvPr>
         </p:nvSpPr>
         <p:spPr>
           <a:xfrm>
-            <a:off x="381300" y="685800"/>
+            <a:off x="381000" y="685800"/>
             <a:ext cx="6096000" cy="3429000"/>
           </a:xfrm>
           <a:custGeom>
-            <a:rect b="b" l="l" r="r" t="t"/>
+            <a:avLst/>
+            <a:gdLst/>
+            <a:ahLst/>
+            <a:cxnLst/>
+            <a:rect l="l" t="t" r="r" b="b"/>
             <a:pathLst>
-              <a:path extrusionOk="0" h="120000" w="120000">
+              <a:path w="120000" h="120000" extrusionOk="0">
                 <a:moveTo>
                   <a:pt x="0" y="0"/>
                 </a:moveTo>
@@ -1244,9 +1357,11 @@
       <p:sp>
         <p:nvSpPr>
           <p:cNvPr id="83" name="Google Shape;83;g32ae3591859_0_20:notes"/>
-          <p:cNvSpPr txBox="1"/>
+          <p:cNvSpPr txBox="1">
+            <a:spLocks noGrp="1"/>
+          </p:cNvSpPr>
           <p:nvPr>
-            <p:ph idx="1" type="body"/>
+            <p:ph type="body" idx="1"/>
           </p:nvPr>
         </p:nvSpPr>
         <p:spPr>
@@ -1259,12 +1374,12 @@
           </a:prstGeom>
         </p:spPr>
         <p:txBody>
-          <a:bodyPr anchorCtr="0" anchor="t" bIns="91425" lIns="91425" spcFirstLastPara="1" rIns="91425" wrap="square" tIns="91425">
+          <a:bodyPr spcFirstLastPara="1" wrap="square" lIns="91425" tIns="91425" rIns="91425" bIns="91425" anchor="t" anchorCtr="0">
             <a:noAutofit/>
           </a:bodyPr>
           <a:lstStyle/>
           <a:p>
-            <a:pPr indent="0" lvl="0" marL="0" rtl="0" algn="l">
+            <a:pPr marL="0" lvl="0" indent="0" algn="l" rtl="0">
               <a:spcBef>
                 <a:spcPts val="0"/>
               </a:spcBef>
@@ -1273,9 +1388,6 @@
               </a:spcAft>
               <a:buNone/>
             </a:pPr>
-            <a:r>
-              <a:t/>
-            </a:r>
             <a:endParaRPr/>
           </a:p>
         </p:txBody>
@@ -1289,11 +1401,11 @@
 </file>
 
 <file path=ppt/notesSlides/notesSlide7.xml><?xml version="1.0" encoding="utf-8"?>
-<p:notes xmlns:a="http://schemas.openxmlformats.org/drawingml/2006/main" xmlns:r="http://schemas.openxmlformats.org/officeDocument/2006/relationships" xmlns:mc="http://schemas.openxmlformats.org/markup-compatibility/2006" xmlns:mv="urn:schemas-microsoft-com:mac:vml" xmlns:p="http://schemas.openxmlformats.org/presentationml/2006/main" xmlns:c="http://schemas.openxmlformats.org/drawingml/2006/chart" xmlns:dgm="http://schemas.openxmlformats.org/drawingml/2006/diagram" xmlns:o="urn:schemas-microsoft-com:office:office" xmlns:v="urn:schemas-microsoft-com:vml" xmlns:pvml="urn:schemas-microsoft-com:office:powerpoint" xmlns:com="http://schemas.openxmlformats.org/drawingml/2006/compatibility" xmlns:p14="http://schemas.microsoft.com/office/powerpoint/2010/main" xmlns:p15="http://schemas.microsoft.com/office/powerpoint/2012/main" xmlns:ahyp="http://schemas.microsoft.com/office/drawing/2018/hyperlinkcolor" showMasterPhAnim="0" showMasterSp="0">
+<p:notes xmlns:a="http://schemas.openxmlformats.org/drawingml/2006/main" xmlns:r="http://schemas.openxmlformats.org/officeDocument/2006/relationships" xmlns:p="http://schemas.openxmlformats.org/presentationml/2006/main" showMasterSp="0" showMasterPhAnim="0">
   <p:cSld>
     <p:spTree>
       <p:nvGrpSpPr>
-        <p:cNvPr id="87" name="Shape 87"/>
+        <p:cNvPr id="1" name="Shape 87"/>
         <p:cNvGrpSpPr/>
         <p:nvPr/>
       </p:nvGrpSpPr>
@@ -1308,20 +1420,26 @@
       <p:sp>
         <p:nvSpPr>
           <p:cNvPr id="88" name="Google Shape;88;g32ae3591859_0_25:notes"/>
-          <p:cNvSpPr/>
+          <p:cNvSpPr>
+            <a:spLocks noGrp="1" noRot="1" noChangeAspect="1"/>
+          </p:cNvSpPr>
           <p:nvPr>
-            <p:ph idx="2" type="sldImg"/>
+            <p:ph type="sldImg" idx="2"/>
           </p:nvPr>
         </p:nvSpPr>
         <p:spPr>
           <a:xfrm>
-            <a:off x="381300" y="685800"/>
+            <a:off x="381000" y="685800"/>
             <a:ext cx="6096000" cy="3429000"/>
           </a:xfrm>
           <a:custGeom>
-            <a:rect b="b" l="l" r="r" t="t"/>
+            <a:avLst/>
+            <a:gdLst/>
+            <a:ahLst/>
+            <a:cxnLst/>
+            <a:rect l="l" t="t" r="r" b="b"/>
             <a:pathLst>
-              <a:path extrusionOk="0" h="120000" w="120000">
+              <a:path w="120000" h="120000" extrusionOk="0">
                 <a:moveTo>
                   <a:pt x="0" y="0"/>
                 </a:moveTo>
@@ -1343,9 +1461,11 @@
       <p:sp>
         <p:nvSpPr>
           <p:cNvPr id="89" name="Google Shape;89;g32ae3591859_0_25:notes"/>
-          <p:cNvSpPr txBox="1"/>
+          <p:cNvSpPr txBox="1">
+            <a:spLocks noGrp="1"/>
+          </p:cNvSpPr>
           <p:nvPr>
-            <p:ph idx="1" type="body"/>
+            <p:ph type="body" idx="1"/>
           </p:nvPr>
         </p:nvSpPr>
         <p:spPr>
@@ -1358,12 +1478,12 @@
           </a:prstGeom>
         </p:spPr>
         <p:txBody>
-          <a:bodyPr anchorCtr="0" anchor="t" bIns="91425" lIns="91425" spcFirstLastPara="1" rIns="91425" wrap="square" tIns="91425">
+          <a:bodyPr spcFirstLastPara="1" wrap="square" lIns="91425" tIns="91425" rIns="91425" bIns="91425" anchor="t" anchorCtr="0">
             <a:noAutofit/>
           </a:bodyPr>
           <a:lstStyle/>
           <a:p>
-            <a:pPr indent="0" lvl="0" marL="0" rtl="0" algn="l">
+            <a:pPr marL="0" lvl="0" indent="0" algn="l" rtl="0">
               <a:spcBef>
                 <a:spcPts val="0"/>
               </a:spcBef>
@@ -1372,9 +1492,6 @@
               </a:spcAft>
               <a:buNone/>
             </a:pPr>
-            <a:r>
-              <a:t/>
-            </a:r>
             <a:endParaRPr/>
           </a:p>
         </p:txBody>
@@ -1388,11 +1505,11 @@
 </file>
 
 <file path=ppt/notesSlides/notesSlide8.xml><?xml version="1.0" encoding="utf-8"?>
-<p:notes xmlns:a="http://schemas.openxmlformats.org/drawingml/2006/main" xmlns:r="http://schemas.openxmlformats.org/officeDocument/2006/relationships" xmlns:mc="http://schemas.openxmlformats.org/markup-compatibility/2006" xmlns:mv="urn:schemas-microsoft-com:mac:vml" xmlns:p="http://schemas.openxmlformats.org/presentationml/2006/main" xmlns:c="http://schemas.openxmlformats.org/drawingml/2006/chart" xmlns:dgm="http://schemas.openxmlformats.org/drawingml/2006/diagram" xmlns:o="urn:schemas-microsoft-com:office:office" xmlns:v="urn:schemas-microsoft-com:vml" xmlns:pvml="urn:schemas-microsoft-com:office:powerpoint" xmlns:com="http://schemas.openxmlformats.org/drawingml/2006/compatibility" xmlns:p14="http://schemas.microsoft.com/office/powerpoint/2010/main" xmlns:p15="http://schemas.microsoft.com/office/powerpoint/2012/main" xmlns:ahyp="http://schemas.microsoft.com/office/drawing/2018/hyperlinkcolor" showMasterPhAnim="0" showMasterSp="0">
+<p:notes xmlns:a="http://schemas.openxmlformats.org/drawingml/2006/main" xmlns:r="http://schemas.openxmlformats.org/officeDocument/2006/relationships" xmlns:p="http://schemas.openxmlformats.org/presentationml/2006/main" showMasterSp="0" showMasterPhAnim="0">
   <p:cSld>
     <p:spTree>
       <p:nvGrpSpPr>
-        <p:cNvPr id="94" name="Shape 94"/>
+        <p:cNvPr id="1" name="Shape 94"/>
         <p:cNvGrpSpPr/>
         <p:nvPr/>
       </p:nvGrpSpPr>
@@ -1407,9 +1524,11 @@
       <p:sp>
         <p:nvSpPr>
           <p:cNvPr id="95" name="Google Shape;95;g32ae3591859_0_51:notes"/>
-          <p:cNvSpPr/>
+          <p:cNvSpPr>
+            <a:spLocks noGrp="1" noRot="1" noChangeAspect="1"/>
+          </p:cNvSpPr>
           <p:nvPr>
-            <p:ph idx="2" type="sldImg"/>
+            <p:ph type="sldImg" idx="2"/>
           </p:nvPr>
         </p:nvSpPr>
         <p:spPr>
@@ -1418,9 +1537,13 @@
             <a:ext cx="6096000" cy="3429000"/>
           </a:xfrm>
           <a:custGeom>
-            <a:rect b="b" l="l" r="r" t="t"/>
+            <a:avLst/>
+            <a:gdLst/>
+            <a:ahLst/>
+            <a:cxnLst/>
+            <a:rect l="l" t="t" r="r" b="b"/>
             <a:pathLst>
-              <a:path extrusionOk="0" h="120000" w="120000">
+              <a:path w="120000" h="120000" extrusionOk="0">
                 <a:moveTo>
                   <a:pt x="0" y="0"/>
                 </a:moveTo>
@@ -1442,9 +1565,11 @@
       <p:sp>
         <p:nvSpPr>
           <p:cNvPr id="96" name="Google Shape;96;g32ae3591859_0_51:notes"/>
-          <p:cNvSpPr txBox="1"/>
+          <p:cNvSpPr txBox="1">
+            <a:spLocks noGrp="1"/>
+          </p:cNvSpPr>
           <p:nvPr>
-            <p:ph idx="1" type="body"/>
+            <p:ph type="body" idx="1"/>
           </p:nvPr>
         </p:nvSpPr>
         <p:spPr>
@@ -1457,12 +1582,12 @@
           </a:prstGeom>
         </p:spPr>
         <p:txBody>
-          <a:bodyPr anchorCtr="0" anchor="t" bIns="91425" lIns="91425" spcFirstLastPara="1" rIns="91425" wrap="square" tIns="91425">
+          <a:bodyPr spcFirstLastPara="1" wrap="square" lIns="91425" tIns="91425" rIns="91425" bIns="91425" anchor="t" anchorCtr="0">
             <a:noAutofit/>
           </a:bodyPr>
           <a:lstStyle/>
           <a:p>
-            <a:pPr indent="0" lvl="0" marL="0" rtl="0" algn="l">
+            <a:pPr marL="0" lvl="0" indent="0" algn="l" rtl="0">
               <a:spcBef>
                 <a:spcPts val="0"/>
               </a:spcBef>
@@ -1471,9 +1596,6 @@
               </a:spcAft>
               <a:buNone/>
             </a:pPr>
-            <a:r>
-              <a:t/>
-            </a:r>
             <a:endParaRPr/>
           </a:p>
         </p:txBody>
@@ -1487,11 +1609,11 @@
 </file>
 
 <file path=ppt/notesSlides/notesSlide9.xml><?xml version="1.0" encoding="utf-8"?>
-<p:notes xmlns:a="http://schemas.openxmlformats.org/drawingml/2006/main" xmlns:r="http://schemas.openxmlformats.org/officeDocument/2006/relationships" xmlns:mc="http://schemas.openxmlformats.org/markup-compatibility/2006" xmlns:mv="urn:schemas-microsoft-com:mac:vml" xmlns:p="http://schemas.openxmlformats.org/presentationml/2006/main" xmlns:c="http://schemas.openxmlformats.org/drawingml/2006/chart" xmlns:dgm="http://schemas.openxmlformats.org/drawingml/2006/diagram" xmlns:o="urn:schemas-microsoft-com:office:office" xmlns:v="urn:schemas-microsoft-com:vml" xmlns:pvml="urn:schemas-microsoft-com:office:powerpoint" xmlns:com="http://schemas.openxmlformats.org/drawingml/2006/compatibility" xmlns:p14="http://schemas.microsoft.com/office/powerpoint/2010/main" xmlns:p15="http://schemas.microsoft.com/office/powerpoint/2012/main" xmlns:ahyp="http://schemas.microsoft.com/office/drawing/2018/hyperlinkcolor" showMasterPhAnim="0" showMasterSp="0">
+<p:notes xmlns:a="http://schemas.openxmlformats.org/drawingml/2006/main" xmlns:r="http://schemas.openxmlformats.org/officeDocument/2006/relationships" xmlns:p="http://schemas.openxmlformats.org/presentationml/2006/main" showMasterSp="0" showMasterPhAnim="0">
   <p:cSld>
     <p:spTree>
       <p:nvGrpSpPr>
-        <p:cNvPr id="102" name="Shape 102"/>
+        <p:cNvPr id="1" name="Shape 102"/>
         <p:cNvGrpSpPr/>
         <p:nvPr/>
       </p:nvGrpSpPr>
@@ -1506,20 +1628,26 @@
       <p:sp>
         <p:nvSpPr>
           <p:cNvPr id="103" name="Google Shape;103;g32ae3591859_0_30:notes"/>
-          <p:cNvSpPr/>
+          <p:cNvSpPr>
+            <a:spLocks noGrp="1" noRot="1" noChangeAspect="1"/>
+          </p:cNvSpPr>
           <p:nvPr>
-            <p:ph idx="2" type="sldImg"/>
+            <p:ph type="sldImg" idx="2"/>
           </p:nvPr>
         </p:nvSpPr>
         <p:spPr>
           <a:xfrm>
-            <a:off x="381300" y="685800"/>
+            <a:off x="381000" y="685800"/>
             <a:ext cx="6096000" cy="3429000"/>
           </a:xfrm>
           <a:custGeom>
-            <a:rect b="b" l="l" r="r" t="t"/>
+            <a:avLst/>
+            <a:gdLst/>
+            <a:ahLst/>
+            <a:cxnLst/>
+            <a:rect l="l" t="t" r="r" b="b"/>
             <a:pathLst>
-              <a:path extrusionOk="0" h="120000" w="120000">
+              <a:path w="120000" h="120000" extrusionOk="0">
                 <a:moveTo>
                   <a:pt x="0" y="0"/>
                 </a:moveTo>
@@ -1541,9 +1669,11 @@
       <p:sp>
         <p:nvSpPr>
           <p:cNvPr id="104" name="Google Shape;104;g32ae3591859_0_30:notes"/>
-          <p:cNvSpPr txBox="1"/>
+          <p:cNvSpPr txBox="1">
+            <a:spLocks noGrp="1"/>
+          </p:cNvSpPr>
           <p:nvPr>
-            <p:ph idx="1" type="body"/>
+            <p:ph type="body" idx="1"/>
           </p:nvPr>
         </p:nvSpPr>
         <p:spPr>
@@ -1556,12 +1686,12 @@
           </a:prstGeom>
         </p:spPr>
         <p:txBody>
-          <a:bodyPr anchorCtr="0" anchor="t" bIns="91425" lIns="91425" spcFirstLastPara="1" rIns="91425" wrap="square" tIns="91425">
+          <a:bodyPr spcFirstLastPara="1" wrap="square" lIns="91425" tIns="91425" rIns="91425" bIns="91425" anchor="t" anchorCtr="0">
             <a:noAutofit/>
           </a:bodyPr>
           <a:lstStyle/>
           <a:p>
-            <a:pPr indent="0" lvl="0" marL="0" rtl="0" algn="l">
+            <a:pPr marL="0" lvl="0" indent="0" algn="l" rtl="0">
               <a:spcBef>
                 <a:spcPts val="0"/>
               </a:spcBef>
@@ -1570,9 +1700,6 @@
               </a:spcAft>
               <a:buNone/>
             </a:pPr>
-            <a:r>
-              <a:t/>
-            </a:r>
             <a:endParaRPr/>
           </a:p>
         </p:txBody>
@@ -1586,11 +1713,11 @@
 </file>
 
 <file path=ppt/slideLayouts/slideLayout1.xml><?xml version="1.0" encoding="utf-8"?>
-<p:sldLayout xmlns:a="http://schemas.openxmlformats.org/drawingml/2006/main" xmlns:r="http://schemas.openxmlformats.org/officeDocument/2006/relationships" xmlns:mc="http://schemas.openxmlformats.org/markup-compatibility/2006" xmlns:mv="urn:schemas-microsoft-com:mac:vml" xmlns:p="http://schemas.openxmlformats.org/presentationml/2006/main" xmlns:c="http://schemas.openxmlformats.org/drawingml/2006/chart" xmlns:dgm="http://schemas.openxmlformats.org/drawingml/2006/diagram" xmlns:o="urn:schemas-microsoft-com:office:office" xmlns:v="urn:schemas-microsoft-com:vml" xmlns:pvml="urn:schemas-microsoft-com:office:powerpoint" xmlns:com="http://schemas.openxmlformats.org/drawingml/2006/compatibility" xmlns:p14="http://schemas.microsoft.com/office/powerpoint/2010/main" xmlns:p15="http://schemas.microsoft.com/office/powerpoint/2012/main" xmlns:ahyp="http://schemas.microsoft.com/office/drawing/2018/hyperlinkcolor" matchingName="Title slide" type="title">
+<p:sldLayout xmlns:a="http://schemas.openxmlformats.org/drawingml/2006/main" xmlns:r="http://schemas.openxmlformats.org/officeDocument/2006/relationships" xmlns:p="http://schemas.openxmlformats.org/presentationml/2006/main" matchingName="Title slide" type="title">
   <p:cSld name="TITLE">
     <p:spTree>
       <p:nvGrpSpPr>
-        <p:cNvPr id="9" name="Shape 9"/>
+        <p:cNvPr id="1" name="Shape 9"/>
         <p:cNvGrpSpPr/>
         <p:nvPr/>
       </p:nvGrpSpPr>
@@ -1605,7 +1732,9 @@
       <p:sp>
         <p:nvSpPr>
           <p:cNvPr id="10" name="Google Shape;10;p2"/>
-          <p:cNvSpPr txBox="1"/>
+          <p:cNvSpPr txBox="1">
+            <a:spLocks noGrp="1"/>
+          </p:cNvSpPr>
           <p:nvPr>
             <p:ph type="ctrTitle"/>
           </p:nvPr>
@@ -1620,7 +1749,7 @@
           </a:prstGeom>
         </p:spPr>
         <p:txBody>
-          <a:bodyPr anchorCtr="0" anchor="b" bIns="91425" lIns="91425" spcFirstLastPara="1" rIns="91425" wrap="square" tIns="91425">
+          <a:bodyPr spcFirstLastPara="1" wrap="square" lIns="91425" tIns="91425" rIns="91425" bIns="91425" anchor="b" anchorCtr="0">
             <a:normAutofit/>
           </a:bodyPr>
           <a:lstStyle>
@@ -1724,15 +1853,19 @@
               <a:defRPr sz="5200"/>
             </a:lvl9pPr>
           </a:lstStyle>
-          <a:p/>
+          <a:p>
+            <a:endParaRPr/>
+          </a:p>
         </p:txBody>
       </p:sp>
       <p:sp>
         <p:nvSpPr>
           <p:cNvPr id="11" name="Google Shape;11;p2"/>
-          <p:cNvSpPr txBox="1"/>
+          <p:cNvSpPr txBox="1">
+            <a:spLocks noGrp="1"/>
+          </p:cNvSpPr>
           <p:nvPr>
-            <p:ph idx="1" type="subTitle"/>
+            <p:ph type="subTitle" idx="1"/>
           </p:nvPr>
         </p:nvSpPr>
         <p:spPr>
@@ -1745,7 +1878,7 @@
           </a:prstGeom>
         </p:spPr>
         <p:txBody>
-          <a:bodyPr anchorCtr="0" anchor="t" bIns="91425" lIns="91425" spcFirstLastPara="1" rIns="91425" wrap="square" tIns="91425">
+          <a:bodyPr spcFirstLastPara="1" wrap="square" lIns="91425" tIns="91425" rIns="91425" bIns="91425" anchor="t" anchorCtr="0">
             <a:normAutofit/>
           </a:bodyPr>
           <a:lstStyle>
@@ -1876,15 +2009,19 @@
               <a:defRPr sz="2800"/>
             </a:lvl9pPr>
           </a:lstStyle>
-          <a:p/>
+          <a:p>
+            <a:endParaRPr/>
+          </a:p>
         </p:txBody>
       </p:sp>
       <p:sp>
         <p:nvSpPr>
           <p:cNvPr id="12" name="Google Shape;12;p2"/>
-          <p:cNvSpPr txBox="1"/>
+          <p:cNvSpPr txBox="1">
+            <a:spLocks noGrp="1"/>
+          </p:cNvSpPr>
           <p:nvPr>
-            <p:ph idx="12" type="sldNum"/>
+            <p:ph type="sldNum" idx="12"/>
           </p:nvPr>
         </p:nvSpPr>
         <p:spPr>
@@ -1897,7 +2034,7 @@
           </a:prstGeom>
         </p:spPr>
         <p:txBody>
-          <a:bodyPr anchorCtr="0" anchor="ctr" bIns="91425" lIns="91425" spcFirstLastPara="1" rIns="91425" wrap="square" tIns="91425">
+          <a:bodyPr spcFirstLastPara="1" wrap="square" lIns="91425" tIns="91425" rIns="91425" bIns="91425" anchor="ctr" anchorCtr="0">
             <a:normAutofit/>
           </a:bodyPr>
           <a:lstStyle>
@@ -1939,7 +2076,7 @@
             </a:lvl9pPr>
           </a:lstStyle>
           <a:p>
-            <a:pPr indent="0" lvl="0" marL="0" rtl="0" algn="r">
+            <a:pPr marL="0" lvl="0" indent="0" algn="r" rtl="0">
               <a:spcBef>
                 <a:spcPts val="0"/>
               </a:spcBef>
@@ -1965,11 +2102,11 @@
 </file>
 
 <file path=ppt/slideLayouts/slideLayout10.xml><?xml version="1.0" encoding="utf-8"?>
-<p:sldLayout xmlns:a="http://schemas.openxmlformats.org/drawingml/2006/main" xmlns:r="http://schemas.openxmlformats.org/officeDocument/2006/relationships" xmlns:mc="http://schemas.openxmlformats.org/markup-compatibility/2006" xmlns:mv="urn:schemas-microsoft-com:mac:vml" xmlns:p="http://schemas.openxmlformats.org/presentationml/2006/main" xmlns:c="http://schemas.openxmlformats.org/drawingml/2006/chart" xmlns:dgm="http://schemas.openxmlformats.org/drawingml/2006/diagram" xmlns:o="urn:schemas-microsoft-com:office:office" xmlns:v="urn:schemas-microsoft-com:vml" xmlns:pvml="urn:schemas-microsoft-com:office:powerpoint" xmlns:com="http://schemas.openxmlformats.org/drawingml/2006/compatibility" xmlns:p14="http://schemas.microsoft.com/office/powerpoint/2010/main" xmlns:p15="http://schemas.microsoft.com/office/powerpoint/2012/main" xmlns:ahyp="http://schemas.microsoft.com/office/drawing/2018/hyperlinkcolor" matchingName="Big number">
+<p:sldLayout xmlns:a="http://schemas.openxmlformats.org/drawingml/2006/main" xmlns:r="http://schemas.openxmlformats.org/officeDocument/2006/relationships" xmlns:p="http://schemas.openxmlformats.org/presentationml/2006/main" matchingName="Big number">
   <p:cSld name="BIG_NUMBER">
     <p:spTree>
       <p:nvGrpSpPr>
-        <p:cNvPr id="44" name="Shape 44"/>
+        <p:cNvPr id="1" name="Shape 44"/>
         <p:cNvGrpSpPr/>
         <p:nvPr/>
       </p:nvGrpSpPr>
@@ -1984,9 +2121,11 @@
       <p:sp>
         <p:nvSpPr>
           <p:cNvPr id="45" name="Google Shape;45;p11"/>
-          <p:cNvSpPr txBox="1"/>
+          <p:cNvSpPr txBox="1">
+            <a:spLocks noGrp="1"/>
+          </p:cNvSpPr>
           <p:nvPr>
-            <p:ph hasCustomPrompt="1" type="title"/>
+            <p:ph type="title" hasCustomPrompt="1"/>
           </p:nvPr>
         </p:nvSpPr>
         <p:spPr>
@@ -1999,7 +2138,7 @@
           </a:prstGeom>
         </p:spPr>
         <p:txBody>
-          <a:bodyPr anchorCtr="0" anchor="b" bIns="91425" lIns="91425" spcFirstLastPara="1" rIns="91425" wrap="square" tIns="91425">
+          <a:bodyPr spcFirstLastPara="1" wrap="square" lIns="91425" tIns="91425" rIns="91425" bIns="91425" anchor="b" anchorCtr="0">
             <a:normAutofit/>
           </a:bodyPr>
           <a:lstStyle>
@@ -2113,9 +2252,11 @@
       <p:sp>
         <p:nvSpPr>
           <p:cNvPr id="46" name="Google Shape;46;p11"/>
-          <p:cNvSpPr txBox="1"/>
+          <p:cNvSpPr txBox="1">
+            <a:spLocks noGrp="1"/>
+          </p:cNvSpPr>
           <p:nvPr>
-            <p:ph idx="1" type="body"/>
+            <p:ph type="body" idx="1"/>
           </p:nvPr>
         </p:nvSpPr>
         <p:spPr>
@@ -2128,11 +2269,11 @@
           </a:prstGeom>
         </p:spPr>
         <p:txBody>
-          <a:bodyPr anchorCtr="0" anchor="t" bIns="91425" lIns="91425" spcFirstLastPara="1" rIns="91425" wrap="square" tIns="91425">
+          <a:bodyPr spcFirstLastPara="1" wrap="square" lIns="91425" tIns="91425" rIns="91425" bIns="91425" anchor="t" anchorCtr="0">
             <a:normAutofit/>
           </a:bodyPr>
           <a:lstStyle>
-            <a:lvl1pPr indent="-342900" lvl="0" marL="457200" algn="ctr">
+            <a:lvl1pPr marL="457200" lvl="0" indent="-342900" algn="ctr">
               <a:spcBef>
                 <a:spcPts val="0"/>
               </a:spcBef>
@@ -2143,7 +2284,7 @@
               <a:buChar char="●"/>
               <a:defRPr/>
             </a:lvl1pPr>
-            <a:lvl2pPr indent="-317500" lvl="1" marL="914400" algn="ctr">
+            <a:lvl2pPr marL="914400" lvl="1" indent="-317500" algn="ctr">
               <a:spcBef>
                 <a:spcPts val="0"/>
               </a:spcBef>
@@ -2154,7 +2295,7 @@
               <a:buChar char="○"/>
               <a:defRPr/>
             </a:lvl2pPr>
-            <a:lvl3pPr indent="-317500" lvl="2" marL="1371600" algn="ctr">
+            <a:lvl3pPr marL="1371600" lvl="2" indent="-317500" algn="ctr">
               <a:spcBef>
                 <a:spcPts val="0"/>
               </a:spcBef>
@@ -2165,7 +2306,7 @@
               <a:buChar char="■"/>
               <a:defRPr/>
             </a:lvl3pPr>
-            <a:lvl4pPr indent="-317500" lvl="3" marL="1828800" algn="ctr">
+            <a:lvl4pPr marL="1828800" lvl="3" indent="-317500" algn="ctr">
               <a:spcBef>
                 <a:spcPts val="0"/>
               </a:spcBef>
@@ -2176,7 +2317,7 @@
               <a:buChar char="●"/>
               <a:defRPr/>
             </a:lvl4pPr>
-            <a:lvl5pPr indent="-317500" lvl="4" marL="2286000" algn="ctr">
+            <a:lvl5pPr marL="2286000" lvl="4" indent="-317500" algn="ctr">
               <a:spcBef>
                 <a:spcPts val="0"/>
               </a:spcBef>
@@ -2187,7 +2328,7 @@
               <a:buChar char="○"/>
               <a:defRPr/>
             </a:lvl5pPr>
-            <a:lvl6pPr indent="-317500" lvl="5" marL="2743200" algn="ctr">
+            <a:lvl6pPr marL="2743200" lvl="5" indent="-317500" algn="ctr">
               <a:spcBef>
                 <a:spcPts val="0"/>
               </a:spcBef>
@@ -2198,7 +2339,7 @@
               <a:buChar char="■"/>
               <a:defRPr/>
             </a:lvl6pPr>
-            <a:lvl7pPr indent="-317500" lvl="6" marL="3200400" algn="ctr">
+            <a:lvl7pPr marL="3200400" lvl="6" indent="-317500" algn="ctr">
               <a:spcBef>
                 <a:spcPts val="0"/>
               </a:spcBef>
@@ -2209,7 +2350,7 @@
               <a:buChar char="●"/>
               <a:defRPr/>
             </a:lvl7pPr>
-            <a:lvl8pPr indent="-317500" lvl="7" marL="3657600" algn="ctr">
+            <a:lvl8pPr marL="3657600" lvl="7" indent="-317500" algn="ctr">
               <a:spcBef>
                 <a:spcPts val="0"/>
               </a:spcBef>
@@ -2220,7 +2361,7 @@
               <a:buChar char="○"/>
               <a:defRPr/>
             </a:lvl8pPr>
-            <a:lvl9pPr indent="-317500" lvl="8" marL="4114800" algn="ctr">
+            <a:lvl9pPr marL="4114800" lvl="8" indent="-317500" algn="ctr">
               <a:spcBef>
                 <a:spcPts val="0"/>
               </a:spcBef>
@@ -2232,15 +2373,19 @@
               <a:defRPr/>
             </a:lvl9pPr>
           </a:lstStyle>
-          <a:p/>
+          <a:p>
+            <a:endParaRPr/>
+          </a:p>
         </p:txBody>
       </p:sp>
       <p:sp>
         <p:nvSpPr>
           <p:cNvPr id="47" name="Google Shape;47;p11"/>
-          <p:cNvSpPr txBox="1"/>
+          <p:cNvSpPr txBox="1">
+            <a:spLocks noGrp="1"/>
+          </p:cNvSpPr>
           <p:nvPr>
-            <p:ph idx="12" type="sldNum"/>
+            <p:ph type="sldNum" idx="12"/>
           </p:nvPr>
         </p:nvSpPr>
         <p:spPr>
@@ -2253,7 +2398,7 @@
           </a:prstGeom>
         </p:spPr>
         <p:txBody>
-          <a:bodyPr anchorCtr="0" anchor="ctr" bIns="91425" lIns="91425" spcFirstLastPara="1" rIns="91425" wrap="square" tIns="91425">
+          <a:bodyPr spcFirstLastPara="1" wrap="square" lIns="91425" tIns="91425" rIns="91425" bIns="91425" anchor="ctr" anchorCtr="0">
             <a:normAutofit/>
           </a:bodyPr>
           <a:lstStyle>
@@ -2295,7 +2440,7 @@
             </a:lvl9pPr>
           </a:lstStyle>
           <a:p>
-            <a:pPr indent="0" lvl="0" marL="0" rtl="0" algn="r">
+            <a:pPr marL="0" lvl="0" indent="0" algn="r" rtl="0">
               <a:spcBef>
                 <a:spcPts val="0"/>
               </a:spcBef>
@@ -2321,11 +2466,11 @@
 </file>
 
 <file path=ppt/slideLayouts/slideLayout11.xml><?xml version="1.0" encoding="utf-8"?>
-<p:sldLayout xmlns:a="http://schemas.openxmlformats.org/drawingml/2006/main" xmlns:r="http://schemas.openxmlformats.org/officeDocument/2006/relationships" xmlns:mc="http://schemas.openxmlformats.org/markup-compatibility/2006" xmlns:mv="urn:schemas-microsoft-com:mac:vml" xmlns:p="http://schemas.openxmlformats.org/presentationml/2006/main" xmlns:c="http://schemas.openxmlformats.org/drawingml/2006/chart" xmlns:dgm="http://schemas.openxmlformats.org/drawingml/2006/diagram" xmlns:o="urn:schemas-microsoft-com:office:office" xmlns:v="urn:schemas-microsoft-com:vml" xmlns:pvml="urn:schemas-microsoft-com:office:powerpoint" xmlns:com="http://schemas.openxmlformats.org/drawingml/2006/compatibility" xmlns:p14="http://schemas.microsoft.com/office/powerpoint/2010/main" xmlns:p15="http://schemas.microsoft.com/office/powerpoint/2012/main" xmlns:ahyp="http://schemas.microsoft.com/office/drawing/2018/hyperlinkcolor" matchingName="Blank" type="blank">
+<p:sldLayout xmlns:a="http://schemas.openxmlformats.org/drawingml/2006/main" xmlns:r="http://schemas.openxmlformats.org/officeDocument/2006/relationships" xmlns:p="http://schemas.openxmlformats.org/presentationml/2006/main" matchingName="Blank" type="blank">
   <p:cSld name="BLANK">
     <p:spTree>
       <p:nvGrpSpPr>
-        <p:cNvPr id="48" name="Shape 48"/>
+        <p:cNvPr id="1" name="Shape 48"/>
         <p:cNvGrpSpPr/>
         <p:nvPr/>
       </p:nvGrpSpPr>
@@ -2340,9 +2485,11 @@
       <p:sp>
         <p:nvSpPr>
           <p:cNvPr id="49" name="Google Shape;49;p12"/>
-          <p:cNvSpPr txBox="1"/>
+          <p:cNvSpPr txBox="1">
+            <a:spLocks noGrp="1"/>
+          </p:cNvSpPr>
           <p:nvPr>
-            <p:ph idx="12" type="sldNum"/>
+            <p:ph type="sldNum" idx="12"/>
           </p:nvPr>
         </p:nvSpPr>
         <p:spPr>
@@ -2355,7 +2502,7 @@
           </a:prstGeom>
         </p:spPr>
         <p:txBody>
-          <a:bodyPr anchorCtr="0" anchor="ctr" bIns="91425" lIns="91425" spcFirstLastPara="1" rIns="91425" wrap="square" tIns="91425">
+          <a:bodyPr spcFirstLastPara="1" wrap="square" lIns="91425" tIns="91425" rIns="91425" bIns="91425" anchor="ctr" anchorCtr="0">
             <a:normAutofit/>
           </a:bodyPr>
           <a:lstStyle>
@@ -2397,7 +2544,7 @@
             </a:lvl9pPr>
           </a:lstStyle>
           <a:p>
-            <a:pPr indent="0" lvl="0" marL="0" rtl="0" algn="r">
+            <a:pPr marL="0" lvl="0" indent="0" algn="r" rtl="0">
               <a:spcBef>
                 <a:spcPts val="0"/>
               </a:spcBef>
@@ -2423,11 +2570,11 @@
 </file>
 
 <file path=ppt/slideLayouts/slideLayout2.xml><?xml version="1.0" encoding="utf-8"?>
-<p:sldLayout xmlns:a="http://schemas.openxmlformats.org/drawingml/2006/main" xmlns:r="http://schemas.openxmlformats.org/officeDocument/2006/relationships" xmlns:mc="http://schemas.openxmlformats.org/markup-compatibility/2006" xmlns:mv="urn:schemas-microsoft-com:mac:vml" xmlns:p="http://schemas.openxmlformats.org/presentationml/2006/main" xmlns:c="http://schemas.openxmlformats.org/drawingml/2006/chart" xmlns:dgm="http://schemas.openxmlformats.org/drawingml/2006/diagram" xmlns:o="urn:schemas-microsoft-com:office:office" xmlns:v="urn:schemas-microsoft-com:vml" xmlns:pvml="urn:schemas-microsoft-com:office:powerpoint" xmlns:com="http://schemas.openxmlformats.org/drawingml/2006/compatibility" xmlns:p14="http://schemas.microsoft.com/office/powerpoint/2010/main" xmlns:p15="http://schemas.microsoft.com/office/powerpoint/2012/main" xmlns:ahyp="http://schemas.microsoft.com/office/drawing/2018/hyperlinkcolor" matchingName="Section header" type="secHead">
+<p:sldLayout xmlns:a="http://schemas.openxmlformats.org/drawingml/2006/main" xmlns:r="http://schemas.openxmlformats.org/officeDocument/2006/relationships" xmlns:p="http://schemas.openxmlformats.org/presentationml/2006/main" matchingName="Section header" type="secHead">
   <p:cSld name="SECTION_HEADER">
     <p:spTree>
       <p:nvGrpSpPr>
-        <p:cNvPr id="13" name="Shape 13"/>
+        <p:cNvPr id="1" name="Shape 13"/>
         <p:cNvGrpSpPr/>
         <p:nvPr/>
       </p:nvGrpSpPr>
@@ -2442,7 +2589,9 @@
       <p:sp>
         <p:nvSpPr>
           <p:cNvPr id="14" name="Google Shape;14;p3"/>
-          <p:cNvSpPr txBox="1"/>
+          <p:cNvSpPr txBox="1">
+            <a:spLocks noGrp="1"/>
+          </p:cNvSpPr>
           <p:nvPr>
             <p:ph type="title"/>
           </p:nvPr>
@@ -2457,7 +2606,7 @@
           </a:prstGeom>
         </p:spPr>
         <p:txBody>
-          <a:bodyPr anchorCtr="0" anchor="ctr" bIns="91425" lIns="91425" spcFirstLastPara="1" rIns="91425" wrap="square" tIns="91425">
+          <a:bodyPr spcFirstLastPara="1" wrap="square" lIns="91425" tIns="91425" rIns="91425" bIns="91425" anchor="ctr" anchorCtr="0">
             <a:normAutofit/>
           </a:bodyPr>
           <a:lstStyle>
@@ -2561,15 +2710,19 @@
               <a:defRPr sz="3600"/>
             </a:lvl9pPr>
           </a:lstStyle>
-          <a:p/>
+          <a:p>
+            <a:endParaRPr/>
+          </a:p>
         </p:txBody>
       </p:sp>
       <p:sp>
         <p:nvSpPr>
           <p:cNvPr id="15" name="Google Shape;15;p3"/>
-          <p:cNvSpPr txBox="1"/>
+          <p:cNvSpPr txBox="1">
+            <a:spLocks noGrp="1"/>
+          </p:cNvSpPr>
           <p:nvPr>
-            <p:ph idx="12" type="sldNum"/>
+            <p:ph type="sldNum" idx="12"/>
           </p:nvPr>
         </p:nvSpPr>
         <p:spPr>
@@ -2582,7 +2735,7 @@
           </a:prstGeom>
         </p:spPr>
         <p:txBody>
-          <a:bodyPr anchorCtr="0" anchor="ctr" bIns="91425" lIns="91425" spcFirstLastPara="1" rIns="91425" wrap="square" tIns="91425">
+          <a:bodyPr spcFirstLastPara="1" wrap="square" lIns="91425" tIns="91425" rIns="91425" bIns="91425" anchor="ctr" anchorCtr="0">
             <a:normAutofit/>
           </a:bodyPr>
           <a:lstStyle>
@@ -2624,7 +2777,7 @@
             </a:lvl9pPr>
           </a:lstStyle>
           <a:p>
-            <a:pPr indent="0" lvl="0" marL="0" rtl="0" algn="r">
+            <a:pPr marL="0" lvl="0" indent="0" algn="r" rtl="0">
               <a:spcBef>
                 <a:spcPts val="0"/>
               </a:spcBef>
@@ -2650,11 +2803,11 @@
 </file>
 
 <file path=ppt/slideLayouts/slideLayout3.xml><?xml version="1.0" encoding="utf-8"?>
-<p:sldLayout xmlns:a="http://schemas.openxmlformats.org/drawingml/2006/main" xmlns:r="http://schemas.openxmlformats.org/officeDocument/2006/relationships" xmlns:mc="http://schemas.openxmlformats.org/markup-compatibility/2006" xmlns:mv="urn:schemas-microsoft-com:mac:vml" xmlns:p="http://schemas.openxmlformats.org/presentationml/2006/main" xmlns:c="http://schemas.openxmlformats.org/drawingml/2006/chart" xmlns:dgm="http://schemas.openxmlformats.org/drawingml/2006/diagram" xmlns:o="urn:schemas-microsoft-com:office:office" xmlns:v="urn:schemas-microsoft-com:vml" xmlns:pvml="urn:schemas-microsoft-com:office:powerpoint" xmlns:com="http://schemas.openxmlformats.org/drawingml/2006/compatibility" xmlns:p14="http://schemas.microsoft.com/office/powerpoint/2010/main" xmlns:p15="http://schemas.microsoft.com/office/powerpoint/2012/main" xmlns:ahyp="http://schemas.microsoft.com/office/drawing/2018/hyperlinkcolor" matchingName="Title and body" type="tx">
+<p:sldLayout xmlns:a="http://schemas.openxmlformats.org/drawingml/2006/main" xmlns:r="http://schemas.openxmlformats.org/officeDocument/2006/relationships" xmlns:p="http://schemas.openxmlformats.org/presentationml/2006/main" matchingName="Title and body" type="tx">
   <p:cSld name="TITLE_AND_BODY">
     <p:spTree>
       <p:nvGrpSpPr>
-        <p:cNvPr id="16" name="Shape 16"/>
+        <p:cNvPr id="1" name="Shape 16"/>
         <p:cNvGrpSpPr/>
         <p:nvPr/>
       </p:nvGrpSpPr>
@@ -2669,7 +2822,9 @@
       <p:sp>
         <p:nvSpPr>
           <p:cNvPr id="17" name="Google Shape;17;p4"/>
-          <p:cNvSpPr txBox="1"/>
+          <p:cNvSpPr txBox="1">
+            <a:spLocks noGrp="1"/>
+          </p:cNvSpPr>
           <p:nvPr>
             <p:ph type="title"/>
           </p:nvPr>
@@ -2684,7 +2839,7 @@
           </a:prstGeom>
         </p:spPr>
         <p:txBody>
-          <a:bodyPr anchorCtr="0" anchor="t" bIns="91425" lIns="91425" spcFirstLastPara="1" rIns="91425" wrap="square" tIns="91425">
+          <a:bodyPr spcFirstLastPara="1" wrap="square" lIns="91425" tIns="91425" rIns="91425" bIns="91425" anchor="t" anchorCtr="0">
             <a:normAutofit/>
           </a:bodyPr>
           <a:lstStyle>
@@ -2788,15 +2943,19 @@
               <a:defRPr/>
             </a:lvl9pPr>
           </a:lstStyle>
-          <a:p/>
+          <a:p>
+            <a:endParaRPr/>
+          </a:p>
         </p:txBody>
       </p:sp>
       <p:sp>
         <p:nvSpPr>
           <p:cNvPr id="18" name="Google Shape;18;p4"/>
-          <p:cNvSpPr txBox="1"/>
+          <p:cNvSpPr txBox="1">
+            <a:spLocks noGrp="1"/>
+          </p:cNvSpPr>
           <p:nvPr>
-            <p:ph idx="1" type="body"/>
+            <p:ph type="body" idx="1"/>
           </p:nvPr>
         </p:nvSpPr>
         <p:spPr>
@@ -2809,11 +2968,11 @@
           </a:prstGeom>
         </p:spPr>
         <p:txBody>
-          <a:bodyPr anchorCtr="0" anchor="t" bIns="91425" lIns="91425" spcFirstLastPara="1" rIns="91425" wrap="square" tIns="91425">
+          <a:bodyPr spcFirstLastPara="1" wrap="square" lIns="91425" tIns="91425" rIns="91425" bIns="91425" anchor="t" anchorCtr="0">
             <a:normAutofit/>
           </a:bodyPr>
           <a:lstStyle>
-            <a:lvl1pPr indent="-342900" lvl="0" marL="457200">
+            <a:lvl1pPr marL="457200" lvl="0" indent="-342900">
               <a:spcBef>
                 <a:spcPts val="0"/>
               </a:spcBef>
@@ -2824,7 +2983,7 @@
               <a:buChar char="●"/>
               <a:defRPr/>
             </a:lvl1pPr>
-            <a:lvl2pPr indent="-317500" lvl="1" marL="914400">
+            <a:lvl2pPr marL="914400" lvl="1" indent="-317500">
               <a:spcBef>
                 <a:spcPts val="0"/>
               </a:spcBef>
@@ -2835,7 +2994,7 @@
               <a:buChar char="○"/>
               <a:defRPr/>
             </a:lvl2pPr>
-            <a:lvl3pPr indent="-317500" lvl="2" marL="1371600">
+            <a:lvl3pPr marL="1371600" lvl="2" indent="-317500">
               <a:spcBef>
                 <a:spcPts val="0"/>
               </a:spcBef>
@@ -2846,7 +3005,7 @@
               <a:buChar char="■"/>
               <a:defRPr/>
             </a:lvl3pPr>
-            <a:lvl4pPr indent="-317500" lvl="3" marL="1828800">
+            <a:lvl4pPr marL="1828800" lvl="3" indent="-317500">
               <a:spcBef>
                 <a:spcPts val="0"/>
               </a:spcBef>
@@ -2857,7 +3016,7 @@
               <a:buChar char="●"/>
               <a:defRPr/>
             </a:lvl4pPr>
-            <a:lvl5pPr indent="-317500" lvl="4" marL="2286000">
+            <a:lvl5pPr marL="2286000" lvl="4" indent="-317500">
               <a:spcBef>
                 <a:spcPts val="0"/>
               </a:spcBef>
@@ -2868,7 +3027,7 @@
               <a:buChar char="○"/>
               <a:defRPr/>
             </a:lvl5pPr>
-            <a:lvl6pPr indent="-317500" lvl="5" marL="2743200">
+            <a:lvl6pPr marL="2743200" lvl="5" indent="-317500">
               <a:spcBef>
                 <a:spcPts val="0"/>
               </a:spcBef>
@@ -2879,7 +3038,7 @@
               <a:buChar char="■"/>
               <a:defRPr/>
             </a:lvl6pPr>
-            <a:lvl7pPr indent="-317500" lvl="6" marL="3200400">
+            <a:lvl7pPr marL="3200400" lvl="6" indent="-317500">
               <a:spcBef>
                 <a:spcPts val="0"/>
               </a:spcBef>
@@ -2890,7 +3049,7 @@
               <a:buChar char="●"/>
               <a:defRPr/>
             </a:lvl7pPr>
-            <a:lvl8pPr indent="-317500" lvl="7" marL="3657600">
+            <a:lvl8pPr marL="3657600" lvl="7" indent="-317500">
               <a:spcBef>
                 <a:spcPts val="0"/>
               </a:spcBef>
@@ -2901,7 +3060,7 @@
               <a:buChar char="○"/>
               <a:defRPr/>
             </a:lvl8pPr>
-            <a:lvl9pPr indent="-317500" lvl="8" marL="4114800">
+            <a:lvl9pPr marL="4114800" lvl="8" indent="-317500">
               <a:spcBef>
                 <a:spcPts val="0"/>
               </a:spcBef>
@@ -2913,15 +3072,19 @@
               <a:defRPr/>
             </a:lvl9pPr>
           </a:lstStyle>
-          <a:p/>
+          <a:p>
+            <a:endParaRPr/>
+          </a:p>
         </p:txBody>
       </p:sp>
       <p:sp>
         <p:nvSpPr>
           <p:cNvPr id="19" name="Google Shape;19;p4"/>
-          <p:cNvSpPr txBox="1"/>
+          <p:cNvSpPr txBox="1">
+            <a:spLocks noGrp="1"/>
+          </p:cNvSpPr>
           <p:nvPr>
-            <p:ph idx="12" type="sldNum"/>
+            <p:ph type="sldNum" idx="12"/>
           </p:nvPr>
         </p:nvSpPr>
         <p:spPr>
@@ -2934,7 +3097,7 @@
           </a:prstGeom>
         </p:spPr>
         <p:txBody>
-          <a:bodyPr anchorCtr="0" anchor="ctr" bIns="91425" lIns="91425" spcFirstLastPara="1" rIns="91425" wrap="square" tIns="91425">
+          <a:bodyPr spcFirstLastPara="1" wrap="square" lIns="91425" tIns="91425" rIns="91425" bIns="91425" anchor="ctr" anchorCtr="0">
             <a:normAutofit/>
           </a:bodyPr>
           <a:lstStyle>
@@ -2976,7 +3139,7 @@
             </a:lvl9pPr>
           </a:lstStyle>
           <a:p>
-            <a:pPr indent="0" lvl="0" marL="0" rtl="0" algn="r">
+            <a:pPr marL="0" lvl="0" indent="0" algn="r" rtl="0">
               <a:spcBef>
                 <a:spcPts val="0"/>
               </a:spcBef>
@@ -3002,11 +3165,11 @@
 </file>
 
 <file path=ppt/slideLayouts/slideLayout4.xml><?xml version="1.0" encoding="utf-8"?>
-<p:sldLayout xmlns:a="http://schemas.openxmlformats.org/drawingml/2006/main" xmlns:r="http://schemas.openxmlformats.org/officeDocument/2006/relationships" xmlns:mc="http://schemas.openxmlformats.org/markup-compatibility/2006" xmlns:mv="urn:schemas-microsoft-com:mac:vml" xmlns:p="http://schemas.openxmlformats.org/presentationml/2006/main" xmlns:c="http://schemas.openxmlformats.org/drawingml/2006/chart" xmlns:dgm="http://schemas.openxmlformats.org/drawingml/2006/diagram" xmlns:o="urn:schemas-microsoft-com:office:office" xmlns:v="urn:schemas-microsoft-com:vml" xmlns:pvml="urn:schemas-microsoft-com:office:powerpoint" xmlns:com="http://schemas.openxmlformats.org/drawingml/2006/compatibility" xmlns:p14="http://schemas.microsoft.com/office/powerpoint/2010/main" xmlns:p15="http://schemas.microsoft.com/office/powerpoint/2012/main" xmlns:ahyp="http://schemas.microsoft.com/office/drawing/2018/hyperlinkcolor" matchingName="Title and two columns" type="twoColTx">
+<p:sldLayout xmlns:a="http://schemas.openxmlformats.org/drawingml/2006/main" xmlns:r="http://schemas.openxmlformats.org/officeDocument/2006/relationships" xmlns:p="http://schemas.openxmlformats.org/presentationml/2006/main" matchingName="Title and two columns" type="twoColTx">
   <p:cSld name="TITLE_AND_TWO_COLUMNS">
     <p:spTree>
       <p:nvGrpSpPr>
-        <p:cNvPr id="20" name="Shape 20"/>
+        <p:cNvPr id="1" name="Shape 20"/>
         <p:cNvGrpSpPr/>
         <p:nvPr/>
       </p:nvGrpSpPr>
@@ -3021,7 +3184,9 @@
       <p:sp>
         <p:nvSpPr>
           <p:cNvPr id="21" name="Google Shape;21;p5"/>
-          <p:cNvSpPr txBox="1"/>
+          <p:cNvSpPr txBox="1">
+            <a:spLocks noGrp="1"/>
+          </p:cNvSpPr>
           <p:nvPr>
             <p:ph type="title"/>
           </p:nvPr>
@@ -3036,7 +3201,7 @@
           </a:prstGeom>
         </p:spPr>
         <p:txBody>
-          <a:bodyPr anchorCtr="0" anchor="t" bIns="91425" lIns="91425" spcFirstLastPara="1" rIns="91425" wrap="square" tIns="91425">
+          <a:bodyPr spcFirstLastPara="1" wrap="square" lIns="91425" tIns="91425" rIns="91425" bIns="91425" anchor="t" anchorCtr="0">
             <a:normAutofit/>
           </a:bodyPr>
           <a:lstStyle>
@@ -3140,15 +3305,19 @@
               <a:defRPr/>
             </a:lvl9pPr>
           </a:lstStyle>
-          <a:p/>
+          <a:p>
+            <a:endParaRPr/>
+          </a:p>
         </p:txBody>
       </p:sp>
       <p:sp>
         <p:nvSpPr>
           <p:cNvPr id="22" name="Google Shape;22;p5"/>
-          <p:cNvSpPr txBox="1"/>
+          <p:cNvSpPr txBox="1">
+            <a:spLocks noGrp="1"/>
+          </p:cNvSpPr>
           <p:nvPr>
-            <p:ph idx="1" type="body"/>
+            <p:ph type="body" idx="1"/>
           </p:nvPr>
         </p:nvSpPr>
         <p:spPr>
@@ -3161,11 +3330,11 @@
           </a:prstGeom>
         </p:spPr>
         <p:txBody>
-          <a:bodyPr anchorCtr="0" anchor="t" bIns="91425" lIns="91425" spcFirstLastPara="1" rIns="91425" wrap="square" tIns="91425">
+          <a:bodyPr spcFirstLastPara="1" wrap="square" lIns="91425" tIns="91425" rIns="91425" bIns="91425" anchor="t" anchorCtr="0">
             <a:normAutofit/>
           </a:bodyPr>
           <a:lstStyle>
-            <a:lvl1pPr indent="-317500" lvl="0" marL="457200">
+            <a:lvl1pPr marL="457200" lvl="0" indent="-317500">
               <a:spcBef>
                 <a:spcPts val="0"/>
               </a:spcBef>
@@ -3176,7 +3345,7 @@
               <a:buChar char="●"/>
               <a:defRPr sz="1400"/>
             </a:lvl1pPr>
-            <a:lvl2pPr indent="-304800" lvl="1" marL="914400">
+            <a:lvl2pPr marL="914400" lvl="1" indent="-304800">
               <a:spcBef>
                 <a:spcPts val="0"/>
               </a:spcBef>
@@ -3187,7 +3356,7 @@
               <a:buChar char="○"/>
               <a:defRPr sz="1200"/>
             </a:lvl2pPr>
-            <a:lvl3pPr indent="-304800" lvl="2" marL="1371600">
+            <a:lvl3pPr marL="1371600" lvl="2" indent="-304800">
               <a:spcBef>
                 <a:spcPts val="0"/>
               </a:spcBef>
@@ -3198,7 +3367,7 @@
               <a:buChar char="■"/>
               <a:defRPr sz="1200"/>
             </a:lvl3pPr>
-            <a:lvl4pPr indent="-304800" lvl="3" marL="1828800">
+            <a:lvl4pPr marL="1828800" lvl="3" indent="-304800">
               <a:spcBef>
                 <a:spcPts val="0"/>
               </a:spcBef>
@@ -3209,7 +3378,7 @@
               <a:buChar char="●"/>
               <a:defRPr sz="1200"/>
             </a:lvl4pPr>
-            <a:lvl5pPr indent="-304800" lvl="4" marL="2286000">
+            <a:lvl5pPr marL="2286000" lvl="4" indent="-304800">
               <a:spcBef>
                 <a:spcPts val="0"/>
               </a:spcBef>
@@ -3220,7 +3389,7 @@
               <a:buChar char="○"/>
               <a:defRPr sz="1200"/>
             </a:lvl5pPr>
-            <a:lvl6pPr indent="-304800" lvl="5" marL="2743200">
+            <a:lvl6pPr marL="2743200" lvl="5" indent="-304800">
               <a:spcBef>
                 <a:spcPts val="0"/>
               </a:spcBef>
@@ -3231,7 +3400,7 @@
               <a:buChar char="■"/>
               <a:defRPr sz="1200"/>
             </a:lvl6pPr>
-            <a:lvl7pPr indent="-304800" lvl="6" marL="3200400">
+            <a:lvl7pPr marL="3200400" lvl="6" indent="-304800">
               <a:spcBef>
                 <a:spcPts val="0"/>
               </a:spcBef>
@@ -3242,7 +3411,7 @@
               <a:buChar char="●"/>
               <a:defRPr sz="1200"/>
             </a:lvl7pPr>
-            <a:lvl8pPr indent="-304800" lvl="7" marL="3657600">
+            <a:lvl8pPr marL="3657600" lvl="7" indent="-304800">
               <a:spcBef>
                 <a:spcPts val="0"/>
               </a:spcBef>
@@ -3253,7 +3422,7 @@
               <a:buChar char="○"/>
               <a:defRPr sz="1200"/>
             </a:lvl8pPr>
-            <a:lvl9pPr indent="-304800" lvl="8" marL="4114800">
+            <a:lvl9pPr marL="4114800" lvl="8" indent="-304800">
               <a:spcBef>
                 <a:spcPts val="0"/>
               </a:spcBef>
@@ -3265,15 +3434,19 @@
               <a:defRPr sz="1200"/>
             </a:lvl9pPr>
           </a:lstStyle>
-          <a:p/>
+          <a:p>
+            <a:endParaRPr/>
+          </a:p>
         </p:txBody>
       </p:sp>
       <p:sp>
         <p:nvSpPr>
           <p:cNvPr id="23" name="Google Shape;23;p5"/>
-          <p:cNvSpPr txBox="1"/>
+          <p:cNvSpPr txBox="1">
+            <a:spLocks noGrp="1"/>
+          </p:cNvSpPr>
           <p:nvPr>
-            <p:ph idx="2" type="body"/>
+            <p:ph type="body" idx="2"/>
           </p:nvPr>
         </p:nvSpPr>
         <p:spPr>
@@ -3286,11 +3459,11 @@
           </a:prstGeom>
         </p:spPr>
         <p:txBody>
-          <a:bodyPr anchorCtr="0" anchor="t" bIns="91425" lIns="91425" spcFirstLastPara="1" rIns="91425" wrap="square" tIns="91425">
+          <a:bodyPr spcFirstLastPara="1" wrap="square" lIns="91425" tIns="91425" rIns="91425" bIns="91425" anchor="t" anchorCtr="0">
             <a:normAutofit/>
           </a:bodyPr>
           <a:lstStyle>
-            <a:lvl1pPr indent="-317500" lvl="0" marL="457200">
+            <a:lvl1pPr marL="457200" lvl="0" indent="-317500">
               <a:spcBef>
                 <a:spcPts val="0"/>
               </a:spcBef>
@@ -3301,7 +3474,7 @@
               <a:buChar char="●"/>
               <a:defRPr sz="1400"/>
             </a:lvl1pPr>
-            <a:lvl2pPr indent="-304800" lvl="1" marL="914400">
+            <a:lvl2pPr marL="914400" lvl="1" indent="-304800">
               <a:spcBef>
                 <a:spcPts val="0"/>
               </a:spcBef>
@@ -3312,7 +3485,7 @@
               <a:buChar char="○"/>
               <a:defRPr sz="1200"/>
             </a:lvl2pPr>
-            <a:lvl3pPr indent="-304800" lvl="2" marL="1371600">
+            <a:lvl3pPr marL="1371600" lvl="2" indent="-304800">
               <a:spcBef>
                 <a:spcPts val="0"/>
               </a:spcBef>
@@ -3323,7 +3496,7 @@
               <a:buChar char="■"/>
               <a:defRPr sz="1200"/>
             </a:lvl3pPr>
-            <a:lvl4pPr indent="-304800" lvl="3" marL="1828800">
+            <a:lvl4pPr marL="1828800" lvl="3" indent="-304800">
               <a:spcBef>
                 <a:spcPts val="0"/>
               </a:spcBef>
@@ -3334,7 +3507,7 @@
               <a:buChar char="●"/>
               <a:defRPr sz="1200"/>
             </a:lvl4pPr>
-            <a:lvl5pPr indent="-304800" lvl="4" marL="2286000">
+            <a:lvl5pPr marL="2286000" lvl="4" indent="-304800">
               <a:spcBef>
                 <a:spcPts val="0"/>
               </a:spcBef>
@@ -3345,7 +3518,7 @@
               <a:buChar char="○"/>
               <a:defRPr sz="1200"/>
             </a:lvl5pPr>
-            <a:lvl6pPr indent="-304800" lvl="5" marL="2743200">
+            <a:lvl6pPr marL="2743200" lvl="5" indent="-304800">
               <a:spcBef>
                 <a:spcPts val="0"/>
               </a:spcBef>
@@ -3356,7 +3529,7 @@
               <a:buChar char="■"/>
               <a:defRPr sz="1200"/>
             </a:lvl6pPr>
-            <a:lvl7pPr indent="-304800" lvl="6" marL="3200400">
+            <a:lvl7pPr marL="3200400" lvl="6" indent="-304800">
               <a:spcBef>
                 <a:spcPts val="0"/>
               </a:spcBef>
@@ -3367,7 +3540,7 @@
               <a:buChar char="●"/>
               <a:defRPr sz="1200"/>
             </a:lvl7pPr>
-            <a:lvl8pPr indent="-304800" lvl="7" marL="3657600">
+            <a:lvl8pPr marL="3657600" lvl="7" indent="-304800">
               <a:spcBef>
                 <a:spcPts val="0"/>
               </a:spcBef>
@@ -3378,7 +3551,7 @@
               <a:buChar char="○"/>
               <a:defRPr sz="1200"/>
             </a:lvl8pPr>
-            <a:lvl9pPr indent="-304800" lvl="8" marL="4114800">
+            <a:lvl9pPr marL="4114800" lvl="8" indent="-304800">
               <a:spcBef>
                 <a:spcPts val="0"/>
               </a:spcBef>
@@ -3390,15 +3563,19 @@
               <a:defRPr sz="1200"/>
             </a:lvl9pPr>
           </a:lstStyle>
-          <a:p/>
+          <a:p>
+            <a:endParaRPr/>
+          </a:p>
         </p:txBody>
       </p:sp>
       <p:sp>
         <p:nvSpPr>
           <p:cNvPr id="24" name="Google Shape;24;p5"/>
-          <p:cNvSpPr txBox="1"/>
+          <p:cNvSpPr txBox="1">
+            <a:spLocks noGrp="1"/>
+          </p:cNvSpPr>
           <p:nvPr>
-            <p:ph idx="12" type="sldNum"/>
+            <p:ph type="sldNum" idx="12"/>
           </p:nvPr>
         </p:nvSpPr>
         <p:spPr>
@@ -3411,7 +3588,7 @@
           </a:prstGeom>
         </p:spPr>
         <p:txBody>
-          <a:bodyPr anchorCtr="0" anchor="ctr" bIns="91425" lIns="91425" spcFirstLastPara="1" rIns="91425" wrap="square" tIns="91425">
+          <a:bodyPr spcFirstLastPara="1" wrap="square" lIns="91425" tIns="91425" rIns="91425" bIns="91425" anchor="ctr" anchorCtr="0">
             <a:normAutofit/>
           </a:bodyPr>
           <a:lstStyle>
@@ -3453,7 +3630,7 @@
             </a:lvl9pPr>
           </a:lstStyle>
           <a:p>
-            <a:pPr indent="0" lvl="0" marL="0" rtl="0" algn="r">
+            <a:pPr marL="0" lvl="0" indent="0" algn="r" rtl="0">
               <a:spcBef>
                 <a:spcPts val="0"/>
               </a:spcBef>
@@ -3479,11 +3656,11 @@
 </file>
 
 <file path=ppt/slideLayouts/slideLayout5.xml><?xml version="1.0" encoding="utf-8"?>
-<p:sldLayout xmlns:a="http://schemas.openxmlformats.org/drawingml/2006/main" xmlns:r="http://schemas.openxmlformats.org/officeDocument/2006/relationships" xmlns:mc="http://schemas.openxmlformats.org/markup-compatibility/2006" xmlns:mv="urn:schemas-microsoft-com:mac:vml" xmlns:p="http://schemas.openxmlformats.org/presentationml/2006/main" xmlns:c="http://schemas.openxmlformats.org/drawingml/2006/chart" xmlns:dgm="http://schemas.openxmlformats.org/drawingml/2006/diagram" xmlns:o="urn:schemas-microsoft-com:office:office" xmlns:v="urn:schemas-microsoft-com:vml" xmlns:pvml="urn:schemas-microsoft-com:office:powerpoint" xmlns:com="http://schemas.openxmlformats.org/drawingml/2006/compatibility" xmlns:p14="http://schemas.microsoft.com/office/powerpoint/2010/main" xmlns:p15="http://schemas.microsoft.com/office/powerpoint/2012/main" xmlns:ahyp="http://schemas.microsoft.com/office/drawing/2018/hyperlinkcolor" matchingName="Title only" type="titleOnly">
+<p:sldLayout xmlns:a="http://schemas.openxmlformats.org/drawingml/2006/main" xmlns:r="http://schemas.openxmlformats.org/officeDocument/2006/relationships" xmlns:p="http://schemas.openxmlformats.org/presentationml/2006/main" matchingName="Title only" type="titleOnly">
   <p:cSld name="TITLE_ONLY">
     <p:spTree>
       <p:nvGrpSpPr>
-        <p:cNvPr id="25" name="Shape 25"/>
+        <p:cNvPr id="1" name="Shape 25"/>
         <p:cNvGrpSpPr/>
         <p:nvPr/>
       </p:nvGrpSpPr>
@@ -3498,7 +3675,9 @@
       <p:sp>
         <p:nvSpPr>
           <p:cNvPr id="26" name="Google Shape;26;p6"/>
-          <p:cNvSpPr txBox="1"/>
+          <p:cNvSpPr txBox="1">
+            <a:spLocks noGrp="1"/>
+          </p:cNvSpPr>
           <p:nvPr>
             <p:ph type="title"/>
           </p:nvPr>
@@ -3513,7 +3692,7 @@
           </a:prstGeom>
         </p:spPr>
         <p:txBody>
-          <a:bodyPr anchorCtr="0" anchor="t" bIns="91425" lIns="91425" spcFirstLastPara="1" rIns="91425" wrap="square" tIns="91425">
+          <a:bodyPr spcFirstLastPara="1" wrap="square" lIns="91425" tIns="91425" rIns="91425" bIns="91425" anchor="t" anchorCtr="0">
             <a:normAutofit/>
           </a:bodyPr>
           <a:lstStyle>
@@ -3617,15 +3796,19 @@
               <a:defRPr/>
             </a:lvl9pPr>
           </a:lstStyle>
-          <a:p/>
+          <a:p>
+            <a:endParaRPr/>
+          </a:p>
         </p:txBody>
       </p:sp>
       <p:sp>
         <p:nvSpPr>
           <p:cNvPr id="27" name="Google Shape;27;p6"/>
-          <p:cNvSpPr txBox="1"/>
+          <p:cNvSpPr txBox="1">
+            <a:spLocks noGrp="1"/>
+          </p:cNvSpPr>
           <p:nvPr>
-            <p:ph idx="12" type="sldNum"/>
+            <p:ph type="sldNum" idx="12"/>
           </p:nvPr>
         </p:nvSpPr>
         <p:spPr>
@@ -3638,7 +3821,7 @@
           </a:prstGeom>
         </p:spPr>
         <p:txBody>
-          <a:bodyPr anchorCtr="0" anchor="ctr" bIns="91425" lIns="91425" spcFirstLastPara="1" rIns="91425" wrap="square" tIns="91425">
+          <a:bodyPr spcFirstLastPara="1" wrap="square" lIns="91425" tIns="91425" rIns="91425" bIns="91425" anchor="ctr" anchorCtr="0">
             <a:normAutofit/>
           </a:bodyPr>
           <a:lstStyle>
@@ -3680,7 +3863,7 @@
             </a:lvl9pPr>
           </a:lstStyle>
           <a:p>
-            <a:pPr indent="0" lvl="0" marL="0" rtl="0" algn="r">
+            <a:pPr marL="0" lvl="0" indent="0" algn="r" rtl="0">
               <a:spcBef>
                 <a:spcPts val="0"/>
               </a:spcBef>
@@ -3706,11 +3889,11 @@
 </file>
 
 <file path=ppt/slideLayouts/slideLayout6.xml><?xml version="1.0" encoding="utf-8"?>
-<p:sldLayout xmlns:a="http://schemas.openxmlformats.org/drawingml/2006/main" xmlns:r="http://schemas.openxmlformats.org/officeDocument/2006/relationships" xmlns:mc="http://schemas.openxmlformats.org/markup-compatibility/2006" xmlns:mv="urn:schemas-microsoft-com:mac:vml" xmlns:p="http://schemas.openxmlformats.org/presentationml/2006/main" xmlns:c="http://schemas.openxmlformats.org/drawingml/2006/chart" xmlns:dgm="http://schemas.openxmlformats.org/drawingml/2006/diagram" xmlns:o="urn:schemas-microsoft-com:office:office" xmlns:v="urn:schemas-microsoft-com:vml" xmlns:pvml="urn:schemas-microsoft-com:office:powerpoint" xmlns:com="http://schemas.openxmlformats.org/drawingml/2006/compatibility" xmlns:p14="http://schemas.microsoft.com/office/powerpoint/2010/main" xmlns:p15="http://schemas.microsoft.com/office/powerpoint/2012/main" xmlns:ahyp="http://schemas.microsoft.com/office/drawing/2018/hyperlinkcolor" matchingName="One column text">
+<p:sldLayout xmlns:a="http://schemas.openxmlformats.org/drawingml/2006/main" xmlns:r="http://schemas.openxmlformats.org/officeDocument/2006/relationships" xmlns:p="http://schemas.openxmlformats.org/presentationml/2006/main" matchingName="One column text">
   <p:cSld name="ONE_COLUMN_TEXT">
     <p:spTree>
       <p:nvGrpSpPr>
-        <p:cNvPr id="28" name="Shape 28"/>
+        <p:cNvPr id="1" name="Shape 28"/>
         <p:cNvGrpSpPr/>
         <p:nvPr/>
       </p:nvGrpSpPr>
@@ -3725,7 +3908,9 @@
       <p:sp>
         <p:nvSpPr>
           <p:cNvPr id="29" name="Google Shape;29;p7"/>
-          <p:cNvSpPr txBox="1"/>
+          <p:cNvSpPr txBox="1">
+            <a:spLocks noGrp="1"/>
+          </p:cNvSpPr>
           <p:nvPr>
             <p:ph type="title"/>
           </p:nvPr>
@@ -3740,7 +3925,7 @@
           </a:prstGeom>
         </p:spPr>
         <p:txBody>
-          <a:bodyPr anchorCtr="0" anchor="b" bIns="91425" lIns="91425" spcFirstLastPara="1" rIns="91425" wrap="square" tIns="91425">
+          <a:bodyPr spcFirstLastPara="1" wrap="square" lIns="91425" tIns="91425" rIns="91425" bIns="91425" anchor="b" anchorCtr="0">
             <a:normAutofit/>
           </a:bodyPr>
           <a:lstStyle>
@@ -3844,15 +4029,19 @@
               <a:defRPr sz="2400"/>
             </a:lvl9pPr>
           </a:lstStyle>
-          <a:p/>
+          <a:p>
+            <a:endParaRPr/>
+          </a:p>
         </p:txBody>
       </p:sp>
       <p:sp>
         <p:nvSpPr>
           <p:cNvPr id="30" name="Google Shape;30;p7"/>
-          <p:cNvSpPr txBox="1"/>
+          <p:cNvSpPr txBox="1">
+            <a:spLocks noGrp="1"/>
+          </p:cNvSpPr>
           <p:nvPr>
-            <p:ph idx="1" type="body"/>
+            <p:ph type="body" idx="1"/>
           </p:nvPr>
         </p:nvSpPr>
         <p:spPr>
@@ -3865,11 +4054,11 @@
           </a:prstGeom>
         </p:spPr>
         <p:txBody>
-          <a:bodyPr anchorCtr="0" anchor="t" bIns="91425" lIns="91425" spcFirstLastPara="1" rIns="91425" wrap="square" tIns="91425">
+          <a:bodyPr spcFirstLastPara="1" wrap="square" lIns="91425" tIns="91425" rIns="91425" bIns="91425" anchor="t" anchorCtr="0">
             <a:normAutofit/>
           </a:bodyPr>
           <a:lstStyle>
-            <a:lvl1pPr indent="-304800" lvl="0" marL="457200">
+            <a:lvl1pPr marL="457200" lvl="0" indent="-304800">
               <a:spcBef>
                 <a:spcPts val="0"/>
               </a:spcBef>
@@ -3880,7 +4069,7 @@
               <a:buChar char="●"/>
               <a:defRPr sz="1200"/>
             </a:lvl1pPr>
-            <a:lvl2pPr indent="-304800" lvl="1" marL="914400">
+            <a:lvl2pPr marL="914400" lvl="1" indent="-304800">
               <a:spcBef>
                 <a:spcPts val="0"/>
               </a:spcBef>
@@ -3891,7 +4080,7 @@
               <a:buChar char="○"/>
               <a:defRPr sz="1200"/>
             </a:lvl2pPr>
-            <a:lvl3pPr indent="-304800" lvl="2" marL="1371600">
+            <a:lvl3pPr marL="1371600" lvl="2" indent="-304800">
               <a:spcBef>
                 <a:spcPts val="0"/>
               </a:spcBef>
@@ -3902,7 +4091,7 @@
               <a:buChar char="■"/>
               <a:defRPr sz="1200"/>
             </a:lvl3pPr>
-            <a:lvl4pPr indent="-304800" lvl="3" marL="1828800">
+            <a:lvl4pPr marL="1828800" lvl="3" indent="-304800">
               <a:spcBef>
                 <a:spcPts val="0"/>
               </a:spcBef>
@@ -3913,7 +4102,7 @@
               <a:buChar char="●"/>
               <a:defRPr sz="1200"/>
             </a:lvl4pPr>
-            <a:lvl5pPr indent="-304800" lvl="4" marL="2286000">
+            <a:lvl5pPr marL="2286000" lvl="4" indent="-304800">
               <a:spcBef>
                 <a:spcPts val="0"/>
               </a:spcBef>
@@ -3924,7 +4113,7 @@
               <a:buChar char="○"/>
               <a:defRPr sz="1200"/>
             </a:lvl5pPr>
-            <a:lvl6pPr indent="-304800" lvl="5" marL="2743200">
+            <a:lvl6pPr marL="2743200" lvl="5" indent="-304800">
               <a:spcBef>
                 <a:spcPts val="0"/>
               </a:spcBef>
@@ -3935,7 +4124,7 @@
               <a:buChar char="■"/>
               <a:defRPr sz="1200"/>
             </a:lvl6pPr>
-            <a:lvl7pPr indent="-304800" lvl="6" marL="3200400">
+            <a:lvl7pPr marL="3200400" lvl="6" indent="-304800">
               <a:spcBef>
                 <a:spcPts val="0"/>
               </a:spcBef>
@@ -3946,7 +4135,7 @@
               <a:buChar char="●"/>
               <a:defRPr sz="1200"/>
             </a:lvl7pPr>
-            <a:lvl8pPr indent="-304800" lvl="7" marL="3657600">
+            <a:lvl8pPr marL="3657600" lvl="7" indent="-304800">
               <a:spcBef>
                 <a:spcPts val="0"/>
               </a:spcBef>
@@ -3957,7 +4146,7 @@
               <a:buChar char="○"/>
               <a:defRPr sz="1200"/>
             </a:lvl8pPr>
-            <a:lvl9pPr indent="-304800" lvl="8" marL="4114800">
+            <a:lvl9pPr marL="4114800" lvl="8" indent="-304800">
               <a:spcBef>
                 <a:spcPts val="0"/>
               </a:spcBef>
@@ -3969,15 +4158,19 @@
               <a:defRPr sz="1200"/>
             </a:lvl9pPr>
           </a:lstStyle>
-          <a:p/>
+          <a:p>
+            <a:endParaRPr/>
+          </a:p>
         </p:txBody>
       </p:sp>
       <p:sp>
         <p:nvSpPr>
           <p:cNvPr id="31" name="Google Shape;31;p7"/>
-          <p:cNvSpPr txBox="1"/>
+          <p:cNvSpPr txBox="1">
+            <a:spLocks noGrp="1"/>
+          </p:cNvSpPr>
           <p:nvPr>
-            <p:ph idx="12" type="sldNum"/>
+            <p:ph type="sldNum" idx="12"/>
           </p:nvPr>
         </p:nvSpPr>
         <p:spPr>
@@ -3990,7 +4183,7 @@
           </a:prstGeom>
         </p:spPr>
         <p:txBody>
-          <a:bodyPr anchorCtr="0" anchor="ctr" bIns="91425" lIns="91425" spcFirstLastPara="1" rIns="91425" wrap="square" tIns="91425">
+          <a:bodyPr spcFirstLastPara="1" wrap="square" lIns="91425" tIns="91425" rIns="91425" bIns="91425" anchor="ctr" anchorCtr="0">
             <a:normAutofit/>
           </a:bodyPr>
           <a:lstStyle>
@@ -4032,7 +4225,7 @@
             </a:lvl9pPr>
           </a:lstStyle>
           <a:p>
-            <a:pPr indent="0" lvl="0" marL="0" rtl="0" algn="r">
+            <a:pPr marL="0" lvl="0" indent="0" algn="r" rtl="0">
               <a:spcBef>
                 <a:spcPts val="0"/>
               </a:spcBef>
@@ -4058,11 +4251,11 @@
 </file>
 
 <file path=ppt/slideLayouts/slideLayout7.xml><?xml version="1.0" encoding="utf-8"?>
-<p:sldLayout xmlns:a="http://schemas.openxmlformats.org/drawingml/2006/main" xmlns:r="http://schemas.openxmlformats.org/officeDocument/2006/relationships" xmlns:mc="http://schemas.openxmlformats.org/markup-compatibility/2006" xmlns:mv="urn:schemas-microsoft-com:mac:vml" xmlns:p="http://schemas.openxmlformats.org/presentationml/2006/main" xmlns:c="http://schemas.openxmlformats.org/drawingml/2006/chart" xmlns:dgm="http://schemas.openxmlformats.org/drawingml/2006/diagram" xmlns:o="urn:schemas-microsoft-com:office:office" xmlns:v="urn:schemas-microsoft-com:vml" xmlns:pvml="urn:schemas-microsoft-com:office:powerpoint" xmlns:com="http://schemas.openxmlformats.org/drawingml/2006/compatibility" xmlns:p14="http://schemas.microsoft.com/office/powerpoint/2010/main" xmlns:p15="http://schemas.microsoft.com/office/powerpoint/2012/main" xmlns:ahyp="http://schemas.microsoft.com/office/drawing/2018/hyperlinkcolor" matchingName="Main point">
+<p:sldLayout xmlns:a="http://schemas.openxmlformats.org/drawingml/2006/main" xmlns:r="http://schemas.openxmlformats.org/officeDocument/2006/relationships" xmlns:p="http://schemas.openxmlformats.org/presentationml/2006/main" matchingName="Main point">
   <p:cSld name="MAIN_POINT">
     <p:spTree>
       <p:nvGrpSpPr>
-        <p:cNvPr id="32" name="Shape 32"/>
+        <p:cNvPr id="1" name="Shape 32"/>
         <p:cNvGrpSpPr/>
         <p:nvPr/>
       </p:nvGrpSpPr>
@@ -4077,7 +4270,9 @@
       <p:sp>
         <p:nvSpPr>
           <p:cNvPr id="33" name="Google Shape;33;p8"/>
-          <p:cNvSpPr txBox="1"/>
+          <p:cNvSpPr txBox="1">
+            <a:spLocks noGrp="1"/>
+          </p:cNvSpPr>
           <p:nvPr>
             <p:ph type="title"/>
           </p:nvPr>
@@ -4092,7 +4287,7 @@
           </a:prstGeom>
         </p:spPr>
         <p:txBody>
-          <a:bodyPr anchorCtr="0" anchor="ctr" bIns="91425" lIns="91425" spcFirstLastPara="1" rIns="91425" wrap="square" tIns="91425">
+          <a:bodyPr spcFirstLastPara="1" wrap="square" lIns="91425" tIns="91425" rIns="91425" bIns="91425" anchor="ctr" anchorCtr="0">
             <a:normAutofit/>
           </a:bodyPr>
           <a:lstStyle>
@@ -4196,15 +4391,19 @@
               <a:defRPr sz="4800"/>
             </a:lvl9pPr>
           </a:lstStyle>
-          <a:p/>
+          <a:p>
+            <a:endParaRPr/>
+          </a:p>
         </p:txBody>
       </p:sp>
       <p:sp>
         <p:nvSpPr>
           <p:cNvPr id="34" name="Google Shape;34;p8"/>
-          <p:cNvSpPr txBox="1"/>
+          <p:cNvSpPr txBox="1">
+            <a:spLocks noGrp="1"/>
+          </p:cNvSpPr>
           <p:nvPr>
-            <p:ph idx="12" type="sldNum"/>
+            <p:ph type="sldNum" idx="12"/>
           </p:nvPr>
         </p:nvSpPr>
         <p:spPr>
@@ -4217,7 +4416,7 @@
           </a:prstGeom>
         </p:spPr>
         <p:txBody>
-          <a:bodyPr anchorCtr="0" anchor="ctr" bIns="91425" lIns="91425" spcFirstLastPara="1" rIns="91425" wrap="square" tIns="91425">
+          <a:bodyPr spcFirstLastPara="1" wrap="square" lIns="91425" tIns="91425" rIns="91425" bIns="91425" anchor="ctr" anchorCtr="0">
             <a:normAutofit/>
           </a:bodyPr>
           <a:lstStyle>
@@ -4259,7 +4458,7 @@
             </a:lvl9pPr>
           </a:lstStyle>
           <a:p>
-            <a:pPr indent="0" lvl="0" marL="0" rtl="0" algn="r">
+            <a:pPr marL="0" lvl="0" indent="0" algn="r" rtl="0">
               <a:spcBef>
                 <a:spcPts val="0"/>
               </a:spcBef>
@@ -4285,11 +4484,11 @@
 </file>
 
 <file path=ppt/slideLayouts/slideLayout8.xml><?xml version="1.0" encoding="utf-8"?>
-<p:sldLayout xmlns:a="http://schemas.openxmlformats.org/drawingml/2006/main" xmlns:r="http://schemas.openxmlformats.org/officeDocument/2006/relationships" xmlns:mc="http://schemas.openxmlformats.org/markup-compatibility/2006" xmlns:mv="urn:schemas-microsoft-com:mac:vml" xmlns:p="http://schemas.openxmlformats.org/presentationml/2006/main" xmlns:c="http://schemas.openxmlformats.org/drawingml/2006/chart" xmlns:dgm="http://schemas.openxmlformats.org/drawingml/2006/diagram" xmlns:o="urn:schemas-microsoft-com:office:office" xmlns:v="urn:schemas-microsoft-com:vml" xmlns:pvml="urn:schemas-microsoft-com:office:powerpoint" xmlns:com="http://schemas.openxmlformats.org/drawingml/2006/compatibility" xmlns:p14="http://schemas.microsoft.com/office/powerpoint/2010/main" xmlns:p15="http://schemas.microsoft.com/office/powerpoint/2012/main" xmlns:ahyp="http://schemas.microsoft.com/office/drawing/2018/hyperlinkcolor" matchingName="Section title and description">
+<p:sldLayout xmlns:a="http://schemas.openxmlformats.org/drawingml/2006/main" xmlns:r="http://schemas.openxmlformats.org/officeDocument/2006/relationships" xmlns:p="http://schemas.openxmlformats.org/presentationml/2006/main" matchingName="Section title and description">
   <p:cSld name="SECTION_TITLE_AND_DESCRIPTION">
     <p:spTree>
       <p:nvGrpSpPr>
-        <p:cNvPr id="35" name="Shape 35"/>
+        <p:cNvPr id="1" name="Shape 35"/>
         <p:cNvGrpSpPr/>
         <p:nvPr/>
       </p:nvGrpSpPr>
@@ -4323,12 +4522,12 @@
           </a:ln>
         </p:spPr>
         <p:txBody>
-          <a:bodyPr anchorCtr="0" anchor="ctr" bIns="91425" lIns="91425" spcFirstLastPara="1" rIns="91425" wrap="square" tIns="91425">
+          <a:bodyPr spcFirstLastPara="1" wrap="square" lIns="91425" tIns="91425" rIns="91425" bIns="91425" anchor="ctr" anchorCtr="0">
             <a:noAutofit/>
           </a:bodyPr>
           <a:lstStyle/>
           <a:p>
-            <a:pPr indent="0" lvl="0" marL="0" rtl="0" algn="l">
+            <a:pPr marL="0" lvl="0" indent="0" algn="l" rtl="0">
               <a:spcBef>
                 <a:spcPts val="0"/>
               </a:spcBef>
@@ -4337,9 +4536,6 @@
               </a:spcAft>
               <a:buNone/>
             </a:pPr>
-            <a:r>
-              <a:t/>
-            </a:r>
             <a:endParaRPr/>
           </a:p>
         </p:txBody>
@@ -4347,7 +4543,9 @@
       <p:sp>
         <p:nvSpPr>
           <p:cNvPr id="37" name="Google Shape;37;p9"/>
-          <p:cNvSpPr txBox="1"/>
+          <p:cNvSpPr txBox="1">
+            <a:spLocks noGrp="1"/>
+          </p:cNvSpPr>
           <p:nvPr>
             <p:ph type="title"/>
           </p:nvPr>
@@ -4362,7 +4560,7 @@
           </a:prstGeom>
         </p:spPr>
         <p:txBody>
-          <a:bodyPr anchorCtr="0" anchor="b" bIns="91425" lIns="91425" spcFirstLastPara="1" rIns="91425" wrap="square" tIns="91425">
+          <a:bodyPr spcFirstLastPara="1" wrap="square" lIns="91425" tIns="91425" rIns="91425" bIns="91425" anchor="b" anchorCtr="0">
             <a:normAutofit/>
           </a:bodyPr>
           <a:lstStyle>
@@ -4466,15 +4664,19 @@
               <a:defRPr sz="4200"/>
             </a:lvl9pPr>
           </a:lstStyle>
-          <a:p/>
+          <a:p>
+            <a:endParaRPr/>
+          </a:p>
         </p:txBody>
       </p:sp>
       <p:sp>
         <p:nvSpPr>
           <p:cNvPr id="38" name="Google Shape;38;p9"/>
-          <p:cNvSpPr txBox="1"/>
+          <p:cNvSpPr txBox="1">
+            <a:spLocks noGrp="1"/>
+          </p:cNvSpPr>
           <p:nvPr>
-            <p:ph idx="1" type="subTitle"/>
+            <p:ph type="subTitle" idx="1"/>
           </p:nvPr>
         </p:nvSpPr>
         <p:spPr>
@@ -4487,7 +4689,7 @@
           </a:prstGeom>
         </p:spPr>
         <p:txBody>
-          <a:bodyPr anchorCtr="0" anchor="t" bIns="91425" lIns="91425" spcFirstLastPara="1" rIns="91425" wrap="square" tIns="91425">
+          <a:bodyPr spcFirstLastPara="1" wrap="square" lIns="91425" tIns="91425" rIns="91425" bIns="91425" anchor="t" anchorCtr="0">
             <a:normAutofit/>
           </a:bodyPr>
           <a:lstStyle>
@@ -4618,15 +4820,19 @@
               <a:defRPr sz="2100"/>
             </a:lvl9pPr>
           </a:lstStyle>
-          <a:p/>
+          <a:p>
+            <a:endParaRPr/>
+          </a:p>
         </p:txBody>
       </p:sp>
       <p:sp>
         <p:nvSpPr>
           <p:cNvPr id="39" name="Google Shape;39;p9"/>
-          <p:cNvSpPr txBox="1"/>
+          <p:cNvSpPr txBox="1">
+            <a:spLocks noGrp="1"/>
+          </p:cNvSpPr>
           <p:nvPr>
-            <p:ph idx="2" type="body"/>
+            <p:ph type="body" idx="2"/>
           </p:nvPr>
         </p:nvSpPr>
         <p:spPr>
@@ -4639,11 +4845,11 @@
           </a:prstGeom>
         </p:spPr>
         <p:txBody>
-          <a:bodyPr anchorCtr="0" anchor="ctr" bIns="91425" lIns="91425" spcFirstLastPara="1" rIns="91425" wrap="square" tIns="91425">
+          <a:bodyPr spcFirstLastPara="1" wrap="square" lIns="91425" tIns="91425" rIns="91425" bIns="91425" anchor="ctr" anchorCtr="0">
             <a:normAutofit/>
           </a:bodyPr>
           <a:lstStyle>
-            <a:lvl1pPr indent="-342900" lvl="0" marL="457200">
+            <a:lvl1pPr marL="457200" lvl="0" indent="-342900">
               <a:spcBef>
                 <a:spcPts val="0"/>
               </a:spcBef>
@@ -4654,7 +4860,7 @@
               <a:buChar char="●"/>
               <a:defRPr/>
             </a:lvl1pPr>
-            <a:lvl2pPr indent="-317500" lvl="1" marL="914400">
+            <a:lvl2pPr marL="914400" lvl="1" indent="-317500">
               <a:spcBef>
                 <a:spcPts val="0"/>
               </a:spcBef>
@@ -4665,7 +4871,7 @@
               <a:buChar char="○"/>
               <a:defRPr/>
             </a:lvl2pPr>
-            <a:lvl3pPr indent="-317500" lvl="2" marL="1371600">
+            <a:lvl3pPr marL="1371600" lvl="2" indent="-317500">
               <a:spcBef>
                 <a:spcPts val="0"/>
               </a:spcBef>
@@ -4676,7 +4882,7 @@
               <a:buChar char="■"/>
               <a:defRPr/>
             </a:lvl3pPr>
-            <a:lvl4pPr indent="-317500" lvl="3" marL="1828800">
+            <a:lvl4pPr marL="1828800" lvl="3" indent="-317500">
               <a:spcBef>
                 <a:spcPts val="0"/>
               </a:spcBef>
@@ -4687,7 +4893,7 @@
               <a:buChar char="●"/>
               <a:defRPr/>
             </a:lvl4pPr>
-            <a:lvl5pPr indent="-317500" lvl="4" marL="2286000">
+            <a:lvl5pPr marL="2286000" lvl="4" indent="-317500">
               <a:spcBef>
                 <a:spcPts val="0"/>
               </a:spcBef>
@@ -4698,7 +4904,7 @@
               <a:buChar char="○"/>
               <a:defRPr/>
             </a:lvl5pPr>
-            <a:lvl6pPr indent="-317500" lvl="5" marL="2743200">
+            <a:lvl6pPr marL="2743200" lvl="5" indent="-317500">
               <a:spcBef>
                 <a:spcPts val="0"/>
               </a:spcBef>
@@ -4709,7 +4915,7 @@
               <a:buChar char="■"/>
               <a:defRPr/>
             </a:lvl6pPr>
-            <a:lvl7pPr indent="-317500" lvl="6" marL="3200400">
+            <a:lvl7pPr marL="3200400" lvl="6" indent="-317500">
               <a:spcBef>
                 <a:spcPts val="0"/>
               </a:spcBef>
@@ -4720,7 +4926,7 @@
               <a:buChar char="●"/>
               <a:defRPr/>
             </a:lvl7pPr>
-            <a:lvl8pPr indent="-317500" lvl="7" marL="3657600">
+            <a:lvl8pPr marL="3657600" lvl="7" indent="-317500">
               <a:spcBef>
                 <a:spcPts val="0"/>
               </a:spcBef>
@@ -4731,7 +4937,7 @@
               <a:buChar char="○"/>
               <a:defRPr/>
             </a:lvl8pPr>
-            <a:lvl9pPr indent="-317500" lvl="8" marL="4114800">
+            <a:lvl9pPr marL="4114800" lvl="8" indent="-317500">
               <a:spcBef>
                 <a:spcPts val="0"/>
               </a:spcBef>
@@ -4743,15 +4949,19 @@
               <a:defRPr/>
             </a:lvl9pPr>
           </a:lstStyle>
-          <a:p/>
+          <a:p>
+            <a:endParaRPr/>
+          </a:p>
         </p:txBody>
       </p:sp>
       <p:sp>
         <p:nvSpPr>
           <p:cNvPr id="40" name="Google Shape;40;p9"/>
-          <p:cNvSpPr txBox="1"/>
+          <p:cNvSpPr txBox="1">
+            <a:spLocks noGrp="1"/>
+          </p:cNvSpPr>
           <p:nvPr>
-            <p:ph idx="12" type="sldNum"/>
+            <p:ph type="sldNum" idx="12"/>
           </p:nvPr>
         </p:nvSpPr>
         <p:spPr>
@@ -4764,7 +4974,7 @@
           </a:prstGeom>
         </p:spPr>
         <p:txBody>
-          <a:bodyPr anchorCtr="0" anchor="ctr" bIns="91425" lIns="91425" spcFirstLastPara="1" rIns="91425" wrap="square" tIns="91425">
+          <a:bodyPr spcFirstLastPara="1" wrap="square" lIns="91425" tIns="91425" rIns="91425" bIns="91425" anchor="ctr" anchorCtr="0">
             <a:normAutofit/>
           </a:bodyPr>
           <a:lstStyle>
@@ -4806,7 +5016,7 @@
             </a:lvl9pPr>
           </a:lstStyle>
           <a:p>
-            <a:pPr indent="0" lvl="0" marL="0" rtl="0" algn="r">
+            <a:pPr marL="0" lvl="0" indent="0" algn="r" rtl="0">
               <a:spcBef>
                 <a:spcPts val="0"/>
               </a:spcBef>
@@ -4832,11 +5042,11 @@
 </file>
 
 <file path=ppt/slideLayouts/slideLayout9.xml><?xml version="1.0" encoding="utf-8"?>
-<p:sldLayout xmlns:a="http://schemas.openxmlformats.org/drawingml/2006/main" xmlns:r="http://schemas.openxmlformats.org/officeDocument/2006/relationships" xmlns:mc="http://schemas.openxmlformats.org/markup-compatibility/2006" xmlns:mv="urn:schemas-microsoft-com:mac:vml" xmlns:p="http://schemas.openxmlformats.org/presentationml/2006/main" xmlns:c="http://schemas.openxmlformats.org/drawingml/2006/chart" xmlns:dgm="http://schemas.openxmlformats.org/drawingml/2006/diagram" xmlns:o="urn:schemas-microsoft-com:office:office" xmlns:v="urn:schemas-microsoft-com:vml" xmlns:pvml="urn:schemas-microsoft-com:office:powerpoint" xmlns:com="http://schemas.openxmlformats.org/drawingml/2006/compatibility" xmlns:p14="http://schemas.microsoft.com/office/powerpoint/2010/main" xmlns:p15="http://schemas.microsoft.com/office/powerpoint/2012/main" xmlns:ahyp="http://schemas.microsoft.com/office/drawing/2018/hyperlinkcolor" matchingName="Caption">
+<p:sldLayout xmlns:a="http://schemas.openxmlformats.org/drawingml/2006/main" xmlns:r="http://schemas.openxmlformats.org/officeDocument/2006/relationships" xmlns:p="http://schemas.openxmlformats.org/presentationml/2006/main" matchingName="Caption">
   <p:cSld name="CAPTION_ONLY">
     <p:spTree>
       <p:nvGrpSpPr>
-        <p:cNvPr id="41" name="Shape 41"/>
+        <p:cNvPr id="1" name="Shape 41"/>
         <p:cNvGrpSpPr/>
         <p:nvPr/>
       </p:nvGrpSpPr>
@@ -4851,9 +5061,11 @@
       <p:sp>
         <p:nvSpPr>
           <p:cNvPr id="42" name="Google Shape;42;p10"/>
-          <p:cNvSpPr txBox="1"/>
+          <p:cNvSpPr txBox="1">
+            <a:spLocks noGrp="1"/>
+          </p:cNvSpPr>
           <p:nvPr>
-            <p:ph idx="1" type="body"/>
+            <p:ph type="body" idx="1"/>
           </p:nvPr>
         </p:nvSpPr>
         <p:spPr>
@@ -4866,11 +5078,11 @@
           </a:prstGeom>
         </p:spPr>
         <p:txBody>
-          <a:bodyPr anchorCtr="0" anchor="ctr" bIns="91425" lIns="91425" spcFirstLastPara="1" rIns="91425" wrap="square" tIns="91425">
+          <a:bodyPr spcFirstLastPara="1" wrap="square" lIns="91425" tIns="91425" rIns="91425" bIns="91425" anchor="ctr" anchorCtr="0">
             <a:normAutofit/>
           </a:bodyPr>
           <a:lstStyle>
-            <a:lvl1pPr indent="-228600" lvl="0" marL="457200">
+            <a:lvl1pPr marL="457200" lvl="0" indent="-228600">
               <a:lnSpc>
                 <a:spcPct val="100000"/>
               </a:lnSpc>
@@ -4885,15 +5097,19 @@
               <a:defRPr/>
             </a:lvl1pPr>
           </a:lstStyle>
-          <a:p/>
+          <a:p>
+            <a:endParaRPr/>
+          </a:p>
         </p:txBody>
       </p:sp>
       <p:sp>
         <p:nvSpPr>
           <p:cNvPr id="43" name="Google Shape;43;p10"/>
-          <p:cNvSpPr txBox="1"/>
+          <p:cNvSpPr txBox="1">
+            <a:spLocks noGrp="1"/>
+          </p:cNvSpPr>
           <p:nvPr>
-            <p:ph idx="12" type="sldNum"/>
+            <p:ph type="sldNum" idx="12"/>
           </p:nvPr>
         </p:nvSpPr>
         <p:spPr>
@@ -4906,7 +5122,7 @@
           </a:prstGeom>
         </p:spPr>
         <p:txBody>
-          <a:bodyPr anchorCtr="0" anchor="ctr" bIns="91425" lIns="91425" spcFirstLastPara="1" rIns="91425" wrap="square" tIns="91425">
+          <a:bodyPr spcFirstLastPara="1" wrap="square" lIns="91425" tIns="91425" rIns="91425" bIns="91425" anchor="ctr" anchorCtr="0">
             <a:normAutofit/>
           </a:bodyPr>
           <a:lstStyle>
@@ -4948,7 +5164,7 @@
             </a:lvl9pPr>
           </a:lstStyle>
           <a:p>
-            <a:pPr indent="0" lvl="0" marL="0" rtl="0" algn="r">
+            <a:pPr marL="0" lvl="0" indent="0" algn="r" rtl="0">
               <a:spcBef>
                 <a:spcPts val="0"/>
               </a:spcBef>
@@ -4974,18 +5190,19 @@
 </file>
 
 <file path=ppt/slideMasters/slideMaster1.xml><?xml version="1.0" encoding="utf-8"?>
-<p:sldMaster xmlns:a="http://schemas.openxmlformats.org/drawingml/2006/main" xmlns:r="http://schemas.openxmlformats.org/officeDocument/2006/relationships" xmlns:mc="http://schemas.openxmlformats.org/markup-compatibility/2006" xmlns:mv="urn:schemas-microsoft-com:mac:vml" xmlns:p="http://schemas.openxmlformats.org/presentationml/2006/main" xmlns:c="http://schemas.openxmlformats.org/drawingml/2006/chart" xmlns:dgm="http://schemas.openxmlformats.org/drawingml/2006/diagram" xmlns:o="urn:schemas-microsoft-com:office:office" xmlns:v="urn:schemas-microsoft-com:vml" xmlns:pvml="urn:schemas-microsoft-com:office:powerpoint" xmlns:com="http://schemas.openxmlformats.org/drawingml/2006/compatibility" xmlns:p14="http://schemas.microsoft.com/office/powerpoint/2010/main" xmlns:p15="http://schemas.microsoft.com/office/powerpoint/2012/main" xmlns:ahyp="http://schemas.microsoft.com/office/drawing/2018/hyperlinkcolor">
+<p:sldMaster xmlns:a="http://schemas.openxmlformats.org/drawingml/2006/main" xmlns:r="http://schemas.openxmlformats.org/officeDocument/2006/relationships" xmlns:p="http://schemas.openxmlformats.org/presentationml/2006/main">
   <p:cSld name="simple-light-2">
     <p:bg>
       <p:bgPr>
         <a:solidFill>
           <a:schemeClr val="lt1"/>
         </a:solidFill>
+        <a:effectLst/>
       </p:bgPr>
     </p:bg>
     <p:spTree>
       <p:nvGrpSpPr>
-        <p:cNvPr id="5" name="Shape 5"/>
+        <p:cNvPr id="1" name="Shape 5"/>
         <p:cNvGrpSpPr/>
         <p:nvPr/>
       </p:nvGrpSpPr>
@@ -5000,7 +5217,9 @@
       <p:sp>
         <p:nvSpPr>
           <p:cNvPr id="6" name="Google Shape;6;p1"/>
-          <p:cNvSpPr txBox="1"/>
+          <p:cNvSpPr txBox="1">
+            <a:spLocks noGrp="1"/>
+          </p:cNvSpPr>
           <p:nvPr>
             <p:ph type="title"/>
           </p:nvPr>
@@ -5019,7 +5238,7 @@
           </a:ln>
         </p:spPr>
         <p:txBody>
-          <a:bodyPr anchorCtr="0" anchor="t" bIns="91425" lIns="91425" spcFirstLastPara="1" rIns="91425" wrap="square" tIns="91425">
+          <a:bodyPr spcFirstLastPara="1" wrap="square" lIns="91425" tIns="91425" rIns="91425" bIns="91425" anchor="t" anchorCtr="0">
             <a:normAutofit/>
           </a:bodyPr>
           <a:lstStyle>
@@ -5186,15 +5405,19 @@
               </a:defRPr>
             </a:lvl9pPr>
           </a:lstStyle>
-          <a:p/>
+          <a:p>
+            <a:endParaRPr/>
+          </a:p>
         </p:txBody>
       </p:sp>
       <p:sp>
         <p:nvSpPr>
           <p:cNvPr id="7" name="Google Shape;7;p1"/>
-          <p:cNvSpPr txBox="1"/>
+          <p:cNvSpPr txBox="1">
+            <a:spLocks noGrp="1"/>
+          </p:cNvSpPr>
           <p:nvPr>
-            <p:ph idx="1" type="body"/>
+            <p:ph type="body" idx="1"/>
           </p:nvPr>
         </p:nvSpPr>
         <p:spPr>
@@ -5211,11 +5434,11 @@
           </a:ln>
         </p:spPr>
         <p:txBody>
-          <a:bodyPr anchorCtr="0" anchor="t" bIns="91425" lIns="91425" spcFirstLastPara="1" rIns="91425" wrap="square" tIns="91425">
+          <a:bodyPr spcFirstLastPara="1" wrap="square" lIns="91425" tIns="91425" rIns="91425" bIns="91425" anchor="t" anchorCtr="0">
             <a:normAutofit/>
           </a:bodyPr>
           <a:lstStyle>
-            <a:lvl1pPr indent="-342900" lvl="0" marL="457200">
+            <a:lvl1pPr marL="457200" lvl="0" indent="-342900">
               <a:lnSpc>
                 <a:spcPct val="115000"/>
               </a:lnSpc>
@@ -5236,7 +5459,7 @@
                 </a:solidFill>
               </a:defRPr>
             </a:lvl1pPr>
-            <a:lvl2pPr indent="-317500" lvl="1" marL="914400">
+            <a:lvl2pPr marL="914400" lvl="1" indent="-317500">
               <a:lnSpc>
                 <a:spcPct val="115000"/>
               </a:lnSpc>
@@ -5257,7 +5480,7 @@
                 </a:solidFill>
               </a:defRPr>
             </a:lvl2pPr>
-            <a:lvl3pPr indent="-317500" lvl="2" marL="1371600">
+            <a:lvl3pPr marL="1371600" lvl="2" indent="-317500">
               <a:lnSpc>
                 <a:spcPct val="115000"/>
               </a:lnSpc>
@@ -5278,7 +5501,7 @@
                 </a:solidFill>
               </a:defRPr>
             </a:lvl3pPr>
-            <a:lvl4pPr indent="-317500" lvl="3" marL="1828800">
+            <a:lvl4pPr marL="1828800" lvl="3" indent="-317500">
               <a:lnSpc>
                 <a:spcPct val="115000"/>
               </a:lnSpc>
@@ -5299,7 +5522,7 @@
                 </a:solidFill>
               </a:defRPr>
             </a:lvl4pPr>
-            <a:lvl5pPr indent="-317500" lvl="4" marL="2286000">
+            <a:lvl5pPr marL="2286000" lvl="4" indent="-317500">
               <a:lnSpc>
                 <a:spcPct val="115000"/>
               </a:lnSpc>
@@ -5320,7 +5543,7 @@
                 </a:solidFill>
               </a:defRPr>
             </a:lvl5pPr>
-            <a:lvl6pPr indent="-317500" lvl="5" marL="2743200">
+            <a:lvl6pPr marL="2743200" lvl="5" indent="-317500">
               <a:lnSpc>
                 <a:spcPct val="115000"/>
               </a:lnSpc>
@@ -5341,7 +5564,7 @@
                 </a:solidFill>
               </a:defRPr>
             </a:lvl6pPr>
-            <a:lvl7pPr indent="-317500" lvl="6" marL="3200400">
+            <a:lvl7pPr marL="3200400" lvl="6" indent="-317500">
               <a:lnSpc>
                 <a:spcPct val="115000"/>
               </a:lnSpc>
@@ -5362,7 +5585,7 @@
                 </a:solidFill>
               </a:defRPr>
             </a:lvl7pPr>
-            <a:lvl8pPr indent="-317500" lvl="7" marL="3657600">
+            <a:lvl8pPr marL="3657600" lvl="7" indent="-317500">
               <a:lnSpc>
                 <a:spcPct val="115000"/>
               </a:lnSpc>
@@ -5383,7 +5606,7 @@
                 </a:solidFill>
               </a:defRPr>
             </a:lvl8pPr>
-            <a:lvl9pPr indent="-317500" lvl="8" marL="4114800">
+            <a:lvl9pPr marL="4114800" lvl="8" indent="-317500">
               <a:lnSpc>
                 <a:spcPct val="115000"/>
               </a:lnSpc>
@@ -5405,15 +5628,19 @@
               </a:defRPr>
             </a:lvl9pPr>
           </a:lstStyle>
-          <a:p/>
+          <a:p>
+            <a:endParaRPr/>
+          </a:p>
         </p:txBody>
       </p:sp>
       <p:sp>
         <p:nvSpPr>
           <p:cNvPr id="8" name="Google Shape;8;p1"/>
-          <p:cNvSpPr txBox="1"/>
+          <p:cNvSpPr txBox="1">
+            <a:spLocks noGrp="1"/>
+          </p:cNvSpPr>
           <p:nvPr>
-            <p:ph idx="12" type="sldNum"/>
+            <p:ph type="sldNum" idx="12"/>
           </p:nvPr>
         </p:nvSpPr>
         <p:spPr>
@@ -5430,7 +5657,7 @@
           </a:ln>
         </p:spPr>
         <p:txBody>
-          <a:bodyPr anchorCtr="0" anchor="ctr" bIns="91425" lIns="91425" spcFirstLastPara="1" rIns="91425" wrap="square" tIns="91425">
+          <a:bodyPr spcFirstLastPara="1" wrap="square" lIns="91425" tIns="91425" rIns="91425" bIns="91425" anchor="ctr" anchorCtr="0">
             <a:normAutofit/>
           </a:bodyPr>
           <a:lstStyle>
@@ -5508,7 +5735,7 @@
             </a:lvl9pPr>
           </a:lstStyle>
           <a:p>
-            <a:pPr indent="0" lvl="0" marL="0" rtl="0" algn="r">
+            <a:pPr marL="0" lvl="0" indent="0" algn="r" rtl="0">
               <a:spcBef>
                 <a:spcPts val="0"/>
               </a:spcBef>
@@ -5527,7 +5754,7 @@
       </p:sp>
     </p:spTree>
   </p:cSld>
-  <p:clrMap accent1="accent1" accent2="accent2" accent3="accent3" accent4="accent4" accent5="accent5" accent6="accent6" bg1="lt1" bg2="dk2" tx1="dk1" tx2="lt2" folHlink="folHlink" hlink="hlink"/>
+  <p:clrMap bg1="lt1" tx1="dk1" bg2="dk2" tx2="lt2" accent1="accent1" accent2="accent2" accent3="accent3" accent4="accent4" accent5="accent5" accent6="accent6" hlink="hlink" folHlink="folHlink"/>
   <p:sldLayoutIdLst>
     <p:sldLayoutId id="2147483648" r:id="rId1"/>
     <p:sldLayoutId id="2147483649" r:id="rId2"/>
@@ -5541,10 +5768,10 @@
     <p:sldLayoutId id="2147483657" r:id="rId10"/>
     <p:sldLayoutId id="2147483658" r:id="rId11"/>
   </p:sldLayoutIdLst>
-  <p:hf dt="0" ftr="0" hdr="0" sldNum="0"/>
+  <p:hf sldNum="0" hdr="0" ftr="0" dt="0"/>
   <p:txStyles>
     <p:titleStyle>
-      <a:defPPr lvl="0" marR="0" rtl="0" algn="l">
+      <a:defPPr marR="0" lvl="0" algn="l" rtl="0">
         <a:lnSpc>
           <a:spcPct val="100000"/>
         </a:lnSpc>
@@ -5555,7 +5782,7 @@
           <a:spcPts val="0"/>
         </a:spcAft>
       </a:defPPr>
-      <a:lvl1pPr lvl="0" marR="0" rtl="0" algn="l">
+      <a:lvl1pPr marR="0" lvl="0" algn="l" rtl="0">
         <a:lnSpc>
           <a:spcPct val="100000"/>
         </a:lnSpc>
@@ -5569,7 +5796,7 @@
           <a:srgbClr val="000000"/>
         </a:buClr>
         <a:buFont typeface="Arial"/>
-        <a:defRPr b="0" i="0" sz="1400" u="none" cap="none" strike="noStrike">
+        <a:defRPr sz="1400" b="0" i="0" u="none" strike="noStrike" cap="none">
           <a:solidFill>
             <a:srgbClr val="000000"/>
           </a:solidFill>
@@ -5579,7 +5806,7 @@
           <a:sym typeface="Arial"/>
         </a:defRPr>
       </a:lvl1pPr>
-      <a:lvl2pPr lvl="1" marR="0" rtl="0" algn="l">
+      <a:lvl2pPr marR="0" lvl="1" algn="l" rtl="0">
         <a:lnSpc>
           <a:spcPct val="100000"/>
         </a:lnSpc>
@@ -5593,7 +5820,7 @@
           <a:srgbClr val="000000"/>
         </a:buClr>
         <a:buFont typeface="Arial"/>
-        <a:defRPr b="0" i="0" sz="1400" u="none" cap="none" strike="noStrike">
+        <a:defRPr sz="1400" b="0" i="0" u="none" strike="noStrike" cap="none">
           <a:solidFill>
             <a:srgbClr val="000000"/>
           </a:solidFill>
@@ -5603,7 +5830,7 @@
           <a:sym typeface="Arial"/>
         </a:defRPr>
       </a:lvl2pPr>
-      <a:lvl3pPr lvl="2" marR="0" rtl="0" algn="l">
+      <a:lvl3pPr marR="0" lvl="2" algn="l" rtl="0">
         <a:lnSpc>
           <a:spcPct val="100000"/>
         </a:lnSpc>
@@ -5617,7 +5844,7 @@
           <a:srgbClr val="000000"/>
         </a:buClr>
         <a:buFont typeface="Arial"/>
-        <a:defRPr b="0" i="0" sz="1400" u="none" cap="none" strike="noStrike">
+        <a:defRPr sz="1400" b="0" i="0" u="none" strike="noStrike" cap="none">
           <a:solidFill>
             <a:srgbClr val="000000"/>
           </a:solidFill>
@@ -5627,7 +5854,7 @@
           <a:sym typeface="Arial"/>
         </a:defRPr>
       </a:lvl3pPr>
-      <a:lvl4pPr lvl="3" marR="0" rtl="0" algn="l">
+      <a:lvl4pPr marR="0" lvl="3" algn="l" rtl="0">
         <a:lnSpc>
           <a:spcPct val="100000"/>
         </a:lnSpc>
@@ -5641,7 +5868,7 @@
           <a:srgbClr val="000000"/>
         </a:buClr>
         <a:buFont typeface="Arial"/>
-        <a:defRPr b="0" i="0" sz="1400" u="none" cap="none" strike="noStrike">
+        <a:defRPr sz="1400" b="0" i="0" u="none" strike="noStrike" cap="none">
           <a:solidFill>
             <a:srgbClr val="000000"/>
           </a:solidFill>
@@ -5651,7 +5878,7 @@
           <a:sym typeface="Arial"/>
         </a:defRPr>
       </a:lvl4pPr>
-      <a:lvl5pPr lvl="4" marR="0" rtl="0" algn="l">
+      <a:lvl5pPr marR="0" lvl="4" algn="l" rtl="0">
         <a:lnSpc>
           <a:spcPct val="100000"/>
         </a:lnSpc>
@@ -5665,7 +5892,7 @@
           <a:srgbClr val="000000"/>
         </a:buClr>
         <a:buFont typeface="Arial"/>
-        <a:defRPr b="0" i="0" sz="1400" u="none" cap="none" strike="noStrike">
+        <a:defRPr sz="1400" b="0" i="0" u="none" strike="noStrike" cap="none">
           <a:solidFill>
             <a:srgbClr val="000000"/>
           </a:solidFill>
@@ -5675,7 +5902,7 @@
           <a:sym typeface="Arial"/>
         </a:defRPr>
       </a:lvl5pPr>
-      <a:lvl6pPr lvl="5" marR="0" rtl="0" algn="l">
+      <a:lvl6pPr marR="0" lvl="5" algn="l" rtl="0">
         <a:lnSpc>
           <a:spcPct val="100000"/>
         </a:lnSpc>
@@ -5689,7 +5916,7 @@
           <a:srgbClr val="000000"/>
         </a:buClr>
         <a:buFont typeface="Arial"/>
-        <a:defRPr b="0" i="0" sz="1400" u="none" cap="none" strike="noStrike">
+        <a:defRPr sz="1400" b="0" i="0" u="none" strike="noStrike" cap="none">
           <a:solidFill>
             <a:srgbClr val="000000"/>
           </a:solidFill>
@@ -5699,7 +5926,7 @@
           <a:sym typeface="Arial"/>
         </a:defRPr>
       </a:lvl6pPr>
-      <a:lvl7pPr lvl="6" marR="0" rtl="0" algn="l">
+      <a:lvl7pPr marR="0" lvl="6" algn="l" rtl="0">
         <a:lnSpc>
           <a:spcPct val="100000"/>
         </a:lnSpc>
@@ -5713,7 +5940,7 @@
           <a:srgbClr val="000000"/>
         </a:buClr>
         <a:buFont typeface="Arial"/>
-        <a:defRPr b="0" i="0" sz="1400" u="none" cap="none" strike="noStrike">
+        <a:defRPr sz="1400" b="0" i="0" u="none" strike="noStrike" cap="none">
           <a:solidFill>
             <a:srgbClr val="000000"/>
           </a:solidFill>
@@ -5723,7 +5950,7 @@
           <a:sym typeface="Arial"/>
         </a:defRPr>
       </a:lvl7pPr>
-      <a:lvl8pPr lvl="7" marR="0" rtl="0" algn="l">
+      <a:lvl8pPr marR="0" lvl="7" algn="l" rtl="0">
         <a:lnSpc>
           <a:spcPct val="100000"/>
         </a:lnSpc>
@@ -5737,7 +5964,7 @@
           <a:srgbClr val="000000"/>
         </a:buClr>
         <a:buFont typeface="Arial"/>
-        <a:defRPr b="0" i="0" sz="1400" u="none" cap="none" strike="noStrike">
+        <a:defRPr sz="1400" b="0" i="0" u="none" strike="noStrike" cap="none">
           <a:solidFill>
             <a:srgbClr val="000000"/>
           </a:solidFill>
@@ -5747,7 +5974,7 @@
           <a:sym typeface="Arial"/>
         </a:defRPr>
       </a:lvl8pPr>
-      <a:lvl9pPr lvl="8" marR="0" rtl="0" algn="l">
+      <a:lvl9pPr marR="0" lvl="8" algn="l" rtl="0">
         <a:lnSpc>
           <a:spcPct val="100000"/>
         </a:lnSpc>
@@ -5761,7 +5988,7 @@
           <a:srgbClr val="000000"/>
         </a:buClr>
         <a:buFont typeface="Arial"/>
-        <a:defRPr b="0" i="0" sz="1400" u="none" cap="none" strike="noStrike">
+        <a:defRPr sz="1400" b="0" i="0" u="none" strike="noStrike" cap="none">
           <a:solidFill>
             <a:srgbClr val="000000"/>
           </a:solidFill>
@@ -5773,7 +6000,7 @@
       </a:lvl9pPr>
     </p:titleStyle>
     <p:bodyStyle>
-      <a:defPPr lvl="0" marR="0" rtl="0" algn="l">
+      <a:defPPr marR="0" lvl="0" algn="l" rtl="0">
         <a:lnSpc>
           <a:spcPct val="100000"/>
         </a:lnSpc>
@@ -5784,7 +6011,7 @@
           <a:spcPts val="0"/>
         </a:spcAft>
       </a:defPPr>
-      <a:lvl1pPr lvl="0" marR="0" rtl="0" algn="l">
+      <a:lvl1pPr marR="0" lvl="0" algn="l" rtl="0">
         <a:lnSpc>
           <a:spcPct val="100000"/>
         </a:lnSpc>
@@ -5798,7 +6025,7 @@
           <a:srgbClr val="000000"/>
         </a:buClr>
         <a:buFont typeface="Arial"/>
-        <a:defRPr b="0" i="0" sz="1400" u="none" cap="none" strike="noStrike">
+        <a:defRPr sz="1400" b="0" i="0" u="none" strike="noStrike" cap="none">
           <a:solidFill>
             <a:srgbClr val="000000"/>
           </a:solidFill>
@@ -5808,7 +6035,7 @@
           <a:sym typeface="Arial"/>
         </a:defRPr>
       </a:lvl1pPr>
-      <a:lvl2pPr lvl="1" marR="0" rtl="0" algn="l">
+      <a:lvl2pPr marR="0" lvl="1" algn="l" rtl="0">
         <a:lnSpc>
           <a:spcPct val="100000"/>
         </a:lnSpc>
@@ -5822,7 +6049,7 @@
           <a:srgbClr val="000000"/>
         </a:buClr>
         <a:buFont typeface="Arial"/>
-        <a:defRPr b="0" i="0" sz="1400" u="none" cap="none" strike="noStrike">
+        <a:defRPr sz="1400" b="0" i="0" u="none" strike="noStrike" cap="none">
           <a:solidFill>
             <a:srgbClr val="000000"/>
           </a:solidFill>
@@ -5832,7 +6059,7 @@
           <a:sym typeface="Arial"/>
         </a:defRPr>
       </a:lvl2pPr>
-      <a:lvl3pPr lvl="2" marR="0" rtl="0" algn="l">
+      <a:lvl3pPr marR="0" lvl="2" algn="l" rtl="0">
         <a:lnSpc>
           <a:spcPct val="100000"/>
         </a:lnSpc>
@@ -5846,7 +6073,7 @@
           <a:srgbClr val="000000"/>
         </a:buClr>
         <a:buFont typeface="Arial"/>
-        <a:defRPr b="0" i="0" sz="1400" u="none" cap="none" strike="noStrike">
+        <a:defRPr sz="1400" b="0" i="0" u="none" strike="noStrike" cap="none">
           <a:solidFill>
             <a:srgbClr val="000000"/>
           </a:solidFill>
@@ -5856,7 +6083,7 @@
           <a:sym typeface="Arial"/>
         </a:defRPr>
       </a:lvl3pPr>
-      <a:lvl4pPr lvl="3" marR="0" rtl="0" algn="l">
+      <a:lvl4pPr marR="0" lvl="3" algn="l" rtl="0">
         <a:lnSpc>
           <a:spcPct val="100000"/>
         </a:lnSpc>
@@ -5870,7 +6097,7 @@
           <a:srgbClr val="000000"/>
         </a:buClr>
         <a:buFont typeface="Arial"/>
-        <a:defRPr b="0" i="0" sz="1400" u="none" cap="none" strike="noStrike">
+        <a:defRPr sz="1400" b="0" i="0" u="none" strike="noStrike" cap="none">
           <a:solidFill>
             <a:srgbClr val="000000"/>
           </a:solidFill>
@@ -5880,7 +6107,7 @@
           <a:sym typeface="Arial"/>
         </a:defRPr>
       </a:lvl4pPr>
-      <a:lvl5pPr lvl="4" marR="0" rtl="0" algn="l">
+      <a:lvl5pPr marR="0" lvl="4" algn="l" rtl="0">
         <a:lnSpc>
           <a:spcPct val="100000"/>
         </a:lnSpc>
@@ -5894,7 +6121,7 @@
           <a:srgbClr val="000000"/>
         </a:buClr>
         <a:buFont typeface="Arial"/>
-        <a:defRPr b="0" i="0" sz="1400" u="none" cap="none" strike="noStrike">
+        <a:defRPr sz="1400" b="0" i="0" u="none" strike="noStrike" cap="none">
           <a:solidFill>
             <a:srgbClr val="000000"/>
           </a:solidFill>
@@ -5904,7 +6131,7 @@
           <a:sym typeface="Arial"/>
         </a:defRPr>
       </a:lvl5pPr>
-      <a:lvl6pPr lvl="5" marR="0" rtl="0" algn="l">
+      <a:lvl6pPr marR="0" lvl="5" algn="l" rtl="0">
         <a:lnSpc>
           <a:spcPct val="100000"/>
         </a:lnSpc>
@@ -5918,7 +6145,7 @@
           <a:srgbClr val="000000"/>
         </a:buClr>
         <a:buFont typeface="Arial"/>
-        <a:defRPr b="0" i="0" sz="1400" u="none" cap="none" strike="noStrike">
+        <a:defRPr sz="1400" b="0" i="0" u="none" strike="noStrike" cap="none">
           <a:solidFill>
             <a:srgbClr val="000000"/>
           </a:solidFill>
@@ -5928,7 +6155,7 @@
           <a:sym typeface="Arial"/>
         </a:defRPr>
       </a:lvl6pPr>
-      <a:lvl7pPr lvl="6" marR="0" rtl="0" algn="l">
+      <a:lvl7pPr marR="0" lvl="6" algn="l" rtl="0">
         <a:lnSpc>
           <a:spcPct val="100000"/>
         </a:lnSpc>
@@ -5942,7 +6169,7 @@
           <a:srgbClr val="000000"/>
         </a:buClr>
         <a:buFont typeface="Arial"/>
-        <a:defRPr b="0" i="0" sz="1400" u="none" cap="none" strike="noStrike">
+        <a:defRPr sz="1400" b="0" i="0" u="none" strike="noStrike" cap="none">
           <a:solidFill>
             <a:srgbClr val="000000"/>
           </a:solidFill>
@@ -5952,7 +6179,7 @@
           <a:sym typeface="Arial"/>
         </a:defRPr>
       </a:lvl7pPr>
-      <a:lvl8pPr lvl="7" marR="0" rtl="0" algn="l">
+      <a:lvl8pPr marR="0" lvl="7" algn="l" rtl="0">
         <a:lnSpc>
           <a:spcPct val="100000"/>
         </a:lnSpc>
@@ -5966,7 +6193,7 @@
           <a:srgbClr val="000000"/>
         </a:buClr>
         <a:buFont typeface="Arial"/>
-        <a:defRPr b="0" i="0" sz="1400" u="none" cap="none" strike="noStrike">
+        <a:defRPr sz="1400" b="0" i="0" u="none" strike="noStrike" cap="none">
           <a:solidFill>
             <a:srgbClr val="000000"/>
           </a:solidFill>
@@ -5976,7 +6203,7 @@
           <a:sym typeface="Arial"/>
         </a:defRPr>
       </a:lvl8pPr>
-      <a:lvl9pPr lvl="8" marR="0" rtl="0" algn="l">
+      <a:lvl9pPr marR="0" lvl="8" algn="l" rtl="0">
         <a:lnSpc>
           <a:spcPct val="100000"/>
         </a:lnSpc>
@@ -5990,7 +6217,7 @@
           <a:srgbClr val="000000"/>
         </a:buClr>
         <a:buFont typeface="Arial"/>
-        <a:defRPr b="0" i="0" sz="1400" u="none" cap="none" strike="noStrike">
+        <a:defRPr sz="1400" b="0" i="0" u="none" strike="noStrike" cap="none">
           <a:solidFill>
             <a:srgbClr val="000000"/>
           </a:solidFill>
@@ -6002,7 +6229,7 @@
       </a:lvl9pPr>
     </p:bodyStyle>
     <p:otherStyle>
-      <a:defPPr lvl="0" marR="0" rtl="0" algn="l">
+      <a:defPPr marR="0" lvl="0" algn="l" rtl="0">
         <a:lnSpc>
           <a:spcPct val="100000"/>
         </a:lnSpc>
@@ -6013,7 +6240,7 @@
           <a:spcPts val="0"/>
         </a:spcAft>
       </a:defPPr>
-      <a:lvl1pPr lvl="0" marR="0" rtl="0" algn="l">
+      <a:lvl1pPr marR="0" lvl="0" algn="l" rtl="0">
         <a:lnSpc>
           <a:spcPct val="100000"/>
         </a:lnSpc>
@@ -6027,7 +6254,7 @@
           <a:srgbClr val="000000"/>
         </a:buClr>
         <a:buFont typeface="Arial"/>
-        <a:defRPr b="0" i="0" sz="1400" u="none" cap="none" strike="noStrike">
+        <a:defRPr sz="1400" b="0" i="0" u="none" strike="noStrike" cap="none">
           <a:solidFill>
             <a:srgbClr val="000000"/>
           </a:solidFill>
@@ -6037,7 +6264,7 @@
           <a:sym typeface="Arial"/>
         </a:defRPr>
       </a:lvl1pPr>
-      <a:lvl2pPr lvl="1" marR="0" rtl="0" algn="l">
+      <a:lvl2pPr marR="0" lvl="1" algn="l" rtl="0">
         <a:lnSpc>
           <a:spcPct val="100000"/>
         </a:lnSpc>
@@ -6051,7 +6278,7 @@
           <a:srgbClr val="000000"/>
         </a:buClr>
         <a:buFont typeface="Arial"/>
-        <a:defRPr b="0" i="0" sz="1400" u="none" cap="none" strike="noStrike">
+        <a:defRPr sz="1400" b="0" i="0" u="none" strike="noStrike" cap="none">
           <a:solidFill>
             <a:srgbClr val="000000"/>
           </a:solidFill>
@@ -6061,7 +6288,7 @@
           <a:sym typeface="Arial"/>
         </a:defRPr>
       </a:lvl2pPr>
-      <a:lvl3pPr lvl="2" marR="0" rtl="0" algn="l">
+      <a:lvl3pPr marR="0" lvl="2" algn="l" rtl="0">
         <a:lnSpc>
           <a:spcPct val="100000"/>
         </a:lnSpc>
@@ -6075,7 +6302,7 @@
           <a:srgbClr val="000000"/>
         </a:buClr>
         <a:buFont typeface="Arial"/>
-        <a:defRPr b="0" i="0" sz="1400" u="none" cap="none" strike="noStrike">
+        <a:defRPr sz="1400" b="0" i="0" u="none" strike="noStrike" cap="none">
           <a:solidFill>
             <a:srgbClr val="000000"/>
           </a:solidFill>
@@ -6085,7 +6312,7 @@
           <a:sym typeface="Arial"/>
         </a:defRPr>
       </a:lvl3pPr>
-      <a:lvl4pPr lvl="3" marR="0" rtl="0" algn="l">
+      <a:lvl4pPr marR="0" lvl="3" algn="l" rtl="0">
         <a:lnSpc>
           <a:spcPct val="100000"/>
         </a:lnSpc>
@@ -6099,7 +6326,7 @@
           <a:srgbClr val="000000"/>
         </a:buClr>
         <a:buFont typeface="Arial"/>
-        <a:defRPr b="0" i="0" sz="1400" u="none" cap="none" strike="noStrike">
+        <a:defRPr sz="1400" b="0" i="0" u="none" strike="noStrike" cap="none">
           <a:solidFill>
             <a:srgbClr val="000000"/>
           </a:solidFill>
@@ -6109,7 +6336,7 @@
           <a:sym typeface="Arial"/>
         </a:defRPr>
       </a:lvl4pPr>
-      <a:lvl5pPr lvl="4" marR="0" rtl="0" algn="l">
+      <a:lvl5pPr marR="0" lvl="4" algn="l" rtl="0">
         <a:lnSpc>
           <a:spcPct val="100000"/>
         </a:lnSpc>
@@ -6123,7 +6350,7 @@
           <a:srgbClr val="000000"/>
         </a:buClr>
         <a:buFont typeface="Arial"/>
-        <a:defRPr b="0" i="0" sz="1400" u="none" cap="none" strike="noStrike">
+        <a:defRPr sz="1400" b="0" i="0" u="none" strike="noStrike" cap="none">
           <a:solidFill>
             <a:srgbClr val="000000"/>
           </a:solidFill>
@@ -6133,7 +6360,7 @@
           <a:sym typeface="Arial"/>
         </a:defRPr>
       </a:lvl5pPr>
-      <a:lvl6pPr lvl="5" marR="0" rtl="0" algn="l">
+      <a:lvl6pPr marR="0" lvl="5" algn="l" rtl="0">
         <a:lnSpc>
           <a:spcPct val="100000"/>
         </a:lnSpc>
@@ -6147,7 +6374,7 @@
           <a:srgbClr val="000000"/>
         </a:buClr>
         <a:buFont typeface="Arial"/>
-        <a:defRPr b="0" i="0" sz="1400" u="none" cap="none" strike="noStrike">
+        <a:defRPr sz="1400" b="0" i="0" u="none" strike="noStrike" cap="none">
           <a:solidFill>
             <a:srgbClr val="000000"/>
           </a:solidFill>
@@ -6157,7 +6384,7 @@
           <a:sym typeface="Arial"/>
         </a:defRPr>
       </a:lvl6pPr>
-      <a:lvl7pPr lvl="6" marR="0" rtl="0" algn="l">
+      <a:lvl7pPr marR="0" lvl="6" algn="l" rtl="0">
         <a:lnSpc>
           <a:spcPct val="100000"/>
         </a:lnSpc>
@@ -6171,7 +6398,7 @@
           <a:srgbClr val="000000"/>
         </a:buClr>
         <a:buFont typeface="Arial"/>
-        <a:defRPr b="0" i="0" sz="1400" u="none" cap="none" strike="noStrike">
+        <a:defRPr sz="1400" b="0" i="0" u="none" strike="noStrike" cap="none">
           <a:solidFill>
             <a:srgbClr val="000000"/>
           </a:solidFill>
@@ -6181,7 +6408,7 @@
           <a:sym typeface="Arial"/>
         </a:defRPr>
       </a:lvl7pPr>
-      <a:lvl8pPr lvl="7" marR="0" rtl="0" algn="l">
+      <a:lvl8pPr marR="0" lvl="7" algn="l" rtl="0">
         <a:lnSpc>
           <a:spcPct val="100000"/>
         </a:lnSpc>
@@ -6195,7 +6422,7 @@
           <a:srgbClr val="000000"/>
         </a:buClr>
         <a:buFont typeface="Arial"/>
-        <a:defRPr b="0" i="0" sz="1400" u="none" cap="none" strike="noStrike">
+        <a:defRPr sz="1400" b="0" i="0" u="none" strike="noStrike" cap="none">
           <a:solidFill>
             <a:srgbClr val="000000"/>
           </a:solidFill>
@@ -6205,7 +6432,7 @@
           <a:sym typeface="Arial"/>
         </a:defRPr>
       </a:lvl8pPr>
-      <a:lvl9pPr lvl="8" marR="0" rtl="0" algn="l">
+      <a:lvl9pPr marR="0" lvl="8" algn="l" rtl="0">
         <a:lnSpc>
           <a:spcPct val="100000"/>
         </a:lnSpc>
@@ -6219,7 +6446,7 @@
           <a:srgbClr val="000000"/>
         </a:buClr>
         <a:buFont typeface="Arial"/>
-        <a:defRPr b="0" i="0" sz="1400" u="none" cap="none" strike="noStrike">
+        <a:defRPr sz="1400" b="0" i="0" u="none" strike="noStrike" cap="none">
           <a:solidFill>
             <a:srgbClr val="000000"/>
           </a:solidFill>
@@ -6235,11 +6462,11 @@
 </file>
 
 <file path=ppt/slides/slide1.xml><?xml version="1.0" encoding="utf-8"?>
-<p:sld xmlns:a="http://schemas.openxmlformats.org/drawingml/2006/main" xmlns:r="http://schemas.openxmlformats.org/officeDocument/2006/relationships" xmlns:mc="http://schemas.openxmlformats.org/markup-compatibility/2006" xmlns:mv="urn:schemas-microsoft-com:mac:vml" xmlns:p="http://schemas.openxmlformats.org/presentationml/2006/main" xmlns:c="http://schemas.openxmlformats.org/drawingml/2006/chart" xmlns:dgm="http://schemas.openxmlformats.org/drawingml/2006/diagram" xmlns:o="urn:schemas-microsoft-com:office:office" xmlns:v="urn:schemas-microsoft-com:vml" xmlns:pvml="urn:schemas-microsoft-com:office:powerpoint" xmlns:com="http://schemas.openxmlformats.org/drawingml/2006/compatibility" xmlns:p14="http://schemas.microsoft.com/office/powerpoint/2010/main" xmlns:p15="http://schemas.microsoft.com/office/powerpoint/2012/main" xmlns:ahyp="http://schemas.microsoft.com/office/drawing/2018/hyperlinkcolor">
+<p:sld xmlns:a="http://schemas.openxmlformats.org/drawingml/2006/main" xmlns:r="http://schemas.openxmlformats.org/officeDocument/2006/relationships" xmlns:p="http://schemas.openxmlformats.org/presentationml/2006/main">
   <p:cSld>
     <p:spTree>
       <p:nvGrpSpPr>
-        <p:cNvPr id="53" name="Shape 53"/>
+        <p:cNvPr id="1" name="Shape 53"/>
         <p:cNvGrpSpPr/>
         <p:nvPr/>
       </p:nvGrpSpPr>
@@ -6254,7 +6481,9 @@
       <p:sp>
         <p:nvSpPr>
           <p:cNvPr id="54" name="Google Shape;54;p13"/>
-          <p:cNvSpPr txBox="1"/>
+          <p:cNvSpPr txBox="1">
+            <a:spLocks noGrp="1"/>
+          </p:cNvSpPr>
           <p:nvPr>
             <p:ph type="ctrTitle"/>
           </p:nvPr>
@@ -6269,12 +6498,12 @@
           </a:prstGeom>
         </p:spPr>
         <p:txBody>
-          <a:bodyPr anchorCtr="0" anchor="b" bIns="91425" lIns="91425" spcFirstLastPara="1" rIns="91425" wrap="square" tIns="91425">
+          <a:bodyPr spcFirstLastPara="1" wrap="square" lIns="91425" tIns="91425" rIns="91425" bIns="91425" anchor="b" anchorCtr="0">
             <a:normAutofit/>
           </a:bodyPr>
           <a:lstStyle/>
           <a:p>
-            <a:pPr indent="0" lvl="0" marL="0" rtl="0" algn="ctr">
+            <a:pPr marL="0" lvl="0" indent="0" algn="ctr" rtl="0">
               <a:spcBef>
                 <a:spcPts val="0"/>
               </a:spcBef>
@@ -6294,9 +6523,11 @@
       <p:sp>
         <p:nvSpPr>
           <p:cNvPr id="55" name="Google Shape;55;p13"/>
-          <p:cNvSpPr txBox="1"/>
+          <p:cNvSpPr txBox="1">
+            <a:spLocks noGrp="1"/>
+          </p:cNvSpPr>
           <p:nvPr>
-            <p:ph idx="1" type="subTitle"/>
+            <p:ph type="subTitle" idx="1"/>
           </p:nvPr>
         </p:nvSpPr>
         <p:spPr>
@@ -6309,12 +6540,12 @@
           </a:prstGeom>
         </p:spPr>
         <p:txBody>
-          <a:bodyPr anchorCtr="0" anchor="t" bIns="91425" lIns="91425" spcFirstLastPara="1" rIns="91425" wrap="square" tIns="91425">
+          <a:bodyPr spcFirstLastPara="1" wrap="square" lIns="91425" tIns="91425" rIns="91425" bIns="91425" anchor="t" anchorCtr="0">
             <a:normAutofit/>
           </a:bodyPr>
           <a:lstStyle/>
           <a:p>
-            <a:pPr indent="0" lvl="0" marL="0" rtl="0" algn="ctr">
+            <a:pPr marL="0" lvl="0" indent="0" algn="ctr" rtl="0">
               <a:spcBef>
                 <a:spcPts val="0"/>
               </a:spcBef>
@@ -6340,11 +6571,11 @@
 </file>
 
 <file path=ppt/slides/slide2.xml><?xml version="1.0" encoding="utf-8"?>
-<p:sld xmlns:a="http://schemas.openxmlformats.org/drawingml/2006/main" xmlns:r="http://schemas.openxmlformats.org/officeDocument/2006/relationships" xmlns:mc="http://schemas.openxmlformats.org/markup-compatibility/2006" xmlns:mv="urn:schemas-microsoft-com:mac:vml" xmlns:p="http://schemas.openxmlformats.org/presentationml/2006/main" xmlns:c="http://schemas.openxmlformats.org/drawingml/2006/chart" xmlns:dgm="http://schemas.openxmlformats.org/drawingml/2006/diagram" xmlns:o="urn:schemas-microsoft-com:office:office" xmlns:v="urn:schemas-microsoft-com:vml" xmlns:pvml="urn:schemas-microsoft-com:office:powerpoint" xmlns:com="http://schemas.openxmlformats.org/drawingml/2006/compatibility" xmlns:p14="http://schemas.microsoft.com/office/powerpoint/2010/main" xmlns:p15="http://schemas.microsoft.com/office/powerpoint/2012/main" xmlns:ahyp="http://schemas.microsoft.com/office/drawing/2018/hyperlinkcolor">
+<p:sld xmlns:a="http://schemas.openxmlformats.org/drawingml/2006/main" xmlns:r="http://schemas.openxmlformats.org/officeDocument/2006/relationships" xmlns:p="http://schemas.openxmlformats.org/presentationml/2006/main">
   <p:cSld>
     <p:spTree>
       <p:nvGrpSpPr>
-        <p:cNvPr id="59" name="Shape 59"/>
+        <p:cNvPr id="1" name="Shape 59"/>
         <p:cNvGrpSpPr/>
         <p:nvPr/>
       </p:nvGrpSpPr>
@@ -6359,7 +6590,9 @@
       <p:sp>
         <p:nvSpPr>
           <p:cNvPr id="60" name="Google Shape;60;p14"/>
-          <p:cNvSpPr txBox="1"/>
+          <p:cNvSpPr txBox="1">
+            <a:spLocks noGrp="1"/>
+          </p:cNvSpPr>
           <p:nvPr>
             <p:ph type="title"/>
           </p:nvPr>
@@ -6374,12 +6607,12 @@
           </a:prstGeom>
         </p:spPr>
         <p:txBody>
-          <a:bodyPr anchorCtr="0" anchor="t" bIns="91425" lIns="91425" spcFirstLastPara="1" rIns="91425" wrap="square" tIns="91425">
+          <a:bodyPr spcFirstLastPara="1" wrap="square" lIns="91425" tIns="91425" rIns="91425" bIns="91425" anchor="t" anchorCtr="0">
             <a:normAutofit fontScale="90000"/>
           </a:bodyPr>
           <a:lstStyle/>
           <a:p>
-            <a:pPr indent="0" lvl="0" marL="0" rtl="0" algn="l">
+            <a:pPr marL="0" lvl="0" indent="0" algn="l" rtl="0">
               <a:spcBef>
                 <a:spcPts val="0"/>
               </a:spcBef>
@@ -6399,9 +6632,11 @@
       <p:sp>
         <p:nvSpPr>
           <p:cNvPr id="61" name="Google Shape;61;p14"/>
-          <p:cNvSpPr txBox="1"/>
+          <p:cNvSpPr txBox="1">
+            <a:spLocks noGrp="1"/>
+          </p:cNvSpPr>
           <p:nvPr>
-            <p:ph idx="1" type="body"/>
+            <p:ph type="body" idx="1"/>
           </p:nvPr>
         </p:nvSpPr>
         <p:spPr>
@@ -6414,12 +6649,12 @@
           </a:prstGeom>
         </p:spPr>
         <p:txBody>
-          <a:bodyPr anchorCtr="0" anchor="t" bIns="91425" lIns="91425" spcFirstLastPara="1" rIns="91425" wrap="square" tIns="91425">
+          <a:bodyPr spcFirstLastPara="1" wrap="square" lIns="91425" tIns="91425" rIns="91425" bIns="91425" anchor="t" anchorCtr="0">
             <a:normAutofit/>
           </a:bodyPr>
           <a:lstStyle/>
           <a:p>
-            <a:pPr indent="-342900" lvl="0" marL="457200" marR="0" rtl="0" algn="l">
+            <a:pPr marL="457200" marR="0" lvl="0" indent="-342900" algn="l" rtl="0">
               <a:lnSpc>
                 <a:spcPct val="115000"/>
               </a:lnSpc>
@@ -6439,7 +6674,7 @@
             <a:endParaRPr/>
           </a:p>
           <a:p>
-            <a:pPr indent="-317500" lvl="1" marL="914400" marR="0" rtl="0" algn="l">
+            <a:pPr marL="914400" marR="0" lvl="1" indent="-317500" algn="l" rtl="0">
               <a:lnSpc>
                 <a:spcPct val="115000"/>
               </a:lnSpc>
@@ -6459,7 +6694,7 @@
             <a:endParaRPr/>
           </a:p>
           <a:p>
-            <a:pPr indent="-317500" lvl="1" marL="914400" marR="0" rtl="0" algn="l">
+            <a:pPr marL="914400" marR="0" lvl="1" indent="-317500" algn="l" rtl="0">
               <a:lnSpc>
                 <a:spcPct val="115000"/>
               </a:lnSpc>
@@ -6479,7 +6714,7 @@
             <a:endParaRPr/>
           </a:p>
           <a:p>
-            <a:pPr indent="-317500" lvl="1" marL="914400" marR="0" rtl="0" algn="l">
+            <a:pPr marL="914400" marR="0" lvl="1" indent="-317500" algn="l" rtl="0">
               <a:lnSpc>
                 <a:spcPct val="115000"/>
               </a:lnSpc>
@@ -6499,7 +6734,7 @@
             <a:endParaRPr/>
           </a:p>
           <a:p>
-            <a:pPr indent="-317500" lvl="1" marL="914400" marR="0" rtl="0" algn="l">
+            <a:pPr marL="914400" marR="0" lvl="1" indent="-317500" algn="l" rtl="0">
               <a:lnSpc>
                 <a:spcPct val="115000"/>
               </a:lnSpc>
@@ -6519,7 +6754,7 @@
             <a:endParaRPr/>
           </a:p>
           <a:p>
-            <a:pPr indent="-342900" lvl="0" marL="457200" marR="0" rtl="0" algn="l">
+            <a:pPr marL="457200" marR="0" lvl="0" indent="-342900" algn="l" rtl="0">
               <a:lnSpc>
                 <a:spcPct val="115000"/>
               </a:lnSpc>
@@ -6539,7 +6774,7 @@
             <a:endParaRPr/>
           </a:p>
           <a:p>
-            <a:pPr indent="-317500" lvl="1" marL="914400" marR="0" rtl="0" algn="l">
+            <a:pPr marL="914400" marR="0" lvl="1" indent="-317500" algn="l" rtl="0">
               <a:lnSpc>
                 <a:spcPct val="115000"/>
               </a:lnSpc>
@@ -6559,7 +6794,7 @@
             <a:endParaRPr/>
           </a:p>
           <a:p>
-            <a:pPr indent="-342900" lvl="0" marL="457200" marR="0" rtl="0" algn="l">
+            <a:pPr marL="457200" marR="0" lvl="0" indent="-342900" algn="l" rtl="0">
               <a:lnSpc>
                 <a:spcPct val="115000"/>
               </a:lnSpc>
@@ -6579,7 +6814,7 @@
             <a:endParaRPr/>
           </a:p>
           <a:p>
-            <a:pPr indent="-317500" lvl="1" marL="914400" marR="0" rtl="0" algn="l">
+            <a:pPr marL="914400" marR="0" lvl="1" indent="-317500" algn="l" rtl="0">
               <a:lnSpc>
                 <a:spcPct val="115000"/>
               </a:lnSpc>
@@ -6609,11 +6844,11 @@
 </file>
 
 <file path=ppt/slides/slide3.xml><?xml version="1.0" encoding="utf-8"?>
-<p:sld xmlns:a="http://schemas.openxmlformats.org/drawingml/2006/main" xmlns:r="http://schemas.openxmlformats.org/officeDocument/2006/relationships" xmlns:mc="http://schemas.openxmlformats.org/markup-compatibility/2006" xmlns:mv="urn:schemas-microsoft-com:mac:vml" xmlns:p="http://schemas.openxmlformats.org/presentationml/2006/main" xmlns:c="http://schemas.openxmlformats.org/drawingml/2006/chart" xmlns:dgm="http://schemas.openxmlformats.org/drawingml/2006/diagram" xmlns:o="urn:schemas-microsoft-com:office:office" xmlns:v="urn:schemas-microsoft-com:vml" xmlns:pvml="urn:schemas-microsoft-com:office:powerpoint" xmlns:com="http://schemas.openxmlformats.org/drawingml/2006/compatibility" xmlns:p14="http://schemas.microsoft.com/office/powerpoint/2010/main" xmlns:p15="http://schemas.microsoft.com/office/powerpoint/2012/main" xmlns:ahyp="http://schemas.microsoft.com/office/drawing/2018/hyperlinkcolor">
+<p:sld xmlns:a="http://schemas.openxmlformats.org/drawingml/2006/main" xmlns:r="http://schemas.openxmlformats.org/officeDocument/2006/relationships" xmlns:p="http://schemas.openxmlformats.org/presentationml/2006/main">
   <p:cSld>
     <p:spTree>
       <p:nvGrpSpPr>
-        <p:cNvPr id="65" name="Shape 65"/>
+        <p:cNvPr id="1" name="Shape 65"/>
         <p:cNvGrpSpPr/>
         <p:nvPr/>
       </p:nvGrpSpPr>
@@ -6628,7 +6863,9 @@
       <p:sp>
         <p:nvSpPr>
           <p:cNvPr id="66" name="Google Shape;66;p15"/>
-          <p:cNvSpPr txBox="1"/>
+          <p:cNvSpPr txBox="1">
+            <a:spLocks noGrp="1"/>
+          </p:cNvSpPr>
           <p:nvPr>
             <p:ph type="title"/>
           </p:nvPr>
@@ -6643,12 +6880,12 @@
           </a:prstGeom>
         </p:spPr>
         <p:txBody>
-          <a:bodyPr anchorCtr="0" anchor="t" bIns="91425" lIns="91425" spcFirstLastPara="1" rIns="91425" wrap="square" tIns="91425">
+          <a:bodyPr spcFirstLastPara="1" wrap="square" lIns="91425" tIns="91425" rIns="91425" bIns="91425" anchor="t" anchorCtr="0">
             <a:normAutofit fontScale="90000"/>
           </a:bodyPr>
           <a:lstStyle/>
           <a:p>
-            <a:pPr indent="0" lvl="0" marL="0" rtl="0" algn="l">
+            <a:pPr marL="0" lvl="0" indent="0" algn="l" rtl="0">
               <a:spcBef>
                 <a:spcPts val="0"/>
               </a:spcBef>
@@ -6668,9 +6905,11 @@
       <p:sp>
         <p:nvSpPr>
           <p:cNvPr id="67" name="Google Shape;67;p15"/>
-          <p:cNvSpPr txBox="1"/>
+          <p:cNvSpPr txBox="1">
+            <a:spLocks noGrp="1"/>
+          </p:cNvSpPr>
           <p:nvPr>
-            <p:ph idx="1" type="body"/>
+            <p:ph type="body" idx="1"/>
           </p:nvPr>
         </p:nvSpPr>
         <p:spPr>
@@ -6683,12 +6922,12 @@
           </a:prstGeom>
         </p:spPr>
         <p:txBody>
-          <a:bodyPr anchorCtr="0" anchor="t" bIns="91425" lIns="91425" spcFirstLastPara="1" rIns="91425" wrap="square" tIns="91425">
+          <a:bodyPr spcFirstLastPara="1" wrap="square" lIns="91425" tIns="91425" rIns="91425" bIns="91425" anchor="t" anchorCtr="0">
             <a:normAutofit/>
           </a:bodyPr>
           <a:lstStyle/>
           <a:p>
-            <a:pPr indent="-342900" lvl="0" marL="457200" rtl="0" algn="l">
+            <a:pPr marL="457200" lvl="0" indent="-342900" algn="l" rtl="0">
               <a:spcBef>
                 <a:spcPts val="0"/>
               </a:spcBef>
@@ -6700,16 +6939,12 @@
             </a:pPr>
             <a:r>
               <a:rPr lang="en"/>
-              <a:t>Determine </a:t>
-            </a:r>
-            <a:r>
-              <a:rPr lang="en"/>
-              <a:t>current market ticket price value of Big Mountain resort </a:t>
+              <a:t>Determine current market ticket price value of Big Mountain resort </a:t>
             </a:r>
             <a:endParaRPr/>
           </a:p>
           <a:p>
-            <a:pPr indent="-317500" lvl="1" marL="914400" rtl="0" algn="l">
+            <a:pPr marL="914400" lvl="1" indent="-317500" algn="l" rtl="0">
               <a:spcBef>
                 <a:spcPts val="0"/>
               </a:spcBef>
@@ -6726,7 +6961,7 @@
             <a:endParaRPr/>
           </a:p>
           <a:p>
-            <a:pPr indent="-342900" lvl="0" marL="457200" rtl="0" algn="l">
+            <a:pPr marL="457200" lvl="0" indent="-342900" algn="l" rtl="0">
               <a:spcBef>
                 <a:spcPts val="0"/>
               </a:spcBef>
@@ -6738,16 +6973,12 @@
             </a:pPr>
             <a:r>
               <a:rPr lang="en"/>
-              <a:t>Investigate how </a:t>
-            </a:r>
-            <a:r>
-              <a:rPr lang="en"/>
-              <a:t>Big Mountain can maximize capitalizing on its facilities. </a:t>
+              <a:t>Investigate how Big Mountain can maximize capitalizing on its facilities. </a:t>
             </a:r>
             <a:endParaRPr/>
           </a:p>
           <a:p>
-            <a:pPr indent="-317500" lvl="1" marL="914400" rtl="0" algn="l">
+            <a:pPr marL="914400" lvl="1" indent="-317500" algn="l" rtl="0">
               <a:spcBef>
                 <a:spcPts val="0"/>
               </a:spcBef>
@@ -6774,11 +7005,11 @@
 </file>
 
 <file path=ppt/slides/slide4.xml><?xml version="1.0" encoding="utf-8"?>
-<p:sld xmlns:a="http://schemas.openxmlformats.org/drawingml/2006/main" xmlns:r="http://schemas.openxmlformats.org/officeDocument/2006/relationships" xmlns:mc="http://schemas.openxmlformats.org/markup-compatibility/2006" xmlns:mv="urn:schemas-microsoft-com:mac:vml" xmlns:p="http://schemas.openxmlformats.org/presentationml/2006/main" xmlns:c="http://schemas.openxmlformats.org/drawingml/2006/chart" xmlns:dgm="http://schemas.openxmlformats.org/drawingml/2006/diagram" xmlns:o="urn:schemas-microsoft-com:office:office" xmlns:v="urn:schemas-microsoft-com:vml" xmlns:pvml="urn:schemas-microsoft-com:office:powerpoint" xmlns:com="http://schemas.openxmlformats.org/drawingml/2006/compatibility" xmlns:p14="http://schemas.microsoft.com/office/powerpoint/2010/main" xmlns:p15="http://schemas.microsoft.com/office/powerpoint/2012/main" xmlns:ahyp="http://schemas.microsoft.com/office/drawing/2018/hyperlinkcolor">
+<p:sld xmlns:a="http://schemas.openxmlformats.org/drawingml/2006/main" xmlns:r="http://schemas.openxmlformats.org/officeDocument/2006/relationships" xmlns:p="http://schemas.openxmlformats.org/presentationml/2006/main">
   <p:cSld>
     <p:spTree>
       <p:nvGrpSpPr>
-        <p:cNvPr id="71" name="Shape 71"/>
+        <p:cNvPr id="1" name="Shape 71"/>
         <p:cNvGrpSpPr/>
         <p:nvPr/>
       </p:nvGrpSpPr>
@@ -6793,7 +7024,9 @@
       <p:sp>
         <p:nvSpPr>
           <p:cNvPr id="72" name="Google Shape;72;p16"/>
-          <p:cNvSpPr txBox="1"/>
+          <p:cNvSpPr txBox="1">
+            <a:spLocks noGrp="1"/>
+          </p:cNvSpPr>
           <p:nvPr>
             <p:ph type="title"/>
           </p:nvPr>
@@ -6808,12 +7041,12 @@
           </a:prstGeom>
         </p:spPr>
         <p:txBody>
-          <a:bodyPr anchorCtr="0" anchor="t" bIns="91425" lIns="91425" spcFirstLastPara="1" rIns="91425" wrap="square" tIns="91425">
+          <a:bodyPr spcFirstLastPara="1" wrap="square" lIns="91425" tIns="91425" rIns="91425" bIns="91425" anchor="t" anchorCtr="0">
             <a:normAutofit fontScale="90000"/>
           </a:bodyPr>
           <a:lstStyle/>
           <a:p>
-            <a:pPr indent="0" lvl="0" marL="0" rtl="0" algn="l">
+            <a:pPr marL="0" lvl="0" indent="0" algn="l" rtl="0">
               <a:spcBef>
                 <a:spcPts val="0"/>
               </a:spcBef>
@@ -6833,9 +7066,11 @@
       <p:sp>
         <p:nvSpPr>
           <p:cNvPr id="73" name="Google Shape;73;p16"/>
-          <p:cNvSpPr txBox="1"/>
+          <p:cNvSpPr txBox="1">
+            <a:spLocks noGrp="1"/>
+          </p:cNvSpPr>
           <p:nvPr>
-            <p:ph idx="1" type="body"/>
+            <p:ph type="body" idx="1"/>
           </p:nvPr>
         </p:nvSpPr>
         <p:spPr>
@@ -6848,12 +7083,12 @@
           </a:prstGeom>
         </p:spPr>
         <p:txBody>
-          <a:bodyPr anchorCtr="0" anchor="t" bIns="91425" lIns="91425" spcFirstLastPara="1" rIns="91425" wrap="square" tIns="91425">
+          <a:bodyPr spcFirstLastPara="1" wrap="square" lIns="91425" tIns="91425" rIns="91425" bIns="91425" anchor="t" anchorCtr="0">
             <a:normAutofit lnSpcReduction="10000"/>
           </a:bodyPr>
           <a:lstStyle/>
           <a:p>
-            <a:pPr indent="-342900" lvl="0" marL="457200" rtl="0" algn="l">
+            <a:pPr marL="457200" lvl="0" indent="-342900" algn="l" rtl="0">
               <a:spcBef>
                 <a:spcPts val="0"/>
               </a:spcBef>
@@ -6870,7 +7105,7 @@
             <a:endParaRPr/>
           </a:p>
           <a:p>
-            <a:pPr indent="-317500" lvl="1" marL="914400" rtl="0" algn="l">
+            <a:pPr marL="914400" lvl="1" indent="-317500" algn="l" rtl="0">
               <a:spcBef>
                 <a:spcPts val="0"/>
               </a:spcBef>
@@ -6882,16 +7117,12 @@
             </a:pPr>
             <a:r>
               <a:rPr lang="en"/>
-              <a:t>Model has identified key </a:t>
-            </a:r>
-            <a:r>
-              <a:rPr lang="en"/>
-              <a:t>features ‘fastQuads’, ‘Runs’, ‘Snow Making’, and ‘Vertical Drop’</a:t>
+              <a:t>Model has identified key features ‘fastQuads’, ‘Runs’, ‘Snow Making’, and ‘Vertical Drop’</a:t>
             </a:r>
             <a:endParaRPr/>
           </a:p>
           <a:p>
-            <a:pPr indent="-317500" lvl="1" marL="914400" rtl="0" algn="l">
+            <a:pPr marL="914400" lvl="1" indent="-317500" algn="l" rtl="0">
               <a:spcBef>
                 <a:spcPts val="0"/>
               </a:spcBef>
@@ -6908,7 +7139,7 @@
             <a:endParaRPr/>
           </a:p>
           <a:p>
-            <a:pPr indent="-342900" lvl="0" marL="457200" rtl="0" algn="l">
+            <a:pPr marL="457200" lvl="0" indent="-342900" algn="l" rtl="0">
               <a:spcBef>
                 <a:spcPts val="0"/>
               </a:spcBef>
@@ -6920,16 +7151,12 @@
             </a:pPr>
             <a:r>
               <a:rPr lang="en"/>
-              <a:t>Increase ticket price to </a:t>
-            </a:r>
-            <a:r>
-              <a:rPr lang="en"/>
-              <a:t>$90 since it’s lower end of price error</a:t>
+              <a:t>Increase ticket price to $90 since it’s lower end of price error</a:t>
             </a:r>
             <a:endParaRPr/>
           </a:p>
           <a:p>
-            <a:pPr indent="-317500" lvl="1" marL="914400" rtl="0" algn="l">
+            <a:pPr marL="914400" lvl="1" indent="-317500" algn="l" rtl="0">
               <a:spcBef>
                 <a:spcPts val="0"/>
               </a:spcBef>
@@ -6946,7 +7173,7 @@
             <a:endParaRPr/>
           </a:p>
           <a:p>
-            <a:pPr indent="-317500" lvl="1" marL="914400" rtl="0" algn="l">
+            <a:pPr marL="914400" lvl="1" indent="-317500" algn="l" rtl="0">
               <a:spcBef>
                 <a:spcPts val="0"/>
               </a:spcBef>
@@ -6963,7 +7190,7 @@
             <a:endParaRPr/>
           </a:p>
           <a:p>
-            <a:pPr indent="-342900" lvl="0" marL="457200" rtl="0" algn="l">
+            <a:pPr marL="457200" lvl="0" indent="-342900" algn="l" rtl="0">
               <a:spcBef>
                 <a:spcPts val="0"/>
               </a:spcBef>
@@ -6980,7 +7207,7 @@
             <a:endParaRPr/>
           </a:p>
           <a:p>
-            <a:pPr indent="-317500" lvl="1" marL="914400" rtl="0" algn="l">
+            <a:pPr marL="914400" lvl="1" indent="-317500" algn="l" rtl="0">
               <a:spcBef>
                 <a:spcPts val="0"/>
               </a:spcBef>
@@ -6997,7 +7224,7 @@
             <a:endParaRPr/>
           </a:p>
           <a:p>
-            <a:pPr indent="-317500" lvl="2" marL="1371600" rtl="0" algn="l">
+            <a:pPr marL="1371600" lvl="2" indent="-317500" algn="l" rtl="0">
               <a:spcBef>
                 <a:spcPts val="0"/>
               </a:spcBef>
@@ -7014,7 +7241,7 @@
             <a:endParaRPr/>
           </a:p>
           <a:p>
-            <a:pPr indent="-317500" lvl="1" marL="914400" rtl="0" algn="l">
+            <a:pPr marL="914400" lvl="1" indent="-317500" algn="l" rtl="0">
               <a:spcBef>
                 <a:spcPts val="0"/>
               </a:spcBef>
@@ -7031,7 +7258,7 @@
             <a:endParaRPr/>
           </a:p>
           <a:p>
-            <a:pPr indent="-317500" lvl="2" marL="1371600" rtl="0" algn="l">
+            <a:pPr marL="1371600" lvl="2" indent="-317500" algn="l" rtl="0">
               <a:spcBef>
                 <a:spcPts val="0"/>
               </a:spcBef>
@@ -7048,7 +7275,7 @@
             <a:endParaRPr/>
           </a:p>
           <a:p>
-            <a:pPr indent="-317500" lvl="2" marL="1371600" rtl="0" algn="l">
+            <a:pPr marL="1371600" lvl="2" indent="-317500" algn="l" rtl="0">
               <a:spcBef>
                 <a:spcPts val="0"/>
               </a:spcBef>
@@ -7075,11 +7302,11 @@
 </file>
 
 <file path=ppt/slides/slide5.xml><?xml version="1.0" encoding="utf-8"?>
-<p:sld xmlns:a="http://schemas.openxmlformats.org/drawingml/2006/main" xmlns:r="http://schemas.openxmlformats.org/officeDocument/2006/relationships" xmlns:mc="http://schemas.openxmlformats.org/markup-compatibility/2006" xmlns:mv="urn:schemas-microsoft-com:mac:vml" xmlns:p="http://schemas.openxmlformats.org/presentationml/2006/main" xmlns:c="http://schemas.openxmlformats.org/drawingml/2006/chart" xmlns:dgm="http://schemas.openxmlformats.org/drawingml/2006/diagram" xmlns:o="urn:schemas-microsoft-com:office:office" xmlns:v="urn:schemas-microsoft-com:vml" xmlns:pvml="urn:schemas-microsoft-com:office:powerpoint" xmlns:com="http://schemas.openxmlformats.org/drawingml/2006/compatibility" xmlns:p14="http://schemas.microsoft.com/office/powerpoint/2010/main" xmlns:p15="http://schemas.microsoft.com/office/powerpoint/2012/main" xmlns:ahyp="http://schemas.microsoft.com/office/drawing/2018/hyperlinkcolor">
+<p:sld xmlns:a="http://schemas.openxmlformats.org/drawingml/2006/main" xmlns:r="http://schemas.openxmlformats.org/officeDocument/2006/relationships" xmlns:p="http://schemas.openxmlformats.org/presentationml/2006/main">
   <p:cSld>
     <p:spTree>
       <p:nvGrpSpPr>
-        <p:cNvPr id="77" name="Shape 77"/>
+        <p:cNvPr id="1" name="Shape 77"/>
         <p:cNvGrpSpPr/>
         <p:nvPr/>
       </p:nvGrpSpPr>
@@ -7094,7 +7321,9 @@
       <p:sp>
         <p:nvSpPr>
           <p:cNvPr id="78" name="Google Shape;78;p17"/>
-          <p:cNvSpPr txBox="1"/>
+          <p:cNvSpPr txBox="1">
+            <a:spLocks noGrp="1"/>
+          </p:cNvSpPr>
           <p:nvPr>
             <p:ph type="title"/>
           </p:nvPr>
@@ -7109,12 +7338,12 @@
           </a:prstGeom>
         </p:spPr>
         <p:txBody>
-          <a:bodyPr anchorCtr="0" anchor="t" bIns="91425" lIns="91425" spcFirstLastPara="1" rIns="91425" wrap="square" tIns="91425">
+          <a:bodyPr spcFirstLastPara="1" wrap="square" lIns="91425" tIns="91425" rIns="91425" bIns="91425" anchor="t" anchorCtr="0">
             <a:normAutofit fontScale="90000"/>
           </a:bodyPr>
           <a:lstStyle/>
           <a:p>
-            <a:pPr indent="0" lvl="0" marL="0" rtl="0" algn="l">
+            <a:pPr marL="0" lvl="0" indent="0" algn="l" rtl="0">
               <a:spcBef>
                 <a:spcPts val="0"/>
               </a:spcBef>
@@ -7134,9 +7363,11 @@
       <p:sp>
         <p:nvSpPr>
           <p:cNvPr id="79" name="Google Shape;79;p17"/>
-          <p:cNvSpPr txBox="1"/>
+          <p:cNvSpPr txBox="1">
+            <a:spLocks noGrp="1"/>
+          </p:cNvSpPr>
           <p:nvPr>
-            <p:ph idx="1" type="body"/>
+            <p:ph type="body" idx="1"/>
           </p:nvPr>
         </p:nvSpPr>
         <p:spPr>
@@ -7149,12 +7380,12 @@
           </a:prstGeom>
         </p:spPr>
         <p:txBody>
-          <a:bodyPr anchorCtr="0" anchor="t" bIns="91425" lIns="91425" spcFirstLastPara="1" rIns="91425" wrap="square" tIns="91425">
+          <a:bodyPr spcFirstLastPara="1" wrap="square" lIns="91425" tIns="91425" rIns="91425" bIns="91425" anchor="t" anchorCtr="0">
             <a:normAutofit/>
           </a:bodyPr>
           <a:lstStyle/>
           <a:p>
-            <a:pPr indent="-342900" lvl="0" marL="457200" rtl="0" algn="l">
+            <a:pPr marL="457200" lvl="0" indent="-342900" algn="l" rtl="0">
               <a:spcBef>
                 <a:spcPts val="0"/>
               </a:spcBef>
@@ -7171,7 +7402,7 @@
             <a:endParaRPr/>
           </a:p>
           <a:p>
-            <a:pPr indent="-342900" lvl="0" marL="457200" rtl="0" algn="l">
+            <a:pPr marL="457200" lvl="0" indent="-342900" algn="l" rtl="0">
               <a:spcBef>
                 <a:spcPts val="0"/>
               </a:spcBef>
@@ -7226,11 +7457,11 @@
 </file>
 
 <file path=ppt/slides/slide6.xml><?xml version="1.0" encoding="utf-8"?>
-<p:sld xmlns:a="http://schemas.openxmlformats.org/drawingml/2006/main" xmlns:r="http://schemas.openxmlformats.org/officeDocument/2006/relationships" xmlns:mc="http://schemas.openxmlformats.org/markup-compatibility/2006" xmlns:mv="urn:schemas-microsoft-com:mac:vml" xmlns:p="http://schemas.openxmlformats.org/presentationml/2006/main" xmlns:c="http://schemas.openxmlformats.org/drawingml/2006/chart" xmlns:dgm="http://schemas.openxmlformats.org/drawingml/2006/diagram" xmlns:o="urn:schemas-microsoft-com:office:office" xmlns:v="urn:schemas-microsoft-com:vml" xmlns:pvml="urn:schemas-microsoft-com:office:powerpoint" xmlns:com="http://schemas.openxmlformats.org/drawingml/2006/compatibility" xmlns:p14="http://schemas.microsoft.com/office/powerpoint/2010/main" xmlns:p15="http://schemas.microsoft.com/office/powerpoint/2012/main" xmlns:ahyp="http://schemas.microsoft.com/office/drawing/2018/hyperlinkcolor">
+<p:sld xmlns:a="http://schemas.openxmlformats.org/drawingml/2006/main" xmlns:r="http://schemas.openxmlformats.org/officeDocument/2006/relationships" xmlns:p="http://schemas.openxmlformats.org/presentationml/2006/main">
   <p:cSld>
     <p:spTree>
       <p:nvGrpSpPr>
-        <p:cNvPr id="84" name="Shape 84"/>
+        <p:cNvPr id="1" name="Shape 84"/>
         <p:cNvGrpSpPr/>
         <p:nvPr/>
       </p:nvGrpSpPr>
@@ -7245,7 +7476,9 @@
       <p:sp>
         <p:nvSpPr>
           <p:cNvPr id="85" name="Google Shape;85;p18"/>
-          <p:cNvSpPr txBox="1"/>
+          <p:cNvSpPr txBox="1">
+            <a:spLocks noGrp="1"/>
+          </p:cNvSpPr>
           <p:nvPr>
             <p:ph type="title"/>
           </p:nvPr>
@@ -7260,12 +7493,12 @@
           </a:prstGeom>
         </p:spPr>
         <p:txBody>
-          <a:bodyPr anchorCtr="0" anchor="t" bIns="91425" lIns="91425" spcFirstLastPara="1" rIns="91425" wrap="square" tIns="91425">
+          <a:bodyPr spcFirstLastPara="1" wrap="square" lIns="91425" tIns="91425" rIns="91425" bIns="91425" anchor="t" anchorCtr="0">
             <a:normAutofit fontScale="90000"/>
           </a:bodyPr>
           <a:lstStyle/>
           <a:p>
-            <a:pPr indent="0" lvl="0" marL="0" rtl="0" algn="l">
+            <a:pPr marL="0" lvl="0" indent="0" algn="l" rtl="0">
               <a:spcBef>
                 <a:spcPts val="0"/>
               </a:spcBef>
@@ -7285,9 +7518,11 @@
       <p:sp>
         <p:nvSpPr>
           <p:cNvPr id="86" name="Google Shape;86;p18"/>
-          <p:cNvSpPr txBox="1"/>
+          <p:cNvSpPr txBox="1">
+            <a:spLocks noGrp="1"/>
+          </p:cNvSpPr>
           <p:nvPr>
-            <p:ph idx="1" type="body"/>
+            <p:ph type="body" idx="1"/>
           </p:nvPr>
         </p:nvSpPr>
         <p:spPr>
@@ -7300,12 +7535,12 @@
           </a:prstGeom>
         </p:spPr>
         <p:txBody>
-          <a:bodyPr anchorCtr="0" anchor="t" bIns="91425" lIns="91425" spcFirstLastPara="1" rIns="91425" wrap="square" tIns="91425">
+          <a:bodyPr spcFirstLastPara="1" wrap="square" lIns="91425" tIns="91425" rIns="91425" bIns="91425" anchor="t" anchorCtr="0">
             <a:normAutofit/>
           </a:bodyPr>
           <a:lstStyle/>
           <a:p>
-            <a:pPr indent="-342900" lvl="0" marL="457200" rtl="0" algn="l">
+            <a:pPr marL="457200" lvl="0" indent="-342900" algn="l" rtl="0">
               <a:spcBef>
                 <a:spcPts val="0"/>
               </a:spcBef>
@@ -7316,13 +7551,13 @@
               <a:buChar char="●"/>
             </a:pPr>
             <a:r>
-              <a:rPr lang="en"/>
+              <a:rPr lang="en" dirty="0"/>
               <a:t>Two models: linear regression and random forest model were created of the dataset.</a:t>
             </a:r>
-            <a:endParaRPr/>
-          </a:p>
-          <a:p>
-            <a:pPr indent="-317500" lvl="1" marL="914400" rtl="0" algn="l">
+            <a:endParaRPr dirty="0"/>
+          </a:p>
+          <a:p>
+            <a:pPr marL="914400" lvl="1" indent="-317500" algn="l" rtl="0">
               <a:spcBef>
                 <a:spcPts val="0"/>
               </a:spcBef>
@@ -7333,13 +7568,13 @@
               <a:buChar char="○"/>
             </a:pPr>
             <a:r>
-              <a:rPr lang="en"/>
-              <a:t>Three performance metrics used for model “goodness”</a:t>
+              <a:rPr lang="en" dirty="0"/>
+              <a:t>Three performance metrics used to measure model “goodness”</a:t>
             </a:r>
-            <a:endParaRPr/>
-          </a:p>
-          <a:p>
-            <a:pPr indent="-317500" lvl="2" marL="1371600" rtl="0" algn="l">
+            <a:endParaRPr dirty="0"/>
+          </a:p>
+          <a:p>
+            <a:pPr marL="1371600" lvl="2" indent="-317500" algn="l" rtl="0">
               <a:spcBef>
                 <a:spcPts val="0"/>
               </a:spcBef>
@@ -7350,13 +7585,13 @@
               <a:buChar char="■"/>
             </a:pPr>
             <a:r>
-              <a:rPr lang="en"/>
+              <a:rPr lang="en" dirty="0"/>
               <a:t>R2 (r-squared), mean absolute error (MAE), and mean square error (MSE)</a:t>
             </a:r>
-            <a:endParaRPr/>
-          </a:p>
-          <a:p>
-            <a:pPr indent="-342900" lvl="0" marL="457200" rtl="0" algn="l">
+            <a:endParaRPr dirty="0"/>
+          </a:p>
+          <a:p>
+            <a:pPr marL="457200" lvl="0" indent="-342900" algn="l" rtl="0">
               <a:spcBef>
                 <a:spcPts val="0"/>
               </a:spcBef>
@@ -7367,13 +7602,13 @@
               <a:buChar char="●"/>
             </a:pPr>
             <a:r>
-              <a:rPr lang="en"/>
+              <a:rPr lang="en" dirty="0"/>
               <a:t>Random forest model had lower MAE than the linear regression model</a:t>
             </a:r>
-            <a:endParaRPr/>
-          </a:p>
-          <a:p>
-            <a:pPr indent="-317500" lvl="1" marL="914400" rtl="0" algn="l">
+            <a:endParaRPr dirty="0"/>
+          </a:p>
+          <a:p>
+            <a:pPr marL="914400" lvl="1" indent="-317500" algn="l" rtl="0">
               <a:spcBef>
                 <a:spcPts val="0"/>
               </a:spcBef>
@@ -7384,13 +7619,13 @@
               <a:buChar char="○"/>
             </a:pPr>
             <a:r>
-              <a:rPr lang="en"/>
+              <a:rPr lang="en" dirty="0"/>
               <a:t>$11.8 vs. $9.5</a:t>
             </a:r>
-            <a:endParaRPr/>
-          </a:p>
-          <a:p>
-            <a:pPr indent="-317500" lvl="1" marL="914400" rtl="0" algn="l">
+            <a:endParaRPr dirty="0"/>
+          </a:p>
+          <a:p>
+            <a:pPr marL="914400" lvl="1" indent="-317500" algn="l" rtl="0">
               <a:spcBef>
                 <a:spcPts val="0"/>
               </a:spcBef>
@@ -7401,18 +7636,10 @@
               <a:buChar char="○"/>
             </a:pPr>
             <a:r>
-              <a:rPr lang="en"/>
-              <a:t>Based on error results, random </a:t>
+              <a:rPr lang="en" dirty="0"/>
+              <a:t>Based on error results, random forest model was chosen to continue with the analysis</a:t>
             </a:r>
-            <a:r>
-              <a:rPr lang="en"/>
-              <a:t>forest</a:t>
-            </a:r>
-            <a:r>
-              <a:rPr lang="en"/>
-              <a:t> model was chosen to continue with the analysis</a:t>
-            </a:r>
-            <a:endParaRPr/>
+            <a:endParaRPr dirty="0"/>
           </a:p>
         </p:txBody>
       </p:sp>
@@ -7425,11 +7652,11 @@
 </file>
 
 <file path=ppt/slides/slide7.xml><?xml version="1.0" encoding="utf-8"?>
-<p:sld xmlns:a="http://schemas.openxmlformats.org/drawingml/2006/main" xmlns:r="http://schemas.openxmlformats.org/officeDocument/2006/relationships" xmlns:mc="http://schemas.openxmlformats.org/markup-compatibility/2006" xmlns:mv="urn:schemas-microsoft-com:mac:vml" xmlns:p="http://schemas.openxmlformats.org/presentationml/2006/main" xmlns:c="http://schemas.openxmlformats.org/drawingml/2006/chart" xmlns:dgm="http://schemas.openxmlformats.org/drawingml/2006/diagram" xmlns:o="urn:schemas-microsoft-com:office:office" xmlns:v="urn:schemas-microsoft-com:vml" xmlns:pvml="urn:schemas-microsoft-com:office:powerpoint" xmlns:com="http://schemas.openxmlformats.org/drawingml/2006/compatibility" xmlns:p14="http://schemas.microsoft.com/office/powerpoint/2010/main" xmlns:p15="http://schemas.microsoft.com/office/powerpoint/2012/main" xmlns:ahyp="http://schemas.microsoft.com/office/drawing/2018/hyperlinkcolor">
+<p:sld xmlns:a="http://schemas.openxmlformats.org/drawingml/2006/main" xmlns:r="http://schemas.openxmlformats.org/officeDocument/2006/relationships" xmlns:p="http://schemas.openxmlformats.org/presentationml/2006/main">
   <p:cSld>
     <p:spTree>
       <p:nvGrpSpPr>
-        <p:cNvPr id="90" name="Shape 90"/>
+        <p:cNvPr id="1" name="Shape 90"/>
         <p:cNvGrpSpPr/>
         <p:nvPr/>
       </p:nvGrpSpPr>
@@ -7444,7 +7671,9 @@
       <p:sp>
         <p:nvSpPr>
           <p:cNvPr id="91" name="Google Shape;91;p19"/>
-          <p:cNvSpPr txBox="1"/>
+          <p:cNvSpPr txBox="1">
+            <a:spLocks noGrp="1"/>
+          </p:cNvSpPr>
           <p:nvPr>
             <p:ph type="title"/>
           </p:nvPr>
@@ -7459,12 +7688,12 @@
           </a:prstGeom>
         </p:spPr>
         <p:txBody>
-          <a:bodyPr anchorCtr="0" anchor="t" bIns="91425" lIns="91425" spcFirstLastPara="1" rIns="91425" wrap="square" tIns="91425">
+          <a:bodyPr spcFirstLastPara="1" wrap="square" lIns="91425" tIns="91425" rIns="91425" bIns="91425" anchor="t" anchorCtr="0">
             <a:normAutofit fontScale="90000"/>
           </a:bodyPr>
           <a:lstStyle/>
           <a:p>
-            <a:pPr indent="0" lvl="0" marL="0" rtl="0" algn="l">
+            <a:pPr marL="0" lvl="0" indent="0" algn="l" rtl="0">
               <a:spcBef>
                 <a:spcPts val="0"/>
               </a:spcBef>
@@ -7484,9 +7713,11 @@
       <p:sp>
         <p:nvSpPr>
           <p:cNvPr id="92" name="Google Shape;92;p19"/>
-          <p:cNvSpPr txBox="1"/>
+          <p:cNvSpPr txBox="1">
+            <a:spLocks noGrp="1"/>
+          </p:cNvSpPr>
           <p:nvPr>
-            <p:ph idx="1" type="body"/>
+            <p:ph type="body" idx="1"/>
           </p:nvPr>
         </p:nvSpPr>
         <p:spPr>
@@ -7499,12 +7730,12 @@
           </a:prstGeom>
         </p:spPr>
         <p:txBody>
-          <a:bodyPr anchorCtr="0" anchor="t" bIns="91425" lIns="91425" spcFirstLastPara="1" rIns="91425" wrap="square" tIns="91425">
+          <a:bodyPr spcFirstLastPara="1" wrap="square" lIns="91425" tIns="91425" rIns="91425" bIns="91425" anchor="t" anchorCtr="0">
             <a:normAutofit/>
           </a:bodyPr>
           <a:lstStyle/>
           <a:p>
-            <a:pPr indent="-342900" lvl="0" marL="457200" rtl="0" algn="l">
+            <a:pPr marL="457200" lvl="0" indent="-342900" algn="l" rtl="0">
               <a:spcBef>
                 <a:spcPts val="0"/>
               </a:spcBef>
@@ -7515,17 +7746,13 @@
               <a:buChar char="●"/>
             </a:pPr>
             <a:r>
-              <a:rPr lang="en"/>
-              <a:t>Random </a:t>
+              <a:rPr lang="en" dirty="0"/>
+              <a:t>Random forest model identifies which parameters are most important to predicting the ticket price </a:t>
             </a:r>
-            <a:r>
-              <a:rPr lang="en"/>
-              <a:t>forest model identifies which parameters are most important to predicting the ticket price </a:t>
-            </a:r>
-            <a:endParaRPr/>
-          </a:p>
-          <a:p>
-            <a:pPr indent="-342900" lvl="0" marL="457200" rtl="0" algn="l">
+            <a:endParaRPr dirty="0"/>
+          </a:p>
+          <a:p>
+            <a:pPr marL="457200" lvl="0" indent="-342900" algn="l" rtl="0">
               <a:spcBef>
                 <a:spcPts val="0"/>
               </a:spcBef>
@@ -7536,10 +7763,10 @@
               <a:buChar char="●"/>
             </a:pPr>
             <a:r>
-              <a:rPr lang="en"/>
-              <a:t>The number of fastQuads and runs are highly correlated to ticket price</a:t>
+              <a:rPr lang="en" dirty="0"/>
+              <a:t>The number of fastQuads and runs showed the best correlation to ticket price</a:t>
             </a:r>
-            <a:endParaRPr/>
+            <a:endParaRPr dirty="0"/>
           </a:p>
         </p:txBody>
       </p:sp>
@@ -7580,11 +7807,11 @@
 </file>
 
 <file path=ppt/slides/slide8.xml><?xml version="1.0" encoding="utf-8"?>
-<p:sld xmlns:a="http://schemas.openxmlformats.org/drawingml/2006/main" xmlns:r="http://schemas.openxmlformats.org/officeDocument/2006/relationships" xmlns:mc="http://schemas.openxmlformats.org/markup-compatibility/2006" xmlns:mv="urn:schemas-microsoft-com:mac:vml" xmlns:p="http://schemas.openxmlformats.org/presentationml/2006/main" xmlns:c="http://schemas.openxmlformats.org/drawingml/2006/chart" xmlns:dgm="http://schemas.openxmlformats.org/drawingml/2006/diagram" xmlns:o="urn:schemas-microsoft-com:office:office" xmlns:v="urn:schemas-microsoft-com:vml" xmlns:pvml="urn:schemas-microsoft-com:office:powerpoint" xmlns:com="http://schemas.openxmlformats.org/drawingml/2006/compatibility" xmlns:p14="http://schemas.microsoft.com/office/powerpoint/2010/main" xmlns:p15="http://schemas.microsoft.com/office/powerpoint/2012/main" xmlns:ahyp="http://schemas.microsoft.com/office/drawing/2018/hyperlinkcolor">
+<p:sld xmlns:a="http://schemas.openxmlformats.org/drawingml/2006/main" xmlns:r="http://schemas.openxmlformats.org/officeDocument/2006/relationships" xmlns:p="http://schemas.openxmlformats.org/presentationml/2006/main">
   <p:cSld>
     <p:spTree>
       <p:nvGrpSpPr>
-        <p:cNvPr id="97" name="Shape 97"/>
+        <p:cNvPr id="1" name="Shape 97"/>
         <p:cNvGrpSpPr/>
         <p:nvPr/>
       </p:nvGrpSpPr>
@@ -7599,7 +7826,9 @@
       <p:sp>
         <p:nvSpPr>
           <p:cNvPr id="98" name="Google Shape;98;p20"/>
-          <p:cNvSpPr txBox="1"/>
+          <p:cNvSpPr txBox="1">
+            <a:spLocks noGrp="1"/>
+          </p:cNvSpPr>
           <p:nvPr>
             <p:ph type="title"/>
           </p:nvPr>
@@ -7614,12 +7843,12 @@
           </a:prstGeom>
         </p:spPr>
         <p:txBody>
-          <a:bodyPr anchorCtr="0" anchor="t" bIns="91425" lIns="91425" spcFirstLastPara="1" rIns="91425" wrap="square" tIns="91425">
+          <a:bodyPr spcFirstLastPara="1" wrap="square" lIns="91425" tIns="91425" rIns="91425" bIns="91425" anchor="t" anchorCtr="0">
             <a:normAutofit fontScale="90000"/>
           </a:bodyPr>
           <a:lstStyle/>
           <a:p>
-            <a:pPr indent="0" lvl="0" marL="0" rtl="0" algn="l">
+            <a:pPr marL="0" lvl="0" indent="0" algn="l" rtl="0">
               <a:spcBef>
                 <a:spcPts val="0"/>
               </a:spcBef>
@@ -7639,9 +7868,11 @@
       <p:sp>
         <p:nvSpPr>
           <p:cNvPr id="99" name="Google Shape;99;p20"/>
-          <p:cNvSpPr txBox="1"/>
+          <p:cNvSpPr txBox="1">
+            <a:spLocks noGrp="1"/>
+          </p:cNvSpPr>
           <p:nvPr>
-            <p:ph idx="1" type="body"/>
+            <p:ph type="body" idx="1"/>
           </p:nvPr>
         </p:nvSpPr>
         <p:spPr>
@@ -7654,12 +7885,12 @@
           </a:prstGeom>
         </p:spPr>
         <p:txBody>
-          <a:bodyPr anchorCtr="0" anchor="t" bIns="91425" lIns="91425" spcFirstLastPara="1" rIns="91425" wrap="square" tIns="91425">
+          <a:bodyPr spcFirstLastPara="1" wrap="square" lIns="91425" tIns="91425" rIns="91425" bIns="91425" anchor="t" anchorCtr="0">
             <a:normAutofit/>
           </a:bodyPr>
           <a:lstStyle/>
           <a:p>
-            <a:pPr indent="-342900" lvl="0" marL="457200" rtl="0" algn="l">
+            <a:pPr marL="457200" lvl="0" indent="-342900" algn="l" rtl="0">
               <a:spcBef>
                 <a:spcPts val="0"/>
               </a:spcBef>
@@ -7676,7 +7907,7 @@
             <a:endParaRPr/>
           </a:p>
           <a:p>
-            <a:pPr indent="-342900" lvl="0" marL="457200" rtl="0" algn="l">
+            <a:pPr marL="457200" lvl="0" indent="-342900" algn="l" rtl="0">
               <a:spcBef>
                 <a:spcPts val="0"/>
               </a:spcBef>
@@ -7759,11 +7990,11 @@
 </file>
 
 <file path=ppt/slides/slide9.xml><?xml version="1.0" encoding="utf-8"?>
-<p:sld xmlns:a="http://schemas.openxmlformats.org/drawingml/2006/main" xmlns:r="http://schemas.openxmlformats.org/officeDocument/2006/relationships" xmlns:mc="http://schemas.openxmlformats.org/markup-compatibility/2006" xmlns:mv="urn:schemas-microsoft-com:mac:vml" xmlns:p="http://schemas.openxmlformats.org/presentationml/2006/main" xmlns:c="http://schemas.openxmlformats.org/drawingml/2006/chart" xmlns:dgm="http://schemas.openxmlformats.org/drawingml/2006/diagram" xmlns:o="urn:schemas-microsoft-com:office:office" xmlns:v="urn:schemas-microsoft-com:vml" xmlns:pvml="urn:schemas-microsoft-com:office:powerpoint" xmlns:com="http://schemas.openxmlformats.org/drawingml/2006/compatibility" xmlns:p14="http://schemas.microsoft.com/office/powerpoint/2010/main" xmlns:p15="http://schemas.microsoft.com/office/powerpoint/2012/main" xmlns:ahyp="http://schemas.microsoft.com/office/drawing/2018/hyperlinkcolor">
+<p:sld xmlns:a="http://schemas.openxmlformats.org/drawingml/2006/main" xmlns:r="http://schemas.openxmlformats.org/officeDocument/2006/relationships" xmlns:p="http://schemas.openxmlformats.org/presentationml/2006/main">
   <p:cSld>
     <p:spTree>
       <p:nvGrpSpPr>
-        <p:cNvPr id="105" name="Shape 105"/>
+        <p:cNvPr id="1" name="Shape 105"/>
         <p:cNvGrpSpPr/>
         <p:nvPr/>
       </p:nvGrpSpPr>
@@ -7778,7 +8009,9 @@
       <p:sp>
         <p:nvSpPr>
           <p:cNvPr id="106" name="Google Shape;106;p21"/>
-          <p:cNvSpPr txBox="1"/>
+          <p:cNvSpPr txBox="1">
+            <a:spLocks noGrp="1"/>
+          </p:cNvSpPr>
           <p:nvPr>
             <p:ph type="title"/>
           </p:nvPr>
@@ -7793,12 +8026,12 @@
           </a:prstGeom>
         </p:spPr>
         <p:txBody>
-          <a:bodyPr anchorCtr="0" anchor="t" bIns="91425" lIns="91425" spcFirstLastPara="1" rIns="91425" wrap="square" tIns="91425">
+          <a:bodyPr spcFirstLastPara="1" wrap="square" lIns="91425" tIns="91425" rIns="91425" bIns="91425" anchor="t" anchorCtr="0">
             <a:normAutofit fontScale="90000"/>
           </a:bodyPr>
           <a:lstStyle/>
           <a:p>
-            <a:pPr indent="0" lvl="0" marL="0" rtl="0" algn="l">
+            <a:pPr marL="0" lvl="0" indent="0" algn="l" rtl="0">
               <a:spcBef>
                 <a:spcPts val="0"/>
               </a:spcBef>
@@ -7831,7 +8064,7 @@
         </p:blipFill>
         <p:spPr>
           <a:xfrm>
-            <a:off x="5135825" y="2850850"/>
+            <a:off x="5553267" y="1667979"/>
             <a:ext cx="2975274" cy="2180901"/>
           </a:xfrm>
           <a:prstGeom prst="rect">
@@ -7846,27 +8079,29 @@
       <p:sp>
         <p:nvSpPr>
           <p:cNvPr id="108" name="Google Shape;108;p21"/>
-          <p:cNvSpPr txBox="1"/>
+          <p:cNvSpPr txBox="1">
+            <a:spLocks noGrp="1"/>
+          </p:cNvSpPr>
           <p:nvPr>
-            <p:ph idx="1" type="body"/>
+            <p:ph type="body" idx="1"/>
           </p:nvPr>
         </p:nvSpPr>
         <p:spPr>
           <a:xfrm>
-            <a:off x="311700" y="1152475"/>
-            <a:ext cx="8520600" cy="3416400"/>
+            <a:off x="311701" y="1152475"/>
+            <a:ext cx="5350898" cy="3416400"/>
           </a:xfrm>
           <a:prstGeom prst="rect">
             <a:avLst/>
           </a:prstGeom>
         </p:spPr>
         <p:txBody>
-          <a:bodyPr anchorCtr="0" anchor="t" bIns="91425" lIns="91425" spcFirstLastPara="1" rIns="91425" wrap="square" tIns="91425">
-            <a:normAutofit/>
+          <a:bodyPr spcFirstLastPara="1" wrap="square" lIns="91425" tIns="91425" rIns="91425" bIns="91425" anchor="t" anchorCtr="0">
+            <a:normAutofit lnSpcReduction="10000"/>
           </a:bodyPr>
           <a:lstStyle/>
           <a:p>
-            <a:pPr indent="-342900" lvl="0" marL="457200" rtl="0" algn="l">
+            <a:pPr marL="457200" lvl="0" indent="-342900" algn="l" rtl="0">
               <a:spcBef>
                 <a:spcPts val="0"/>
               </a:spcBef>
@@ -7877,13 +8112,13 @@
               <a:buChar char="●"/>
             </a:pPr>
             <a:r>
-              <a:rPr lang="en"/>
+              <a:rPr lang="en" dirty="0"/>
               <a:t>Based on model estimate, the ticket price should be ~$100 ± $10</a:t>
             </a:r>
-            <a:endParaRPr/>
-          </a:p>
-          <a:p>
-            <a:pPr indent="-342900" lvl="0" marL="457200" rtl="0" algn="l">
+            <a:endParaRPr dirty="0"/>
+          </a:p>
+          <a:p>
+            <a:pPr marL="457200" lvl="0" indent="-342900" algn="l" rtl="0">
               <a:spcBef>
                 <a:spcPts val="0"/>
               </a:spcBef>
@@ -7894,13 +8129,13 @@
               <a:buChar char="●"/>
             </a:pPr>
             <a:r>
-              <a:rPr lang="en"/>
-              <a:t>Increasing ticket price to $100 should increase revenue $141.8 to $175 or ~33%</a:t>
+              <a:rPr lang="en" dirty="0"/>
+              <a:t>Charging ticket price of $100 will increase revenue $141.8Mil to $175Mil (~33%)</a:t>
             </a:r>
-            <a:endParaRPr/>
-          </a:p>
-          <a:p>
-            <a:pPr indent="-317500" lvl="1" marL="914400" rtl="0" algn="l">
+            <a:endParaRPr dirty="0"/>
+          </a:p>
+          <a:p>
+            <a:pPr marL="914400" lvl="1" indent="-317500" algn="l" rtl="0">
               <a:spcBef>
                 <a:spcPts val="0"/>
               </a:spcBef>
@@ -7911,13 +8146,13 @@
               <a:buChar char="○"/>
             </a:pPr>
             <a:r>
-              <a:rPr lang="en"/>
-              <a:t>Recommend phased increase to higher ticket price starting with $90</a:t>
+              <a:rPr lang="en" dirty="0"/>
+              <a:t>Recommend phased increase to higher ticket price starting with $90 (11% revenue increase)</a:t>
             </a:r>
-            <a:endParaRPr/>
-          </a:p>
-          <a:p>
-            <a:pPr indent="-342900" lvl="0" marL="457200" rtl="0" algn="l">
+            <a:endParaRPr dirty="0"/>
+          </a:p>
+          <a:p>
+            <a:pPr marL="457200" lvl="0" indent="-342900" algn="l" rtl="0">
               <a:spcBef>
                 <a:spcPts val="0"/>
               </a:spcBef>
@@ -7928,13 +8163,13 @@
               <a:buChar char="●"/>
             </a:pPr>
             <a:r>
-              <a:rPr lang="en"/>
-              <a:t>Increase vertical drop by 150 feet and increase chair frequency by 1 </a:t>
+              <a:rPr lang="en" dirty="0"/>
+              <a:t>Increase vertical drop by 150 feet and increase chair frequency by 1 to see further ticket price growth potential</a:t>
             </a:r>
-            <a:endParaRPr/>
-          </a:p>
-          <a:p>
-            <a:pPr indent="-342900" lvl="0" marL="457200" rtl="0" algn="l">
+            <a:endParaRPr dirty="0"/>
+          </a:p>
+          <a:p>
+            <a:pPr marL="457200" lvl="0" indent="-342900" algn="l" rtl="0">
               <a:spcBef>
                 <a:spcPts val="0"/>
               </a:spcBef>
@@ -7945,13 +8180,13 @@
               <a:buChar char="●"/>
             </a:pPr>
             <a:r>
-              <a:rPr lang="en"/>
-              <a:t>ID few low frequency trails to close</a:t>
+              <a:rPr lang="en" dirty="0"/>
+              <a:t>Recommend a few low frequency trails to close</a:t>
             </a:r>
-            <a:endParaRPr/>
-          </a:p>
-          <a:p>
-            <a:pPr indent="0" lvl="0" marL="457200" rtl="0" algn="l">
+            <a:endParaRPr dirty="0"/>
+          </a:p>
+          <a:p>
+            <a:pPr marL="457200" lvl="0" indent="0" algn="l" rtl="0">
               <a:spcBef>
                 <a:spcPts val="1200"/>
               </a:spcBef>
@@ -7960,13 +8195,10 @@
               </a:spcAft>
               <a:buNone/>
             </a:pPr>
-            <a:r>
-              <a:t/>
-            </a:r>
-            <a:endParaRPr/>
-          </a:p>
-          <a:p>
-            <a:pPr indent="0" lvl="0" marL="457200" rtl="0" algn="l">
+            <a:endParaRPr dirty="0"/>
+          </a:p>
+          <a:p>
+            <a:pPr marL="457200" lvl="0" indent="0" algn="l" rtl="0">
               <a:spcBef>
                 <a:spcPts val="1200"/>
               </a:spcBef>
@@ -7975,10 +8207,7 @@
               </a:spcAft>
               <a:buNone/>
             </a:pPr>
-            <a:r>
-              <a:t/>
-            </a:r>
-            <a:endParaRPr/>
+            <a:endParaRPr dirty="0"/>
           </a:p>
         </p:txBody>
       </p:sp>
@@ -7991,7 +8220,7 @@
 </file>
 
 <file path=ppt/theme/theme1.xml><?xml version="1.0" encoding="utf-8"?>
-<a:theme xmlns:a="http://schemas.openxmlformats.org/drawingml/2006/main" xmlns:r="http://schemas.openxmlformats.org/officeDocument/2006/relationships" name="Simple Light">
+<a:theme xmlns:a="http://schemas.openxmlformats.org/drawingml/2006/main" name="Simple Light">
   <a:themeElements>
     <a:clrScheme name="Simple Light">
       <a:dk1>
@@ -8266,11 +8495,13 @@
       </a:bgFillStyleLst>
     </a:fmtScheme>
   </a:themeElements>
+  <a:objectDefaults/>
+  <a:extraClrSchemeLst/>
 </a:theme>
 </file>
 
 <file path=ppt/theme/theme2.xml><?xml version="1.0" encoding="utf-8"?>
-<a:theme xmlns:a="http://schemas.openxmlformats.org/drawingml/2006/main" xmlns:r="http://schemas.openxmlformats.org/officeDocument/2006/relationships">
+<a:theme xmlns:a="http://schemas.openxmlformats.org/drawingml/2006/main">
   <a:themeElements>
     <a:clrScheme name="Default">
       <a:dk1>
@@ -8545,5 +8776,7 @@
       </a:bgFillStyleLst>
     </a:fmtScheme>
   </a:themeElements>
+  <a:objectDefaults/>
+  <a:extraClrSchemeLst/>
 </a:theme>
 </file>
</xml_diff>